<commit_message>
docs: fixed figure window_exclude_current_time
</commit_message>
<xml_diff>
--- a/docs/zh/reference/sql/dql/images/dql_images.pptx
+++ b/docs/zh/reference/sql/dql/images/dql_images.pptx
@@ -201,7 +201,7 @@
           <a:p>
             <a:fld id="{97351201-B07B-4AB9-86C5-3A1CFE99DA39}" type="datetimeFigureOut">
               <a:rPr lang="zh-CN" altLang="en-US" smtClean="0"/>
-              <a:t>2022/7/25</a:t>
+              <a:t>2022/7/26</a:t>
             </a:fld>
             <a:endParaRPr lang="zh-CN" altLang="en-US"/>
           </a:p>
@@ -508,7 +508,7 @@
           <a:p>
             <a:fld id="{EFFE7D04-47E2-4784-B5F9-3CCCC4CE3F05}" type="datetimeFigureOut">
               <a:rPr lang="zh-CN" altLang="en-US" smtClean="0"/>
-              <a:t>2022/7/25</a:t>
+              <a:t>2022/7/26</a:t>
             </a:fld>
             <a:endParaRPr lang="zh-CN" altLang="en-US"/>
           </a:p>
@@ -749,7 +749,7 @@
           <a:p>
             <a:fld id="{EFFE7D04-47E2-4784-B5F9-3CCCC4CE3F05}" type="datetimeFigureOut">
               <a:rPr lang="zh-CN" altLang="en-US" smtClean="0"/>
-              <a:t>2022/7/25</a:t>
+              <a:t>2022/7/26</a:t>
             </a:fld>
             <a:endParaRPr lang="zh-CN" altLang="en-US"/>
           </a:p>
@@ -16386,7 +16386,7 @@
                 <a:latin typeface="微软雅黑" panose="020B0503020204020204" pitchFamily="34" charset="-122"/>
                 <a:ea typeface="微软雅黑" panose="020B0503020204020204" pitchFamily="34" charset="-122"/>
               </a:rPr>
-              <a:t>12s</a:t>
+              <a:t>15s</a:t>
             </a:r>
             <a:endParaRPr lang="zh-CN" altLang="en-US" sz="900" dirty="0">
               <a:latin typeface="微软雅黑" panose="020B0503020204020204" pitchFamily="34" charset="-122"/>
@@ -16443,7 +16443,7 @@
                 <a:latin typeface="微软雅黑" panose="020B0503020204020204" pitchFamily="34" charset="-122"/>
                 <a:ea typeface="微软雅黑" panose="020B0503020204020204" pitchFamily="34" charset="-122"/>
               </a:rPr>
-              <a:t>3s preceding</a:t>
+              <a:t>0s preceding</a:t>
             </a:r>
             <a:endParaRPr lang="zh-CN" altLang="en-US" sz="900" dirty="0">
               <a:latin typeface="微软雅黑" panose="020B0503020204020204" pitchFamily="34" charset="-122"/>
@@ -16500,7 +16500,7 @@
                 <a:latin typeface="微软雅黑" panose="020B0503020204020204" pitchFamily="34" charset="-122"/>
                 <a:ea typeface="微软雅黑" panose="020B0503020204020204" pitchFamily="34" charset="-122"/>
               </a:rPr>
-              <a:t>14s</a:t>
+              <a:t>15s</a:t>
             </a:r>
             <a:endParaRPr lang="zh-CN" altLang="en-US" sz="900" dirty="0">
               <a:latin typeface="微软雅黑" panose="020B0503020204020204" pitchFamily="34" charset="-122"/>
@@ -16557,7 +16557,7 @@
                 <a:latin typeface="微软雅黑" panose="020B0503020204020204" pitchFamily="34" charset="-122"/>
                 <a:ea typeface="微软雅黑" panose="020B0503020204020204" pitchFamily="34" charset="-122"/>
               </a:rPr>
-              <a:t>1s preceding</a:t>
+              <a:t>0s preceding</a:t>
             </a:r>
             <a:endParaRPr lang="zh-CN" altLang="en-US" sz="900" dirty="0">
               <a:latin typeface="微软雅黑" panose="020B0503020204020204" pitchFamily="34" charset="-122"/>

</xml_diff>

<commit_message>
docs: added images for exclude_current_row in dql/window
</commit_message>
<xml_diff>
--- a/docs/zh/reference/sql/dql/images/dql_images.pptx
+++ b/docs/zh/reference/sql/dql/images/dql_images.pptx
@@ -5,14 +5,15 @@
     <p:sldMasterId id="2147483648" r:id="rId1"/>
   </p:sldMasterIdLst>
   <p:notesMasterIdLst>
-    <p:notesMasterId r:id="rId7"/>
+    <p:notesMasterId r:id="rId8"/>
   </p:notesMasterIdLst>
   <p:sldIdLst>
     <p:sldId id="263" r:id="rId2"/>
     <p:sldId id="264" r:id="rId3"/>
     <p:sldId id="265" r:id="rId4"/>
     <p:sldId id="257" r:id="rId5"/>
-    <p:sldId id="266" r:id="rId6"/>
+    <p:sldId id="267" r:id="rId6"/>
+    <p:sldId id="266" r:id="rId7"/>
   </p:sldIdLst>
   <p:sldSz cx="12192000" cy="6858000"/>
   <p:notesSz cx="6858000" cy="9144000"/>
@@ -201,7 +202,7 @@
           <a:p>
             <a:fld id="{97351201-B07B-4AB9-86C5-3A1CFE99DA39}" type="datetimeFigureOut">
               <a:rPr lang="zh-CN" altLang="en-US" smtClean="0"/>
-              <a:t>2022/7/26</a:t>
+              <a:t>2022/8/4</a:t>
             </a:fld>
             <a:endParaRPr lang="zh-CN" altLang="en-US"/>
           </a:p>
@@ -508,7 +509,7 @@
           <a:p>
             <a:fld id="{EFFE7D04-47E2-4784-B5F9-3CCCC4CE3F05}" type="datetimeFigureOut">
               <a:rPr lang="zh-CN" altLang="en-US" smtClean="0"/>
-              <a:t>2022/7/26</a:t>
+              <a:t>2022/8/4</a:t>
             </a:fld>
             <a:endParaRPr lang="zh-CN" altLang="en-US"/>
           </a:p>
@@ -749,7 +750,7 @@
           <a:p>
             <a:fld id="{EFFE7D04-47E2-4784-B5F9-3CCCC4CE3F05}" type="datetimeFigureOut">
               <a:rPr lang="zh-CN" altLang="en-US" smtClean="0"/>
-              <a:t>2022/7/26</a:t>
+              <a:t>2022/8/4</a:t>
             </a:fld>
             <a:endParaRPr lang="zh-CN" altLang="en-US"/>
           </a:p>
@@ -17159,6 +17160,2748 @@
 </file>
 
 <file path=ppt/slides/slide5.xml><?xml version="1.0" encoding="utf-8"?>
+<p:sld xmlns:a="http://schemas.openxmlformats.org/drawingml/2006/main" xmlns:r="http://schemas.openxmlformats.org/officeDocument/2006/relationships" xmlns:p="http://schemas.openxmlformats.org/presentationml/2006/main">
+  <p:cSld>
+    <p:spTree>
+      <p:nvGrpSpPr>
+        <p:cNvPr id="1" name=""/>
+        <p:cNvGrpSpPr/>
+        <p:nvPr/>
+      </p:nvGrpSpPr>
+      <p:grpSpPr>
+        <a:xfrm>
+          <a:off x="0" y="0"/>
+          <a:ext cx="0" cy="0"/>
+          <a:chOff x="0" y="0"/>
+          <a:chExt cx="0" cy="0"/>
+        </a:xfrm>
+      </p:grpSpPr>
+      <p:sp>
+        <p:nvSpPr>
+          <p:cNvPr id="16" name="Rectangle 7">
+            <a:extLst>
+              <a:ext uri="{FF2B5EF4-FFF2-40B4-BE49-F238E27FC236}">
+                <a16:creationId xmlns:a16="http://schemas.microsoft.com/office/drawing/2014/main" id="{99079B57-452E-48DC-BE64-CF42D6A722F7}"/>
+              </a:ext>
+            </a:extLst>
+          </p:cNvPr>
+          <p:cNvSpPr>
+            <a:spLocks noChangeArrowheads="1"/>
+          </p:cNvSpPr>
+          <p:nvPr/>
+        </p:nvSpPr>
+        <p:spPr bwMode="auto">
+          <a:xfrm>
+            <a:off x="3855905" y="2208366"/>
+            <a:ext cx="375543" cy="276715"/>
+          </a:xfrm>
+          <a:prstGeom prst="rect">
+            <a:avLst/>
+          </a:prstGeom>
+          <a:noFill/>
+          <a:ln w="12700" cap="flat">
+            <a:solidFill>
+              <a:schemeClr val="tx1"/>
+            </a:solidFill>
+            <a:prstDash val="solid"/>
+            <a:miter lim="800000"/>
+            <a:headEnd/>
+            <a:tailEnd/>
+          </a:ln>
+          <a:extLst>
+            <a:ext uri="{909E8E84-426E-40DD-AFC4-6F175D3DCCD1}">
+              <a14:hiddenFill xmlns:a14="http://schemas.microsoft.com/office/drawing/2010/main">
+                <a:solidFill>
+                  <a:srgbClr val="FFFFFF"/>
+                </a:solidFill>
+              </a14:hiddenFill>
+            </a:ext>
+          </a:extLst>
+        </p:spPr>
+        <p:txBody>
+          <a:bodyPr vert="horz" wrap="square" lIns="91440" tIns="45720" rIns="91440" bIns="45720" numCol="1" anchor="ctr" anchorCtr="0" compatLnSpc="1">
+            <a:prstTxWarp prst="textNoShape">
+              <a:avLst/>
+            </a:prstTxWarp>
+          </a:bodyPr>
+          <a:lstStyle/>
+          <a:p>
+            <a:pPr algn="ctr"/>
+            <a:r>
+              <a:rPr lang="en-US" altLang="zh-CN" sz="900" dirty="0">
+                <a:latin typeface="微软雅黑" panose="020B0503020204020204" pitchFamily="34" charset="-122"/>
+                <a:ea typeface="微软雅黑" panose="020B0503020204020204" pitchFamily="34" charset="-122"/>
+              </a:rPr>
+              <a:t>ts</a:t>
+            </a:r>
+            <a:endParaRPr lang="zh-CN" altLang="en-US" sz="900" dirty="0">
+              <a:latin typeface="微软雅黑" panose="020B0503020204020204" pitchFamily="34" charset="-122"/>
+              <a:ea typeface="微软雅黑" panose="020B0503020204020204" pitchFamily="34" charset="-122"/>
+            </a:endParaRPr>
+          </a:p>
+        </p:txBody>
+      </p:sp>
+      <p:sp>
+        <p:nvSpPr>
+          <p:cNvPr id="17" name="Rectangle 8">
+            <a:extLst>
+              <a:ext uri="{FF2B5EF4-FFF2-40B4-BE49-F238E27FC236}">
+                <a16:creationId xmlns:a16="http://schemas.microsoft.com/office/drawing/2014/main" id="{23ECAE6C-D14A-497D-8AEF-FCDC303477DE}"/>
+              </a:ext>
+            </a:extLst>
+          </p:cNvPr>
+          <p:cNvSpPr>
+            <a:spLocks noChangeArrowheads="1"/>
+          </p:cNvSpPr>
+          <p:nvPr/>
+        </p:nvSpPr>
+        <p:spPr bwMode="auto">
+          <a:xfrm>
+            <a:off x="4231443" y="2208366"/>
+            <a:ext cx="1568045" cy="276715"/>
+          </a:xfrm>
+          <a:prstGeom prst="rect">
+            <a:avLst/>
+          </a:prstGeom>
+          <a:noFill/>
+          <a:ln w="12700" cap="flat">
+            <a:solidFill>
+              <a:schemeClr val="tx1"/>
+            </a:solidFill>
+            <a:prstDash val="solid"/>
+            <a:miter lim="800000"/>
+            <a:headEnd/>
+            <a:tailEnd/>
+          </a:ln>
+          <a:extLst>
+            <a:ext uri="{909E8E84-426E-40DD-AFC4-6F175D3DCCD1}">
+              <a14:hiddenFill xmlns:a14="http://schemas.microsoft.com/office/drawing/2010/main">
+                <a:solidFill>
+                  <a:srgbClr val="FFFFFF"/>
+                </a:solidFill>
+              </a14:hiddenFill>
+            </a:ext>
+          </a:extLst>
+        </p:spPr>
+        <p:txBody>
+          <a:bodyPr vert="horz" wrap="square" lIns="91440" tIns="45720" rIns="91440" bIns="45720" numCol="1" anchor="ctr" anchorCtr="0" compatLnSpc="1">
+            <a:prstTxWarp prst="textNoShape">
+              <a:avLst/>
+            </a:prstTxWarp>
+          </a:bodyPr>
+          <a:lstStyle/>
+          <a:p>
+            <a:pPr algn="ctr"/>
+            <a:endParaRPr lang="zh-CN" altLang="en-US" sz="900">
+              <a:latin typeface="微软雅黑" panose="020B0503020204020204" pitchFamily="34" charset="-122"/>
+              <a:ea typeface="微软雅黑" panose="020B0503020204020204" pitchFamily="34" charset="-122"/>
+            </a:endParaRPr>
+          </a:p>
+        </p:txBody>
+      </p:sp>
+      <p:sp>
+        <p:nvSpPr>
+          <p:cNvPr id="18" name="Rectangle 9">
+            <a:extLst>
+              <a:ext uri="{FF2B5EF4-FFF2-40B4-BE49-F238E27FC236}">
+                <a16:creationId xmlns:a16="http://schemas.microsoft.com/office/drawing/2014/main" id="{65227786-A83F-466C-9691-0D4046870FEA}"/>
+              </a:ext>
+            </a:extLst>
+          </p:cNvPr>
+          <p:cNvSpPr>
+            <a:spLocks noChangeArrowheads="1"/>
+          </p:cNvSpPr>
+          <p:nvPr/>
+        </p:nvSpPr>
+        <p:spPr bwMode="auto">
+          <a:xfrm>
+            <a:off x="3855905" y="2485079"/>
+            <a:ext cx="375543" cy="276715"/>
+          </a:xfrm>
+          <a:prstGeom prst="rect">
+            <a:avLst/>
+          </a:prstGeom>
+          <a:noFill/>
+          <a:ln w="12700" cap="flat">
+            <a:solidFill>
+              <a:schemeClr val="tx1"/>
+            </a:solidFill>
+            <a:prstDash val="solid"/>
+            <a:miter lim="800000"/>
+            <a:headEnd/>
+            <a:tailEnd/>
+          </a:ln>
+          <a:extLst>
+            <a:ext uri="{909E8E84-426E-40DD-AFC4-6F175D3DCCD1}">
+              <a14:hiddenFill xmlns:a14="http://schemas.microsoft.com/office/drawing/2010/main">
+                <a:solidFill>
+                  <a:srgbClr val="FFFFFF"/>
+                </a:solidFill>
+              </a14:hiddenFill>
+            </a:ext>
+          </a:extLst>
+        </p:spPr>
+        <p:txBody>
+          <a:bodyPr vert="horz" wrap="square" lIns="91440" tIns="45720" rIns="91440" bIns="45720" numCol="1" anchor="ctr" anchorCtr="0" compatLnSpc="1">
+            <a:prstTxWarp prst="textNoShape">
+              <a:avLst/>
+            </a:prstTxWarp>
+          </a:bodyPr>
+          <a:lstStyle/>
+          <a:p>
+            <a:pPr algn="ctr"/>
+            <a:r>
+              <a:rPr lang="en-US" altLang="zh-CN" sz="900" dirty="0">
+                <a:latin typeface="微软雅黑" panose="020B0503020204020204" pitchFamily="34" charset="-122"/>
+                <a:ea typeface="微软雅黑" panose="020B0503020204020204" pitchFamily="34" charset="-122"/>
+              </a:rPr>
+              <a:t>0s</a:t>
+            </a:r>
+            <a:endParaRPr lang="zh-CN" altLang="en-US" sz="900" dirty="0">
+              <a:latin typeface="微软雅黑" panose="020B0503020204020204" pitchFamily="34" charset="-122"/>
+              <a:ea typeface="微软雅黑" panose="020B0503020204020204" pitchFamily="34" charset="-122"/>
+            </a:endParaRPr>
+          </a:p>
+        </p:txBody>
+      </p:sp>
+      <p:sp>
+        <p:nvSpPr>
+          <p:cNvPr id="19" name="Rectangle 10">
+            <a:extLst>
+              <a:ext uri="{FF2B5EF4-FFF2-40B4-BE49-F238E27FC236}">
+                <a16:creationId xmlns:a16="http://schemas.microsoft.com/office/drawing/2014/main" id="{A583A3ED-17AA-493B-B1AC-E71BFDE2B921}"/>
+              </a:ext>
+            </a:extLst>
+          </p:cNvPr>
+          <p:cNvSpPr>
+            <a:spLocks noChangeArrowheads="1"/>
+          </p:cNvSpPr>
+          <p:nvPr/>
+        </p:nvSpPr>
+        <p:spPr bwMode="auto">
+          <a:xfrm>
+            <a:off x="4231443" y="2485079"/>
+            <a:ext cx="1568045" cy="276715"/>
+          </a:xfrm>
+          <a:prstGeom prst="rect">
+            <a:avLst/>
+          </a:prstGeom>
+          <a:noFill/>
+          <a:ln w="12700" cap="flat">
+            <a:solidFill>
+              <a:schemeClr val="tx1"/>
+            </a:solidFill>
+            <a:prstDash val="solid"/>
+            <a:miter lim="800000"/>
+            <a:headEnd/>
+            <a:tailEnd/>
+          </a:ln>
+          <a:extLst>
+            <a:ext uri="{909E8E84-426E-40DD-AFC4-6F175D3DCCD1}">
+              <a14:hiddenFill xmlns:a14="http://schemas.microsoft.com/office/drawing/2010/main">
+                <a:solidFill>
+                  <a:srgbClr val="FFFFFF"/>
+                </a:solidFill>
+              </a14:hiddenFill>
+            </a:ext>
+          </a:extLst>
+        </p:spPr>
+        <p:txBody>
+          <a:bodyPr vert="horz" wrap="square" lIns="91440" tIns="45720" rIns="91440" bIns="45720" numCol="1" anchor="ctr" anchorCtr="0" compatLnSpc="1">
+            <a:prstTxWarp prst="textNoShape">
+              <a:avLst/>
+            </a:prstTxWarp>
+          </a:bodyPr>
+          <a:lstStyle/>
+          <a:p>
+            <a:pPr algn="ctr"/>
+            <a:r>
+              <a:rPr lang="en-US" altLang="zh-CN" sz="900">
+                <a:latin typeface="微软雅黑" panose="020B0503020204020204" pitchFamily="34" charset="-122"/>
+                <a:ea typeface="微软雅黑" panose="020B0503020204020204" pitchFamily="34" charset="-122"/>
+              </a:rPr>
+              <a:t>15s preceding</a:t>
+            </a:r>
+            <a:endParaRPr lang="zh-CN" altLang="en-US" sz="900">
+              <a:latin typeface="微软雅黑" panose="020B0503020204020204" pitchFamily="34" charset="-122"/>
+              <a:ea typeface="微软雅黑" panose="020B0503020204020204" pitchFamily="34" charset="-122"/>
+            </a:endParaRPr>
+          </a:p>
+        </p:txBody>
+      </p:sp>
+      <p:sp>
+        <p:nvSpPr>
+          <p:cNvPr id="20" name="Rectangle 11">
+            <a:extLst>
+              <a:ext uri="{FF2B5EF4-FFF2-40B4-BE49-F238E27FC236}">
+                <a16:creationId xmlns:a16="http://schemas.microsoft.com/office/drawing/2014/main" id="{BF580139-6B98-4B16-BF7A-3D360A333E09}"/>
+              </a:ext>
+            </a:extLst>
+          </p:cNvPr>
+          <p:cNvSpPr>
+            <a:spLocks noChangeArrowheads="1"/>
+          </p:cNvSpPr>
+          <p:nvPr/>
+        </p:nvSpPr>
+        <p:spPr bwMode="auto">
+          <a:xfrm>
+            <a:off x="3855905" y="2761793"/>
+            <a:ext cx="375543" cy="276715"/>
+          </a:xfrm>
+          <a:prstGeom prst="rect">
+            <a:avLst/>
+          </a:prstGeom>
+          <a:noFill/>
+          <a:ln w="12700" cap="flat">
+            <a:solidFill>
+              <a:schemeClr val="tx1"/>
+            </a:solidFill>
+            <a:prstDash val="solid"/>
+            <a:miter lim="800000"/>
+            <a:headEnd/>
+            <a:tailEnd/>
+          </a:ln>
+          <a:extLst>
+            <a:ext uri="{909E8E84-426E-40DD-AFC4-6F175D3DCCD1}">
+              <a14:hiddenFill xmlns:a14="http://schemas.microsoft.com/office/drawing/2010/main">
+                <a:solidFill>
+                  <a:srgbClr val="FFFFFF"/>
+                </a:solidFill>
+              </a14:hiddenFill>
+            </a:ext>
+          </a:extLst>
+        </p:spPr>
+        <p:txBody>
+          <a:bodyPr vert="horz" wrap="square" lIns="91440" tIns="45720" rIns="91440" bIns="45720" numCol="1" anchor="ctr" anchorCtr="0" compatLnSpc="1">
+            <a:prstTxWarp prst="textNoShape">
+              <a:avLst/>
+            </a:prstTxWarp>
+          </a:bodyPr>
+          <a:lstStyle/>
+          <a:p>
+            <a:pPr algn="ctr"/>
+            <a:r>
+              <a:rPr lang="en-US" altLang="zh-CN" sz="900" dirty="0">
+                <a:latin typeface="微软雅黑" panose="020B0503020204020204" pitchFamily="34" charset="-122"/>
+                <a:ea typeface="微软雅黑" panose="020B0503020204020204" pitchFamily="34" charset="-122"/>
+              </a:rPr>
+              <a:t>1s</a:t>
+            </a:r>
+            <a:endParaRPr lang="zh-CN" altLang="en-US" sz="900" dirty="0">
+              <a:latin typeface="微软雅黑" panose="020B0503020204020204" pitchFamily="34" charset="-122"/>
+              <a:ea typeface="微软雅黑" panose="020B0503020204020204" pitchFamily="34" charset="-122"/>
+            </a:endParaRPr>
+          </a:p>
+        </p:txBody>
+      </p:sp>
+      <p:sp>
+        <p:nvSpPr>
+          <p:cNvPr id="21" name="Rectangle 12">
+            <a:extLst>
+              <a:ext uri="{FF2B5EF4-FFF2-40B4-BE49-F238E27FC236}">
+                <a16:creationId xmlns:a16="http://schemas.microsoft.com/office/drawing/2014/main" id="{05F0F34E-C849-4FDE-961A-0F5BF749FEC5}"/>
+              </a:ext>
+            </a:extLst>
+          </p:cNvPr>
+          <p:cNvSpPr>
+            <a:spLocks noChangeArrowheads="1"/>
+          </p:cNvSpPr>
+          <p:nvPr/>
+        </p:nvSpPr>
+        <p:spPr bwMode="auto">
+          <a:xfrm>
+            <a:off x="4231443" y="2761793"/>
+            <a:ext cx="1568045" cy="276715"/>
+          </a:xfrm>
+          <a:prstGeom prst="rect">
+            <a:avLst/>
+          </a:prstGeom>
+          <a:noFill/>
+          <a:ln w="12700" cap="flat">
+            <a:solidFill>
+              <a:schemeClr val="tx1"/>
+            </a:solidFill>
+            <a:prstDash val="solid"/>
+            <a:miter lim="800000"/>
+            <a:headEnd/>
+            <a:tailEnd/>
+          </a:ln>
+          <a:extLst>
+            <a:ext uri="{909E8E84-426E-40DD-AFC4-6F175D3DCCD1}">
+              <a14:hiddenFill xmlns:a14="http://schemas.microsoft.com/office/drawing/2010/main">
+                <a:solidFill>
+                  <a:srgbClr val="FFFFFF"/>
+                </a:solidFill>
+              </a14:hiddenFill>
+            </a:ext>
+          </a:extLst>
+        </p:spPr>
+        <p:txBody>
+          <a:bodyPr vert="horz" wrap="square" lIns="91440" tIns="45720" rIns="91440" bIns="45720" numCol="1" anchor="ctr" anchorCtr="0" compatLnSpc="1">
+            <a:prstTxWarp prst="textNoShape">
+              <a:avLst/>
+            </a:prstTxWarp>
+          </a:bodyPr>
+          <a:lstStyle/>
+          <a:p>
+            <a:pPr algn="ctr"/>
+            <a:r>
+              <a:rPr lang="en-US" altLang="zh-CN" sz="900">
+                <a:latin typeface="微软雅黑" panose="020B0503020204020204" pitchFamily="34" charset="-122"/>
+                <a:ea typeface="微软雅黑" panose="020B0503020204020204" pitchFamily="34" charset="-122"/>
+              </a:rPr>
+              <a:t>14s preceding</a:t>
+            </a:r>
+            <a:endParaRPr lang="zh-CN" altLang="en-US" sz="900">
+              <a:latin typeface="微软雅黑" panose="020B0503020204020204" pitchFamily="34" charset="-122"/>
+              <a:ea typeface="微软雅黑" panose="020B0503020204020204" pitchFamily="34" charset="-122"/>
+            </a:endParaRPr>
+          </a:p>
+        </p:txBody>
+      </p:sp>
+      <p:sp>
+        <p:nvSpPr>
+          <p:cNvPr id="22" name="Rectangle 39">
+            <a:extLst>
+              <a:ext uri="{FF2B5EF4-FFF2-40B4-BE49-F238E27FC236}">
+                <a16:creationId xmlns:a16="http://schemas.microsoft.com/office/drawing/2014/main" id="{B72E159F-086D-45BC-9425-23C81D2F77B6}"/>
+              </a:ext>
+            </a:extLst>
+          </p:cNvPr>
+          <p:cNvSpPr>
+            <a:spLocks noChangeArrowheads="1"/>
+          </p:cNvSpPr>
+          <p:nvPr/>
+        </p:nvSpPr>
+        <p:spPr bwMode="auto">
+          <a:xfrm>
+            <a:off x="3645075" y="1556113"/>
+            <a:ext cx="2365248" cy="3557752"/>
+          </a:xfrm>
+          <a:prstGeom prst="rect">
+            <a:avLst/>
+          </a:prstGeom>
+          <a:noFill/>
+          <a:ln w="12700" cap="flat">
+            <a:solidFill>
+              <a:schemeClr val="tx1"/>
+            </a:solidFill>
+            <a:prstDash val="solid"/>
+            <a:miter lim="800000"/>
+            <a:headEnd/>
+            <a:tailEnd/>
+          </a:ln>
+          <a:extLst>
+            <a:ext uri="{909E8E84-426E-40DD-AFC4-6F175D3DCCD1}">
+              <a14:hiddenFill xmlns:a14="http://schemas.microsoft.com/office/drawing/2010/main">
+                <a:solidFill>
+                  <a:srgbClr val="FFFFFF"/>
+                </a:solidFill>
+              </a14:hiddenFill>
+            </a:ext>
+          </a:extLst>
+        </p:spPr>
+        <p:txBody>
+          <a:bodyPr vert="horz" wrap="square" lIns="91440" tIns="45720" rIns="91440" bIns="45720" numCol="1" anchor="ctr" anchorCtr="0" compatLnSpc="1">
+            <a:prstTxWarp prst="textNoShape">
+              <a:avLst/>
+            </a:prstTxWarp>
+          </a:bodyPr>
+          <a:lstStyle/>
+          <a:p>
+            <a:pPr algn="ctr"/>
+            <a:endParaRPr lang="zh-CN" altLang="en-US" sz="900">
+              <a:latin typeface="微软雅黑" panose="020B0503020204020204" pitchFamily="34" charset="-122"/>
+              <a:ea typeface="微软雅黑" panose="020B0503020204020204" pitchFamily="34" charset="-122"/>
+            </a:endParaRPr>
+          </a:p>
+        </p:txBody>
+      </p:sp>
+      <p:sp>
+        <p:nvSpPr>
+          <p:cNvPr id="23" name="Rectangle 40">
+            <a:extLst>
+              <a:ext uri="{FF2B5EF4-FFF2-40B4-BE49-F238E27FC236}">
+                <a16:creationId xmlns:a16="http://schemas.microsoft.com/office/drawing/2014/main" id="{1808FC4D-793B-4614-86A7-778F50648AF2}"/>
+              </a:ext>
+            </a:extLst>
+          </p:cNvPr>
+          <p:cNvSpPr>
+            <a:spLocks noChangeArrowheads="1"/>
+          </p:cNvSpPr>
+          <p:nvPr/>
+        </p:nvSpPr>
+        <p:spPr bwMode="auto">
+          <a:xfrm>
+            <a:off x="6820698" y="2241310"/>
+            <a:ext cx="401896" cy="276715"/>
+          </a:xfrm>
+          <a:prstGeom prst="rect">
+            <a:avLst/>
+          </a:prstGeom>
+          <a:noFill/>
+          <a:ln w="12700" cap="flat">
+            <a:solidFill>
+              <a:schemeClr val="tx1"/>
+            </a:solidFill>
+            <a:prstDash val="solid"/>
+            <a:miter lim="800000"/>
+            <a:headEnd/>
+            <a:tailEnd/>
+          </a:ln>
+          <a:extLst>
+            <a:ext uri="{909E8E84-426E-40DD-AFC4-6F175D3DCCD1}">
+              <a14:hiddenFill xmlns:a14="http://schemas.microsoft.com/office/drawing/2010/main">
+                <a:solidFill>
+                  <a:srgbClr val="FFFFFF"/>
+                </a:solidFill>
+              </a14:hiddenFill>
+            </a:ext>
+          </a:extLst>
+        </p:spPr>
+        <p:txBody>
+          <a:bodyPr vert="horz" wrap="square" lIns="91440" tIns="45720" rIns="91440" bIns="45720" numCol="1" anchor="ctr" anchorCtr="0" compatLnSpc="1">
+            <a:prstTxWarp prst="textNoShape">
+              <a:avLst/>
+            </a:prstTxWarp>
+          </a:bodyPr>
+          <a:lstStyle/>
+          <a:p>
+            <a:pPr algn="ctr"/>
+            <a:r>
+              <a:rPr lang="en-US" altLang="zh-CN" sz="900" dirty="0">
+                <a:latin typeface="微软雅黑" panose="020B0503020204020204" pitchFamily="34" charset="-122"/>
+                <a:ea typeface="微软雅黑" panose="020B0503020204020204" pitchFamily="34" charset="-122"/>
+              </a:rPr>
+              <a:t>1s</a:t>
+            </a:r>
+            <a:endParaRPr lang="zh-CN" altLang="en-US" sz="900" dirty="0">
+              <a:latin typeface="微软雅黑" panose="020B0503020204020204" pitchFamily="34" charset="-122"/>
+              <a:ea typeface="微软雅黑" panose="020B0503020204020204" pitchFamily="34" charset="-122"/>
+            </a:endParaRPr>
+          </a:p>
+        </p:txBody>
+      </p:sp>
+      <p:sp>
+        <p:nvSpPr>
+          <p:cNvPr id="24" name="Rectangle 41">
+            <a:extLst>
+              <a:ext uri="{FF2B5EF4-FFF2-40B4-BE49-F238E27FC236}">
+                <a16:creationId xmlns:a16="http://schemas.microsoft.com/office/drawing/2014/main" id="{730FFF58-699B-4020-9FFA-97CC54C7AB3A}"/>
+              </a:ext>
+            </a:extLst>
+          </p:cNvPr>
+          <p:cNvSpPr>
+            <a:spLocks noChangeArrowheads="1"/>
+          </p:cNvSpPr>
+          <p:nvPr/>
+        </p:nvSpPr>
+        <p:spPr bwMode="auto">
+          <a:xfrm>
+            <a:off x="7222590" y="2241310"/>
+            <a:ext cx="1633931" cy="276715"/>
+          </a:xfrm>
+          <a:prstGeom prst="rect">
+            <a:avLst/>
+          </a:prstGeom>
+          <a:noFill/>
+          <a:ln w="12700" cap="flat">
+            <a:solidFill>
+              <a:schemeClr val="tx1"/>
+            </a:solidFill>
+            <a:prstDash val="solid"/>
+            <a:miter lim="800000"/>
+            <a:headEnd/>
+            <a:tailEnd/>
+          </a:ln>
+          <a:extLst>
+            <a:ext uri="{909E8E84-426E-40DD-AFC4-6F175D3DCCD1}">
+              <a14:hiddenFill xmlns:a14="http://schemas.microsoft.com/office/drawing/2010/main">
+                <a:solidFill>
+                  <a:srgbClr val="FFFFFF"/>
+                </a:solidFill>
+              </a14:hiddenFill>
+            </a:ext>
+          </a:extLst>
+        </p:spPr>
+        <p:txBody>
+          <a:bodyPr vert="horz" wrap="square" lIns="91440" tIns="45720" rIns="91440" bIns="45720" numCol="1" anchor="ctr" anchorCtr="0" compatLnSpc="1">
+            <a:prstTxWarp prst="textNoShape">
+              <a:avLst/>
+            </a:prstTxWarp>
+          </a:bodyPr>
+          <a:lstStyle/>
+          <a:p>
+            <a:pPr algn="ctr"/>
+            <a:endParaRPr lang="zh-CN" altLang="en-US" sz="900">
+              <a:latin typeface="微软雅黑" panose="020B0503020204020204" pitchFamily="34" charset="-122"/>
+              <a:ea typeface="微软雅黑" panose="020B0503020204020204" pitchFamily="34" charset="-122"/>
+            </a:endParaRPr>
+          </a:p>
+        </p:txBody>
+      </p:sp>
+      <p:sp>
+        <p:nvSpPr>
+          <p:cNvPr id="25" name="Rectangle 42">
+            <a:extLst>
+              <a:ext uri="{FF2B5EF4-FFF2-40B4-BE49-F238E27FC236}">
+                <a16:creationId xmlns:a16="http://schemas.microsoft.com/office/drawing/2014/main" id="{E613DDDE-DBF5-4133-A972-53D36C07F37C}"/>
+              </a:ext>
+            </a:extLst>
+          </p:cNvPr>
+          <p:cNvSpPr>
+            <a:spLocks noChangeArrowheads="1"/>
+          </p:cNvSpPr>
+          <p:nvPr/>
+        </p:nvSpPr>
+        <p:spPr bwMode="auto">
+          <a:xfrm>
+            <a:off x="6820698" y="2518025"/>
+            <a:ext cx="401896" cy="276715"/>
+          </a:xfrm>
+          <a:prstGeom prst="rect">
+            <a:avLst/>
+          </a:prstGeom>
+          <a:noFill/>
+          <a:ln w="12700" cap="flat">
+            <a:solidFill>
+              <a:schemeClr val="tx1"/>
+            </a:solidFill>
+            <a:prstDash val="solid"/>
+            <a:miter lim="800000"/>
+            <a:headEnd/>
+            <a:tailEnd/>
+          </a:ln>
+          <a:extLst>
+            <a:ext uri="{909E8E84-426E-40DD-AFC4-6F175D3DCCD1}">
+              <a14:hiddenFill xmlns:a14="http://schemas.microsoft.com/office/drawing/2010/main">
+                <a:solidFill>
+                  <a:srgbClr val="FFFFFF"/>
+                </a:solidFill>
+              </a14:hiddenFill>
+            </a:ext>
+          </a:extLst>
+        </p:spPr>
+        <p:txBody>
+          <a:bodyPr vert="horz" wrap="square" lIns="91440" tIns="45720" rIns="91440" bIns="45720" numCol="1" anchor="ctr" anchorCtr="0" compatLnSpc="1">
+            <a:prstTxWarp prst="textNoShape">
+              <a:avLst/>
+            </a:prstTxWarp>
+          </a:bodyPr>
+          <a:lstStyle/>
+          <a:p>
+            <a:pPr algn="ctr"/>
+            <a:r>
+              <a:rPr lang="en-US" altLang="zh-CN" sz="900" dirty="0">
+                <a:latin typeface="微软雅黑" panose="020B0503020204020204" pitchFamily="34" charset="-122"/>
+                <a:ea typeface="微软雅黑" panose="020B0503020204020204" pitchFamily="34" charset="-122"/>
+              </a:rPr>
+              <a:t>0s</a:t>
+            </a:r>
+            <a:endParaRPr lang="zh-CN" altLang="en-US" sz="900" dirty="0">
+              <a:latin typeface="微软雅黑" panose="020B0503020204020204" pitchFamily="34" charset="-122"/>
+              <a:ea typeface="微软雅黑" panose="020B0503020204020204" pitchFamily="34" charset="-122"/>
+            </a:endParaRPr>
+          </a:p>
+        </p:txBody>
+      </p:sp>
+      <p:sp>
+        <p:nvSpPr>
+          <p:cNvPr id="26" name="Rectangle 43">
+            <a:extLst>
+              <a:ext uri="{FF2B5EF4-FFF2-40B4-BE49-F238E27FC236}">
+                <a16:creationId xmlns:a16="http://schemas.microsoft.com/office/drawing/2014/main" id="{B602C1FB-B80C-4C42-B543-C3A55234A424}"/>
+              </a:ext>
+            </a:extLst>
+          </p:cNvPr>
+          <p:cNvSpPr>
+            <a:spLocks noChangeArrowheads="1"/>
+          </p:cNvSpPr>
+          <p:nvPr/>
+        </p:nvSpPr>
+        <p:spPr bwMode="auto">
+          <a:xfrm>
+            <a:off x="7222590" y="2518025"/>
+            <a:ext cx="1633931" cy="276715"/>
+          </a:xfrm>
+          <a:prstGeom prst="rect">
+            <a:avLst/>
+          </a:prstGeom>
+          <a:noFill/>
+          <a:ln w="12700" cap="flat">
+            <a:solidFill>
+              <a:schemeClr val="tx1"/>
+            </a:solidFill>
+            <a:prstDash val="solid"/>
+            <a:miter lim="800000"/>
+            <a:headEnd/>
+            <a:tailEnd/>
+          </a:ln>
+          <a:extLst>
+            <a:ext uri="{909E8E84-426E-40DD-AFC4-6F175D3DCCD1}">
+              <a14:hiddenFill xmlns:a14="http://schemas.microsoft.com/office/drawing/2010/main">
+                <a:solidFill>
+                  <a:srgbClr val="FFFFFF"/>
+                </a:solidFill>
+              </a14:hiddenFill>
+            </a:ext>
+          </a:extLst>
+        </p:spPr>
+        <p:txBody>
+          <a:bodyPr vert="horz" wrap="square" lIns="91440" tIns="45720" rIns="91440" bIns="45720" numCol="1" anchor="ctr" anchorCtr="0" compatLnSpc="1">
+            <a:prstTxWarp prst="textNoShape">
+              <a:avLst/>
+            </a:prstTxWarp>
+          </a:bodyPr>
+          <a:lstStyle/>
+          <a:p>
+            <a:pPr algn="ctr"/>
+            <a:r>
+              <a:rPr lang="en-US" altLang="zh-CN" sz="900" dirty="0">
+                <a:latin typeface="微软雅黑" panose="020B0503020204020204" pitchFamily="34" charset="-122"/>
+                <a:ea typeface="微软雅黑" panose="020B0503020204020204" pitchFamily="34" charset="-122"/>
+              </a:rPr>
+              <a:t>15s preceding</a:t>
+            </a:r>
+            <a:endParaRPr lang="zh-CN" altLang="en-US" sz="900" dirty="0">
+              <a:latin typeface="微软雅黑" panose="020B0503020204020204" pitchFamily="34" charset="-122"/>
+              <a:ea typeface="微软雅黑" panose="020B0503020204020204" pitchFamily="34" charset="-122"/>
+            </a:endParaRPr>
+          </a:p>
+        </p:txBody>
+      </p:sp>
+      <p:sp>
+        <p:nvSpPr>
+          <p:cNvPr id="27" name="Rectangle 44">
+            <a:extLst>
+              <a:ext uri="{FF2B5EF4-FFF2-40B4-BE49-F238E27FC236}">
+                <a16:creationId xmlns:a16="http://schemas.microsoft.com/office/drawing/2014/main" id="{5556CF12-E51A-47EC-B35F-9AAFCFAB2CC0}"/>
+              </a:ext>
+            </a:extLst>
+          </p:cNvPr>
+          <p:cNvSpPr>
+            <a:spLocks noChangeArrowheads="1"/>
+          </p:cNvSpPr>
+          <p:nvPr/>
+        </p:nvSpPr>
+        <p:spPr bwMode="auto">
+          <a:xfrm>
+            <a:off x="6820698" y="2794737"/>
+            <a:ext cx="401896" cy="276715"/>
+          </a:xfrm>
+          <a:prstGeom prst="rect">
+            <a:avLst/>
+          </a:prstGeom>
+          <a:noFill/>
+          <a:ln w="12700" cap="flat">
+            <a:solidFill>
+              <a:schemeClr val="tx1"/>
+            </a:solidFill>
+            <a:prstDash val="solid"/>
+            <a:miter lim="800000"/>
+            <a:headEnd/>
+            <a:tailEnd/>
+          </a:ln>
+          <a:extLst>
+            <a:ext uri="{909E8E84-426E-40DD-AFC4-6F175D3DCCD1}">
+              <a14:hiddenFill xmlns:a14="http://schemas.microsoft.com/office/drawing/2010/main">
+                <a:solidFill>
+                  <a:srgbClr val="FFFFFF"/>
+                </a:solidFill>
+              </a14:hiddenFill>
+            </a:ext>
+          </a:extLst>
+        </p:spPr>
+        <p:txBody>
+          <a:bodyPr vert="horz" wrap="square" lIns="91440" tIns="45720" rIns="91440" bIns="45720" numCol="1" anchor="ctr" anchorCtr="0" compatLnSpc="1">
+            <a:prstTxWarp prst="textNoShape">
+              <a:avLst/>
+            </a:prstTxWarp>
+          </a:bodyPr>
+          <a:lstStyle/>
+          <a:p>
+            <a:pPr algn="ctr"/>
+            <a:r>
+              <a:rPr lang="en-US" altLang="zh-CN" sz="900" dirty="0">
+                <a:latin typeface="微软雅黑" panose="020B0503020204020204" pitchFamily="34" charset="-122"/>
+                <a:ea typeface="微软雅黑" panose="020B0503020204020204" pitchFamily="34" charset="-122"/>
+              </a:rPr>
+              <a:t>1s</a:t>
+            </a:r>
+            <a:endParaRPr lang="zh-CN" altLang="en-US" sz="900" dirty="0">
+              <a:latin typeface="微软雅黑" panose="020B0503020204020204" pitchFamily="34" charset="-122"/>
+              <a:ea typeface="微软雅黑" panose="020B0503020204020204" pitchFamily="34" charset="-122"/>
+            </a:endParaRPr>
+          </a:p>
+        </p:txBody>
+      </p:sp>
+      <p:sp>
+        <p:nvSpPr>
+          <p:cNvPr id="28" name="Rectangle 45">
+            <a:extLst>
+              <a:ext uri="{FF2B5EF4-FFF2-40B4-BE49-F238E27FC236}">
+                <a16:creationId xmlns:a16="http://schemas.microsoft.com/office/drawing/2014/main" id="{CA2AEE56-CE9D-4DDE-A96E-AAFD87F8A9BC}"/>
+              </a:ext>
+            </a:extLst>
+          </p:cNvPr>
+          <p:cNvSpPr>
+            <a:spLocks noChangeArrowheads="1"/>
+          </p:cNvSpPr>
+          <p:nvPr/>
+        </p:nvSpPr>
+        <p:spPr bwMode="auto">
+          <a:xfrm>
+            <a:off x="7222590" y="2794737"/>
+            <a:ext cx="1633931" cy="276715"/>
+          </a:xfrm>
+          <a:prstGeom prst="rect">
+            <a:avLst/>
+          </a:prstGeom>
+          <a:noFill/>
+          <a:ln w="12700" cap="flat">
+            <a:solidFill>
+              <a:schemeClr val="tx1"/>
+            </a:solidFill>
+            <a:prstDash val="solid"/>
+            <a:miter lim="800000"/>
+            <a:headEnd/>
+            <a:tailEnd/>
+          </a:ln>
+          <a:extLst>
+            <a:ext uri="{909E8E84-426E-40DD-AFC4-6F175D3DCCD1}">
+              <a14:hiddenFill xmlns:a14="http://schemas.microsoft.com/office/drawing/2010/main">
+                <a:solidFill>
+                  <a:srgbClr val="FFFFFF"/>
+                </a:solidFill>
+              </a14:hiddenFill>
+            </a:ext>
+          </a:extLst>
+        </p:spPr>
+        <p:txBody>
+          <a:bodyPr vert="horz" wrap="square" lIns="91440" tIns="45720" rIns="91440" bIns="45720" numCol="1" anchor="ctr" anchorCtr="0" compatLnSpc="1">
+            <a:prstTxWarp prst="textNoShape">
+              <a:avLst/>
+            </a:prstTxWarp>
+          </a:bodyPr>
+          <a:lstStyle/>
+          <a:p>
+            <a:pPr algn="ctr"/>
+            <a:r>
+              <a:rPr lang="en-US" altLang="zh-CN" sz="900" dirty="0">
+                <a:latin typeface="微软雅黑" panose="020B0503020204020204" pitchFamily="34" charset="-122"/>
+                <a:ea typeface="微软雅黑" panose="020B0503020204020204" pitchFamily="34" charset="-122"/>
+              </a:rPr>
+              <a:t>14s preceding</a:t>
+            </a:r>
+            <a:endParaRPr lang="zh-CN" altLang="en-US" sz="900" dirty="0">
+              <a:latin typeface="微软雅黑" panose="020B0503020204020204" pitchFamily="34" charset="-122"/>
+              <a:ea typeface="微软雅黑" panose="020B0503020204020204" pitchFamily="34" charset="-122"/>
+            </a:endParaRPr>
+          </a:p>
+        </p:txBody>
+      </p:sp>
+      <p:sp>
+        <p:nvSpPr>
+          <p:cNvPr id="29" name="Rectangle 46">
+            <a:extLst>
+              <a:ext uri="{FF2B5EF4-FFF2-40B4-BE49-F238E27FC236}">
+                <a16:creationId xmlns:a16="http://schemas.microsoft.com/office/drawing/2014/main" id="{89DF4168-90BB-44C3-8965-8C0505399967}"/>
+              </a:ext>
+            </a:extLst>
+          </p:cNvPr>
+          <p:cNvSpPr>
+            <a:spLocks noChangeArrowheads="1"/>
+          </p:cNvSpPr>
+          <p:nvPr/>
+        </p:nvSpPr>
+        <p:spPr bwMode="auto">
+          <a:xfrm>
+            <a:off x="6655985" y="1556113"/>
+            <a:ext cx="2365248" cy="3557752"/>
+          </a:xfrm>
+          <a:prstGeom prst="rect">
+            <a:avLst/>
+          </a:prstGeom>
+          <a:noFill/>
+          <a:ln w="12700" cap="flat">
+            <a:solidFill>
+              <a:schemeClr val="tx1"/>
+            </a:solidFill>
+            <a:prstDash val="solid"/>
+            <a:miter lim="800000"/>
+            <a:headEnd/>
+            <a:tailEnd/>
+          </a:ln>
+          <a:extLst>
+            <a:ext uri="{909E8E84-426E-40DD-AFC4-6F175D3DCCD1}">
+              <a14:hiddenFill xmlns:a14="http://schemas.microsoft.com/office/drawing/2010/main">
+                <a:solidFill>
+                  <a:srgbClr val="FFFFFF"/>
+                </a:solidFill>
+              </a14:hiddenFill>
+            </a:ext>
+          </a:extLst>
+        </p:spPr>
+        <p:txBody>
+          <a:bodyPr vert="horz" wrap="square" lIns="91440" tIns="45720" rIns="91440" bIns="45720" numCol="1" anchor="ctr" anchorCtr="0" compatLnSpc="1">
+            <a:prstTxWarp prst="textNoShape">
+              <a:avLst/>
+            </a:prstTxWarp>
+          </a:bodyPr>
+          <a:lstStyle/>
+          <a:p>
+            <a:pPr algn="ctr"/>
+            <a:endParaRPr lang="zh-CN" altLang="en-US" sz="900">
+              <a:latin typeface="微软雅黑" panose="020B0503020204020204" pitchFamily="34" charset="-122"/>
+              <a:ea typeface="微软雅黑" panose="020B0503020204020204" pitchFamily="34" charset="-122"/>
+            </a:endParaRPr>
+          </a:p>
+        </p:txBody>
+      </p:sp>
+      <p:sp>
+        <p:nvSpPr>
+          <p:cNvPr id="30" name="Rectangle 182">
+            <a:extLst>
+              <a:ext uri="{FF2B5EF4-FFF2-40B4-BE49-F238E27FC236}">
+                <a16:creationId xmlns:a16="http://schemas.microsoft.com/office/drawing/2014/main" id="{AA6C7286-8199-4084-B2E5-B083BE1994B7}"/>
+              </a:ext>
+            </a:extLst>
+          </p:cNvPr>
+          <p:cNvSpPr>
+            <a:spLocks noChangeArrowheads="1"/>
+          </p:cNvSpPr>
+          <p:nvPr/>
+        </p:nvSpPr>
+        <p:spPr bwMode="auto">
+          <a:xfrm>
+            <a:off x="6820698" y="3071452"/>
+            <a:ext cx="401896" cy="276715"/>
+          </a:xfrm>
+          <a:prstGeom prst="rect">
+            <a:avLst/>
+          </a:prstGeom>
+          <a:solidFill>
+            <a:srgbClr val="ABCD7D"/>
+          </a:solidFill>
+          <a:ln w="12700">
+            <a:solidFill>
+              <a:srgbClr val="000000"/>
+            </a:solidFill>
+            <a:miter lim="800000"/>
+            <a:headEnd/>
+            <a:tailEnd/>
+          </a:ln>
+        </p:spPr>
+        <p:txBody>
+          <a:bodyPr vert="horz" wrap="square" lIns="91440" tIns="45720" rIns="91440" bIns="45720" numCol="1" anchor="ctr" anchorCtr="0" compatLnSpc="1">
+            <a:prstTxWarp prst="textNoShape">
+              <a:avLst/>
+            </a:prstTxWarp>
+          </a:bodyPr>
+          <a:lstStyle/>
+          <a:p>
+            <a:pPr algn="ctr"/>
+            <a:r>
+              <a:rPr lang="en-US" altLang="zh-CN" sz="900" dirty="0">
+                <a:latin typeface="微软雅黑" panose="020B0503020204020204" pitchFamily="34" charset="-122"/>
+                <a:ea typeface="微软雅黑" panose="020B0503020204020204" pitchFamily="34" charset="-122"/>
+              </a:rPr>
+              <a:t>5s</a:t>
+            </a:r>
+            <a:endParaRPr lang="zh-CN" altLang="en-US" sz="900" dirty="0">
+              <a:latin typeface="微软雅黑" panose="020B0503020204020204" pitchFamily="34" charset="-122"/>
+              <a:ea typeface="微软雅黑" panose="020B0503020204020204" pitchFamily="34" charset="-122"/>
+            </a:endParaRPr>
+          </a:p>
+        </p:txBody>
+      </p:sp>
+      <p:sp>
+        <p:nvSpPr>
+          <p:cNvPr id="31" name="Rectangle 183">
+            <a:extLst>
+              <a:ext uri="{FF2B5EF4-FFF2-40B4-BE49-F238E27FC236}">
+                <a16:creationId xmlns:a16="http://schemas.microsoft.com/office/drawing/2014/main" id="{FFEE2016-6729-4F97-A9C2-A540E881E817}"/>
+              </a:ext>
+            </a:extLst>
+          </p:cNvPr>
+          <p:cNvSpPr>
+            <a:spLocks noChangeArrowheads="1"/>
+          </p:cNvSpPr>
+          <p:nvPr/>
+        </p:nvSpPr>
+        <p:spPr bwMode="auto">
+          <a:xfrm>
+            <a:off x="7222590" y="3071452"/>
+            <a:ext cx="1633931" cy="276715"/>
+          </a:xfrm>
+          <a:prstGeom prst="rect">
+            <a:avLst/>
+          </a:prstGeom>
+          <a:solidFill>
+            <a:srgbClr val="ABCD7D"/>
+          </a:solidFill>
+          <a:ln w="12700">
+            <a:solidFill>
+              <a:srgbClr val="000000"/>
+            </a:solidFill>
+            <a:miter lim="800000"/>
+            <a:headEnd/>
+            <a:tailEnd/>
+          </a:ln>
+        </p:spPr>
+        <p:txBody>
+          <a:bodyPr vert="horz" wrap="square" lIns="91440" tIns="45720" rIns="91440" bIns="45720" numCol="1" anchor="ctr" anchorCtr="0" compatLnSpc="1">
+            <a:prstTxWarp prst="textNoShape">
+              <a:avLst/>
+            </a:prstTxWarp>
+          </a:bodyPr>
+          <a:lstStyle/>
+          <a:p>
+            <a:pPr algn="ctr"/>
+            <a:r>
+              <a:rPr lang="en-US" altLang="zh-CN" sz="900" dirty="0">
+                <a:latin typeface="微软雅黑" panose="020B0503020204020204" pitchFamily="34" charset="-122"/>
+                <a:ea typeface="微软雅黑" panose="020B0503020204020204" pitchFamily="34" charset="-122"/>
+              </a:rPr>
+              <a:t>10s preceding</a:t>
+            </a:r>
+            <a:endParaRPr lang="zh-CN" altLang="en-US" sz="900" dirty="0">
+              <a:latin typeface="微软雅黑" panose="020B0503020204020204" pitchFamily="34" charset="-122"/>
+              <a:ea typeface="微软雅黑" panose="020B0503020204020204" pitchFamily="34" charset="-122"/>
+            </a:endParaRPr>
+          </a:p>
+        </p:txBody>
+      </p:sp>
+      <p:sp>
+        <p:nvSpPr>
+          <p:cNvPr id="32" name="Rectangle 184">
+            <a:extLst>
+              <a:ext uri="{FF2B5EF4-FFF2-40B4-BE49-F238E27FC236}">
+                <a16:creationId xmlns:a16="http://schemas.microsoft.com/office/drawing/2014/main" id="{5EF9DAD6-E865-431C-83F2-327E7D71FC14}"/>
+              </a:ext>
+            </a:extLst>
+          </p:cNvPr>
+          <p:cNvSpPr>
+            <a:spLocks noChangeArrowheads="1"/>
+          </p:cNvSpPr>
+          <p:nvPr/>
+        </p:nvSpPr>
+        <p:spPr bwMode="auto">
+          <a:xfrm>
+            <a:off x="6820698" y="3348166"/>
+            <a:ext cx="401896" cy="276715"/>
+          </a:xfrm>
+          <a:prstGeom prst="rect">
+            <a:avLst/>
+          </a:prstGeom>
+          <a:solidFill>
+            <a:srgbClr val="ABCD7D"/>
+          </a:solidFill>
+          <a:ln w="12700">
+            <a:solidFill>
+              <a:srgbClr val="000000"/>
+            </a:solidFill>
+            <a:miter lim="800000"/>
+            <a:headEnd/>
+            <a:tailEnd/>
+          </a:ln>
+        </p:spPr>
+        <p:txBody>
+          <a:bodyPr vert="horz" wrap="square" lIns="91440" tIns="45720" rIns="91440" bIns="45720" numCol="1" anchor="ctr" anchorCtr="0" compatLnSpc="1">
+            <a:prstTxWarp prst="textNoShape">
+              <a:avLst/>
+            </a:prstTxWarp>
+          </a:bodyPr>
+          <a:lstStyle/>
+          <a:p>
+            <a:pPr algn="ctr"/>
+            <a:r>
+              <a:rPr lang="en-US" altLang="zh-CN" sz="900" dirty="0">
+                <a:latin typeface="微软雅黑" panose="020B0503020204020204" pitchFamily="34" charset="-122"/>
+                <a:ea typeface="微软雅黑" panose="020B0503020204020204" pitchFamily="34" charset="-122"/>
+              </a:rPr>
+              <a:t>7s</a:t>
+            </a:r>
+            <a:endParaRPr lang="zh-CN" altLang="en-US" sz="900" dirty="0">
+              <a:latin typeface="微软雅黑" panose="020B0503020204020204" pitchFamily="34" charset="-122"/>
+              <a:ea typeface="微软雅黑" panose="020B0503020204020204" pitchFamily="34" charset="-122"/>
+            </a:endParaRPr>
+          </a:p>
+        </p:txBody>
+      </p:sp>
+      <p:sp>
+        <p:nvSpPr>
+          <p:cNvPr id="33" name="Rectangle 185">
+            <a:extLst>
+              <a:ext uri="{FF2B5EF4-FFF2-40B4-BE49-F238E27FC236}">
+                <a16:creationId xmlns:a16="http://schemas.microsoft.com/office/drawing/2014/main" id="{E511D0F0-7C19-4048-AA06-2D67DA68C805}"/>
+              </a:ext>
+            </a:extLst>
+          </p:cNvPr>
+          <p:cNvSpPr>
+            <a:spLocks noChangeArrowheads="1"/>
+          </p:cNvSpPr>
+          <p:nvPr/>
+        </p:nvSpPr>
+        <p:spPr bwMode="auto">
+          <a:xfrm>
+            <a:off x="7222590" y="3348166"/>
+            <a:ext cx="1633931" cy="276715"/>
+          </a:xfrm>
+          <a:prstGeom prst="rect">
+            <a:avLst/>
+          </a:prstGeom>
+          <a:solidFill>
+            <a:srgbClr val="ABCD7D"/>
+          </a:solidFill>
+          <a:ln w="12700">
+            <a:solidFill>
+              <a:srgbClr val="000000"/>
+            </a:solidFill>
+            <a:miter lim="800000"/>
+            <a:headEnd/>
+            <a:tailEnd/>
+          </a:ln>
+        </p:spPr>
+        <p:txBody>
+          <a:bodyPr vert="horz" wrap="square" lIns="91440" tIns="45720" rIns="91440" bIns="45720" numCol="1" anchor="ctr" anchorCtr="0" compatLnSpc="1">
+            <a:prstTxWarp prst="textNoShape">
+              <a:avLst/>
+            </a:prstTxWarp>
+          </a:bodyPr>
+          <a:lstStyle/>
+          <a:p>
+            <a:pPr algn="ctr"/>
+            <a:r>
+              <a:rPr lang="en-US" altLang="zh-CN" sz="900" dirty="0">
+                <a:latin typeface="微软雅黑" panose="020B0503020204020204" pitchFamily="34" charset="-122"/>
+                <a:ea typeface="微软雅黑" panose="020B0503020204020204" pitchFamily="34" charset="-122"/>
+              </a:rPr>
+              <a:t>8s preceding</a:t>
+            </a:r>
+            <a:endParaRPr lang="zh-CN" altLang="en-US" sz="900" dirty="0">
+              <a:latin typeface="微软雅黑" panose="020B0503020204020204" pitchFamily="34" charset="-122"/>
+              <a:ea typeface="微软雅黑" panose="020B0503020204020204" pitchFamily="34" charset="-122"/>
+            </a:endParaRPr>
+          </a:p>
+        </p:txBody>
+      </p:sp>
+      <p:sp>
+        <p:nvSpPr>
+          <p:cNvPr id="34" name="Rectangle 186">
+            <a:extLst>
+              <a:ext uri="{FF2B5EF4-FFF2-40B4-BE49-F238E27FC236}">
+                <a16:creationId xmlns:a16="http://schemas.microsoft.com/office/drawing/2014/main" id="{18F7C13B-C645-461D-ADEF-543184410779}"/>
+              </a:ext>
+            </a:extLst>
+          </p:cNvPr>
+          <p:cNvSpPr>
+            <a:spLocks noChangeArrowheads="1"/>
+          </p:cNvSpPr>
+          <p:nvPr/>
+        </p:nvSpPr>
+        <p:spPr bwMode="auto">
+          <a:xfrm>
+            <a:off x="6820698" y="3624880"/>
+            <a:ext cx="401896" cy="270128"/>
+          </a:xfrm>
+          <a:prstGeom prst="rect">
+            <a:avLst/>
+          </a:prstGeom>
+          <a:solidFill>
+            <a:srgbClr val="ABCD7D"/>
+          </a:solidFill>
+          <a:ln w="12700">
+            <a:solidFill>
+              <a:srgbClr val="000000"/>
+            </a:solidFill>
+            <a:miter lim="800000"/>
+            <a:headEnd/>
+            <a:tailEnd/>
+          </a:ln>
+        </p:spPr>
+        <p:txBody>
+          <a:bodyPr vert="horz" wrap="square" lIns="91440" tIns="45720" rIns="91440" bIns="45720" numCol="1" anchor="ctr" anchorCtr="0" compatLnSpc="1">
+            <a:prstTxWarp prst="textNoShape">
+              <a:avLst/>
+            </a:prstTxWarp>
+          </a:bodyPr>
+          <a:lstStyle/>
+          <a:p>
+            <a:pPr algn="ctr"/>
+            <a:r>
+              <a:rPr lang="en-US" altLang="zh-CN" sz="900" dirty="0">
+                <a:latin typeface="微软雅黑" panose="020B0503020204020204" pitchFamily="34" charset="-122"/>
+                <a:ea typeface="微软雅黑" panose="020B0503020204020204" pitchFamily="34" charset="-122"/>
+              </a:rPr>
+              <a:t>8s</a:t>
+            </a:r>
+            <a:endParaRPr lang="zh-CN" altLang="en-US" sz="900" dirty="0">
+              <a:latin typeface="微软雅黑" panose="020B0503020204020204" pitchFamily="34" charset="-122"/>
+              <a:ea typeface="微软雅黑" panose="020B0503020204020204" pitchFamily="34" charset="-122"/>
+            </a:endParaRPr>
+          </a:p>
+        </p:txBody>
+      </p:sp>
+      <p:sp>
+        <p:nvSpPr>
+          <p:cNvPr id="35" name="Rectangle 187">
+            <a:extLst>
+              <a:ext uri="{FF2B5EF4-FFF2-40B4-BE49-F238E27FC236}">
+                <a16:creationId xmlns:a16="http://schemas.microsoft.com/office/drawing/2014/main" id="{DB53FEDC-963D-47C0-BF4B-E4F76FABCE04}"/>
+              </a:ext>
+            </a:extLst>
+          </p:cNvPr>
+          <p:cNvSpPr>
+            <a:spLocks noChangeArrowheads="1"/>
+          </p:cNvSpPr>
+          <p:nvPr/>
+        </p:nvSpPr>
+        <p:spPr bwMode="auto">
+          <a:xfrm>
+            <a:off x="7222590" y="3624880"/>
+            <a:ext cx="1633931" cy="270128"/>
+          </a:xfrm>
+          <a:prstGeom prst="rect">
+            <a:avLst/>
+          </a:prstGeom>
+          <a:solidFill>
+            <a:srgbClr val="ABCD7D"/>
+          </a:solidFill>
+          <a:ln w="12700">
+            <a:solidFill>
+              <a:srgbClr val="000000"/>
+            </a:solidFill>
+            <a:miter lim="800000"/>
+            <a:headEnd/>
+            <a:tailEnd/>
+          </a:ln>
+        </p:spPr>
+        <p:txBody>
+          <a:bodyPr vert="horz" wrap="square" lIns="91440" tIns="45720" rIns="91440" bIns="45720" numCol="1" anchor="ctr" anchorCtr="0" compatLnSpc="1">
+            <a:prstTxWarp prst="textNoShape">
+              <a:avLst/>
+            </a:prstTxWarp>
+          </a:bodyPr>
+          <a:lstStyle/>
+          <a:p>
+            <a:pPr algn="ctr"/>
+            <a:r>
+              <a:rPr lang="en-US" altLang="zh-CN" sz="900" dirty="0">
+                <a:latin typeface="微软雅黑" panose="020B0503020204020204" pitchFamily="34" charset="-122"/>
+                <a:ea typeface="微软雅黑" panose="020B0503020204020204" pitchFamily="34" charset="-122"/>
+              </a:rPr>
+              <a:t>7s preceding</a:t>
+            </a:r>
+            <a:endParaRPr lang="zh-CN" altLang="en-US" sz="900" dirty="0">
+              <a:latin typeface="微软雅黑" panose="020B0503020204020204" pitchFamily="34" charset="-122"/>
+              <a:ea typeface="微软雅黑" panose="020B0503020204020204" pitchFamily="34" charset="-122"/>
+            </a:endParaRPr>
+          </a:p>
+        </p:txBody>
+      </p:sp>
+      <p:sp>
+        <p:nvSpPr>
+          <p:cNvPr id="36" name="Rectangle 188">
+            <a:extLst>
+              <a:ext uri="{FF2B5EF4-FFF2-40B4-BE49-F238E27FC236}">
+                <a16:creationId xmlns:a16="http://schemas.microsoft.com/office/drawing/2014/main" id="{286639F4-F13A-4922-BA15-D9E87DB11232}"/>
+              </a:ext>
+            </a:extLst>
+          </p:cNvPr>
+          <p:cNvSpPr>
+            <a:spLocks noChangeArrowheads="1"/>
+          </p:cNvSpPr>
+          <p:nvPr/>
+        </p:nvSpPr>
+        <p:spPr bwMode="auto">
+          <a:xfrm>
+            <a:off x="6820698" y="3895003"/>
+            <a:ext cx="401896" cy="276715"/>
+          </a:xfrm>
+          <a:prstGeom prst="rect">
+            <a:avLst/>
+          </a:prstGeom>
+          <a:solidFill>
+            <a:srgbClr val="ABCD7D"/>
+          </a:solidFill>
+          <a:ln w="12700">
+            <a:solidFill>
+              <a:srgbClr val="000000"/>
+            </a:solidFill>
+            <a:miter lim="800000"/>
+            <a:headEnd/>
+            <a:tailEnd/>
+          </a:ln>
+        </p:spPr>
+        <p:txBody>
+          <a:bodyPr vert="horz" wrap="square" lIns="91440" tIns="45720" rIns="91440" bIns="45720" numCol="1" anchor="ctr" anchorCtr="0" compatLnSpc="1">
+            <a:prstTxWarp prst="textNoShape">
+              <a:avLst/>
+            </a:prstTxWarp>
+          </a:bodyPr>
+          <a:lstStyle/>
+          <a:p>
+            <a:pPr algn="ctr"/>
+            <a:r>
+              <a:rPr lang="en-US" altLang="zh-CN" sz="900" dirty="0">
+                <a:latin typeface="微软雅黑" panose="020B0503020204020204" pitchFamily="34" charset="-122"/>
+                <a:ea typeface="微软雅黑" panose="020B0503020204020204" pitchFamily="34" charset="-122"/>
+              </a:rPr>
+              <a:t>10s</a:t>
+            </a:r>
+            <a:endParaRPr lang="zh-CN" altLang="en-US" sz="900" dirty="0">
+              <a:latin typeface="微软雅黑" panose="020B0503020204020204" pitchFamily="34" charset="-122"/>
+              <a:ea typeface="微软雅黑" panose="020B0503020204020204" pitchFamily="34" charset="-122"/>
+            </a:endParaRPr>
+          </a:p>
+        </p:txBody>
+      </p:sp>
+      <p:sp>
+        <p:nvSpPr>
+          <p:cNvPr id="37" name="Rectangle 189">
+            <a:extLst>
+              <a:ext uri="{FF2B5EF4-FFF2-40B4-BE49-F238E27FC236}">
+                <a16:creationId xmlns:a16="http://schemas.microsoft.com/office/drawing/2014/main" id="{4E228433-EE2D-4B2B-90E0-A56EA0A6B097}"/>
+              </a:ext>
+            </a:extLst>
+          </p:cNvPr>
+          <p:cNvSpPr>
+            <a:spLocks noChangeArrowheads="1"/>
+          </p:cNvSpPr>
+          <p:nvPr/>
+        </p:nvSpPr>
+        <p:spPr bwMode="auto">
+          <a:xfrm>
+            <a:off x="7222590" y="3895003"/>
+            <a:ext cx="1633931" cy="276715"/>
+          </a:xfrm>
+          <a:prstGeom prst="rect">
+            <a:avLst/>
+          </a:prstGeom>
+          <a:solidFill>
+            <a:srgbClr val="ABCD7D"/>
+          </a:solidFill>
+          <a:ln w="12700">
+            <a:solidFill>
+              <a:srgbClr val="000000"/>
+            </a:solidFill>
+            <a:miter lim="800000"/>
+            <a:headEnd/>
+            <a:tailEnd/>
+          </a:ln>
+        </p:spPr>
+        <p:txBody>
+          <a:bodyPr vert="horz" wrap="square" lIns="91440" tIns="45720" rIns="91440" bIns="45720" numCol="1" anchor="ctr" anchorCtr="0" compatLnSpc="1">
+            <a:prstTxWarp prst="textNoShape">
+              <a:avLst/>
+            </a:prstTxWarp>
+          </a:bodyPr>
+          <a:lstStyle/>
+          <a:p>
+            <a:pPr algn="ctr"/>
+            <a:r>
+              <a:rPr lang="en-US" altLang="zh-CN" sz="900" dirty="0">
+                <a:latin typeface="微软雅黑" panose="020B0503020204020204" pitchFamily="34" charset="-122"/>
+                <a:ea typeface="微软雅黑" panose="020B0503020204020204" pitchFamily="34" charset="-122"/>
+              </a:rPr>
+              <a:t>5s preceding</a:t>
+            </a:r>
+            <a:endParaRPr lang="zh-CN" altLang="en-US" sz="900" dirty="0">
+              <a:latin typeface="微软雅黑" panose="020B0503020204020204" pitchFamily="34" charset="-122"/>
+              <a:ea typeface="微软雅黑" panose="020B0503020204020204" pitchFamily="34" charset="-122"/>
+            </a:endParaRPr>
+          </a:p>
+        </p:txBody>
+      </p:sp>
+      <p:sp>
+        <p:nvSpPr>
+          <p:cNvPr id="38" name="Rectangle 217">
+            <a:extLst>
+              <a:ext uri="{FF2B5EF4-FFF2-40B4-BE49-F238E27FC236}">
+                <a16:creationId xmlns:a16="http://schemas.microsoft.com/office/drawing/2014/main" id="{711CCA03-E479-425E-9A38-891C717AB358}"/>
+              </a:ext>
+            </a:extLst>
+          </p:cNvPr>
+          <p:cNvSpPr>
+            <a:spLocks noChangeArrowheads="1"/>
+          </p:cNvSpPr>
+          <p:nvPr/>
+        </p:nvSpPr>
+        <p:spPr bwMode="auto">
+          <a:xfrm>
+            <a:off x="3855900" y="3038508"/>
+            <a:ext cx="375543" cy="270128"/>
+          </a:xfrm>
+          <a:prstGeom prst="rect">
+            <a:avLst/>
+          </a:prstGeom>
+          <a:solidFill>
+            <a:srgbClr val="ABCD7D"/>
+          </a:solidFill>
+          <a:ln w="12700">
+            <a:solidFill>
+              <a:srgbClr val="000000"/>
+            </a:solidFill>
+            <a:miter lim="800000"/>
+            <a:headEnd/>
+            <a:tailEnd/>
+          </a:ln>
+        </p:spPr>
+        <p:txBody>
+          <a:bodyPr vert="horz" wrap="square" lIns="91440" tIns="45720" rIns="91440" bIns="45720" numCol="1" anchor="ctr" anchorCtr="0" compatLnSpc="1">
+            <a:prstTxWarp prst="textNoShape">
+              <a:avLst/>
+            </a:prstTxWarp>
+          </a:bodyPr>
+          <a:lstStyle/>
+          <a:p>
+            <a:pPr algn="ctr"/>
+            <a:r>
+              <a:rPr lang="en-US" altLang="zh-CN" sz="900" dirty="0">
+                <a:latin typeface="微软雅黑" panose="020B0503020204020204" pitchFamily="34" charset="-122"/>
+                <a:ea typeface="微软雅黑" panose="020B0503020204020204" pitchFamily="34" charset="-122"/>
+              </a:rPr>
+              <a:t>5s</a:t>
+            </a:r>
+            <a:endParaRPr lang="zh-CN" altLang="en-US" sz="900" dirty="0">
+              <a:latin typeface="微软雅黑" panose="020B0503020204020204" pitchFamily="34" charset="-122"/>
+              <a:ea typeface="微软雅黑" panose="020B0503020204020204" pitchFamily="34" charset="-122"/>
+            </a:endParaRPr>
+          </a:p>
+        </p:txBody>
+      </p:sp>
+      <p:sp>
+        <p:nvSpPr>
+          <p:cNvPr id="39" name="Rectangle 218">
+            <a:extLst>
+              <a:ext uri="{FF2B5EF4-FFF2-40B4-BE49-F238E27FC236}">
+                <a16:creationId xmlns:a16="http://schemas.microsoft.com/office/drawing/2014/main" id="{EFB7855F-6165-4C94-8771-2466059FFE2E}"/>
+              </a:ext>
+            </a:extLst>
+          </p:cNvPr>
+          <p:cNvSpPr>
+            <a:spLocks noChangeArrowheads="1"/>
+          </p:cNvSpPr>
+          <p:nvPr/>
+        </p:nvSpPr>
+        <p:spPr bwMode="auto">
+          <a:xfrm>
+            <a:off x="4231443" y="3038508"/>
+            <a:ext cx="1568045" cy="270128"/>
+          </a:xfrm>
+          <a:prstGeom prst="rect">
+            <a:avLst/>
+          </a:prstGeom>
+          <a:solidFill>
+            <a:srgbClr val="ABCD7D"/>
+          </a:solidFill>
+          <a:ln w="12700">
+            <a:solidFill>
+              <a:srgbClr val="000000"/>
+            </a:solidFill>
+            <a:miter lim="800000"/>
+            <a:headEnd/>
+            <a:tailEnd/>
+          </a:ln>
+        </p:spPr>
+        <p:txBody>
+          <a:bodyPr vert="horz" wrap="square" lIns="91440" tIns="45720" rIns="91440" bIns="45720" numCol="1" anchor="ctr" anchorCtr="0" compatLnSpc="1">
+            <a:prstTxWarp prst="textNoShape">
+              <a:avLst/>
+            </a:prstTxWarp>
+          </a:bodyPr>
+          <a:lstStyle/>
+          <a:p>
+            <a:pPr algn="ctr"/>
+            <a:r>
+              <a:rPr lang="en-US" altLang="zh-CN" sz="900" dirty="0">
+                <a:latin typeface="微软雅黑" panose="020B0503020204020204" pitchFamily="34" charset="-122"/>
+                <a:ea typeface="微软雅黑" panose="020B0503020204020204" pitchFamily="34" charset="-122"/>
+              </a:rPr>
+              <a:t>10s preceding</a:t>
+            </a:r>
+            <a:endParaRPr lang="zh-CN" altLang="en-US" sz="900" dirty="0">
+              <a:latin typeface="微软雅黑" panose="020B0503020204020204" pitchFamily="34" charset="-122"/>
+              <a:ea typeface="微软雅黑" panose="020B0503020204020204" pitchFamily="34" charset="-122"/>
+            </a:endParaRPr>
+          </a:p>
+        </p:txBody>
+      </p:sp>
+      <p:sp>
+        <p:nvSpPr>
+          <p:cNvPr id="40" name="Rectangle 219">
+            <a:extLst>
+              <a:ext uri="{FF2B5EF4-FFF2-40B4-BE49-F238E27FC236}">
+                <a16:creationId xmlns:a16="http://schemas.microsoft.com/office/drawing/2014/main" id="{546D6A4F-3747-4C7C-AED3-E6BA4A7E2CB8}"/>
+              </a:ext>
+            </a:extLst>
+          </p:cNvPr>
+          <p:cNvSpPr>
+            <a:spLocks noChangeArrowheads="1"/>
+          </p:cNvSpPr>
+          <p:nvPr/>
+        </p:nvSpPr>
+        <p:spPr bwMode="auto">
+          <a:xfrm>
+            <a:off x="3855900" y="3308635"/>
+            <a:ext cx="375543" cy="283305"/>
+          </a:xfrm>
+          <a:prstGeom prst="rect">
+            <a:avLst/>
+          </a:prstGeom>
+          <a:solidFill>
+            <a:srgbClr val="ABCD7D"/>
+          </a:solidFill>
+          <a:ln w="12700">
+            <a:solidFill>
+              <a:srgbClr val="000000"/>
+            </a:solidFill>
+            <a:miter lim="800000"/>
+            <a:headEnd/>
+            <a:tailEnd/>
+          </a:ln>
+        </p:spPr>
+        <p:txBody>
+          <a:bodyPr vert="horz" wrap="square" lIns="91440" tIns="45720" rIns="91440" bIns="45720" numCol="1" anchor="ctr" anchorCtr="0" compatLnSpc="1">
+            <a:prstTxWarp prst="textNoShape">
+              <a:avLst/>
+            </a:prstTxWarp>
+          </a:bodyPr>
+          <a:lstStyle/>
+          <a:p>
+            <a:pPr algn="ctr"/>
+            <a:r>
+              <a:rPr lang="en-US" altLang="zh-CN" sz="900" dirty="0">
+                <a:latin typeface="微软雅黑" panose="020B0503020204020204" pitchFamily="34" charset="-122"/>
+                <a:ea typeface="微软雅黑" panose="020B0503020204020204" pitchFamily="34" charset="-122"/>
+              </a:rPr>
+              <a:t>7s</a:t>
+            </a:r>
+            <a:endParaRPr lang="zh-CN" altLang="en-US" sz="900" dirty="0">
+              <a:latin typeface="微软雅黑" panose="020B0503020204020204" pitchFamily="34" charset="-122"/>
+              <a:ea typeface="微软雅黑" panose="020B0503020204020204" pitchFamily="34" charset="-122"/>
+            </a:endParaRPr>
+          </a:p>
+        </p:txBody>
+      </p:sp>
+      <p:sp>
+        <p:nvSpPr>
+          <p:cNvPr id="41" name="Rectangle 220">
+            <a:extLst>
+              <a:ext uri="{FF2B5EF4-FFF2-40B4-BE49-F238E27FC236}">
+                <a16:creationId xmlns:a16="http://schemas.microsoft.com/office/drawing/2014/main" id="{98B39BF5-7BAF-4781-9E39-69123917ED33}"/>
+              </a:ext>
+            </a:extLst>
+          </p:cNvPr>
+          <p:cNvSpPr>
+            <a:spLocks noChangeArrowheads="1"/>
+          </p:cNvSpPr>
+          <p:nvPr/>
+        </p:nvSpPr>
+        <p:spPr bwMode="auto">
+          <a:xfrm>
+            <a:off x="4231443" y="3308635"/>
+            <a:ext cx="1568045" cy="283305"/>
+          </a:xfrm>
+          <a:prstGeom prst="rect">
+            <a:avLst/>
+          </a:prstGeom>
+          <a:solidFill>
+            <a:srgbClr val="ABCD7D"/>
+          </a:solidFill>
+          <a:ln w="12700">
+            <a:solidFill>
+              <a:srgbClr val="000000"/>
+            </a:solidFill>
+            <a:miter lim="800000"/>
+            <a:headEnd/>
+            <a:tailEnd/>
+          </a:ln>
+        </p:spPr>
+        <p:txBody>
+          <a:bodyPr vert="horz" wrap="square" lIns="91440" tIns="45720" rIns="91440" bIns="45720" numCol="1" anchor="ctr" anchorCtr="0" compatLnSpc="1">
+            <a:prstTxWarp prst="textNoShape">
+              <a:avLst/>
+            </a:prstTxWarp>
+          </a:bodyPr>
+          <a:lstStyle/>
+          <a:p>
+            <a:pPr algn="ctr"/>
+            <a:r>
+              <a:rPr lang="en-US" altLang="zh-CN" sz="900" dirty="0">
+                <a:latin typeface="微软雅黑" panose="020B0503020204020204" pitchFamily="34" charset="-122"/>
+                <a:ea typeface="微软雅黑" panose="020B0503020204020204" pitchFamily="34" charset="-122"/>
+              </a:rPr>
+              <a:t>8s preceding</a:t>
+            </a:r>
+            <a:endParaRPr lang="zh-CN" altLang="en-US" sz="900" dirty="0">
+              <a:latin typeface="微软雅黑" panose="020B0503020204020204" pitchFamily="34" charset="-122"/>
+              <a:ea typeface="微软雅黑" panose="020B0503020204020204" pitchFamily="34" charset="-122"/>
+            </a:endParaRPr>
+          </a:p>
+        </p:txBody>
+      </p:sp>
+      <p:sp>
+        <p:nvSpPr>
+          <p:cNvPr id="42" name="Rectangle 221">
+            <a:extLst>
+              <a:ext uri="{FF2B5EF4-FFF2-40B4-BE49-F238E27FC236}">
+                <a16:creationId xmlns:a16="http://schemas.microsoft.com/office/drawing/2014/main" id="{90A1F0D9-5844-4A6B-B210-867509432110}"/>
+              </a:ext>
+            </a:extLst>
+          </p:cNvPr>
+          <p:cNvSpPr>
+            <a:spLocks noChangeArrowheads="1"/>
+          </p:cNvSpPr>
+          <p:nvPr/>
+        </p:nvSpPr>
+        <p:spPr bwMode="auto">
+          <a:xfrm>
+            <a:off x="3855900" y="3591935"/>
+            <a:ext cx="375543" cy="270128"/>
+          </a:xfrm>
+          <a:prstGeom prst="rect">
+            <a:avLst/>
+          </a:prstGeom>
+          <a:solidFill>
+            <a:srgbClr val="ABCD7D"/>
+          </a:solidFill>
+          <a:ln w="12700">
+            <a:solidFill>
+              <a:srgbClr val="000000"/>
+            </a:solidFill>
+            <a:miter lim="800000"/>
+            <a:headEnd/>
+            <a:tailEnd/>
+          </a:ln>
+        </p:spPr>
+        <p:txBody>
+          <a:bodyPr vert="horz" wrap="square" lIns="91440" tIns="45720" rIns="91440" bIns="45720" numCol="1" anchor="ctr" anchorCtr="0" compatLnSpc="1">
+            <a:prstTxWarp prst="textNoShape">
+              <a:avLst/>
+            </a:prstTxWarp>
+          </a:bodyPr>
+          <a:lstStyle/>
+          <a:p>
+            <a:pPr algn="ctr"/>
+            <a:r>
+              <a:rPr lang="en-US" altLang="zh-CN" sz="900" dirty="0">
+                <a:latin typeface="微软雅黑" panose="020B0503020204020204" pitchFamily="34" charset="-122"/>
+                <a:ea typeface="微软雅黑" panose="020B0503020204020204" pitchFamily="34" charset="-122"/>
+              </a:rPr>
+              <a:t>8s</a:t>
+            </a:r>
+            <a:endParaRPr lang="zh-CN" altLang="en-US" sz="900" dirty="0">
+              <a:latin typeface="微软雅黑" panose="020B0503020204020204" pitchFamily="34" charset="-122"/>
+              <a:ea typeface="微软雅黑" panose="020B0503020204020204" pitchFamily="34" charset="-122"/>
+            </a:endParaRPr>
+          </a:p>
+        </p:txBody>
+      </p:sp>
+      <p:sp>
+        <p:nvSpPr>
+          <p:cNvPr id="43" name="Rectangle 222">
+            <a:extLst>
+              <a:ext uri="{FF2B5EF4-FFF2-40B4-BE49-F238E27FC236}">
+                <a16:creationId xmlns:a16="http://schemas.microsoft.com/office/drawing/2014/main" id="{50C83AE5-24F4-4541-9E02-56673D7630BA}"/>
+              </a:ext>
+            </a:extLst>
+          </p:cNvPr>
+          <p:cNvSpPr>
+            <a:spLocks noChangeArrowheads="1"/>
+          </p:cNvSpPr>
+          <p:nvPr/>
+        </p:nvSpPr>
+        <p:spPr bwMode="auto">
+          <a:xfrm>
+            <a:off x="4231443" y="3591935"/>
+            <a:ext cx="1568045" cy="270128"/>
+          </a:xfrm>
+          <a:prstGeom prst="rect">
+            <a:avLst/>
+          </a:prstGeom>
+          <a:solidFill>
+            <a:srgbClr val="ABCD7D"/>
+          </a:solidFill>
+          <a:ln w="12700">
+            <a:solidFill>
+              <a:srgbClr val="000000"/>
+            </a:solidFill>
+            <a:miter lim="800000"/>
+            <a:headEnd/>
+            <a:tailEnd/>
+          </a:ln>
+        </p:spPr>
+        <p:txBody>
+          <a:bodyPr vert="horz" wrap="square" lIns="91440" tIns="45720" rIns="91440" bIns="45720" numCol="1" anchor="ctr" anchorCtr="0" compatLnSpc="1">
+            <a:prstTxWarp prst="textNoShape">
+              <a:avLst/>
+            </a:prstTxWarp>
+          </a:bodyPr>
+          <a:lstStyle/>
+          <a:p>
+            <a:pPr algn="ctr"/>
+            <a:r>
+              <a:rPr lang="en-US" altLang="zh-CN" sz="900" dirty="0">
+                <a:latin typeface="微软雅黑" panose="020B0503020204020204" pitchFamily="34" charset="-122"/>
+                <a:ea typeface="微软雅黑" panose="020B0503020204020204" pitchFamily="34" charset="-122"/>
+              </a:rPr>
+              <a:t>7s preceding</a:t>
+            </a:r>
+            <a:endParaRPr lang="zh-CN" altLang="en-US" sz="900" dirty="0">
+              <a:latin typeface="微软雅黑" panose="020B0503020204020204" pitchFamily="34" charset="-122"/>
+              <a:ea typeface="微软雅黑" panose="020B0503020204020204" pitchFamily="34" charset="-122"/>
+            </a:endParaRPr>
+          </a:p>
+        </p:txBody>
+      </p:sp>
+      <p:sp>
+        <p:nvSpPr>
+          <p:cNvPr id="44" name="Rectangle 223">
+            <a:extLst>
+              <a:ext uri="{FF2B5EF4-FFF2-40B4-BE49-F238E27FC236}">
+                <a16:creationId xmlns:a16="http://schemas.microsoft.com/office/drawing/2014/main" id="{96457E75-64E3-4D35-A365-BD9CC5929E52}"/>
+              </a:ext>
+            </a:extLst>
+          </p:cNvPr>
+          <p:cNvSpPr>
+            <a:spLocks noChangeArrowheads="1"/>
+          </p:cNvSpPr>
+          <p:nvPr/>
+        </p:nvSpPr>
+        <p:spPr bwMode="auto">
+          <a:xfrm>
+            <a:off x="3855900" y="3862063"/>
+            <a:ext cx="375543" cy="276715"/>
+          </a:xfrm>
+          <a:prstGeom prst="rect">
+            <a:avLst/>
+          </a:prstGeom>
+          <a:solidFill>
+            <a:srgbClr val="ABCD7D"/>
+          </a:solidFill>
+          <a:ln w="12700">
+            <a:solidFill>
+              <a:srgbClr val="000000"/>
+            </a:solidFill>
+            <a:miter lim="800000"/>
+            <a:headEnd/>
+            <a:tailEnd/>
+          </a:ln>
+        </p:spPr>
+        <p:txBody>
+          <a:bodyPr vert="horz" wrap="square" lIns="91440" tIns="45720" rIns="91440" bIns="45720" numCol="1" anchor="ctr" anchorCtr="0" compatLnSpc="1">
+            <a:prstTxWarp prst="textNoShape">
+              <a:avLst/>
+            </a:prstTxWarp>
+          </a:bodyPr>
+          <a:lstStyle/>
+          <a:p>
+            <a:pPr algn="ctr"/>
+            <a:r>
+              <a:rPr lang="en-US" altLang="zh-CN" sz="900" dirty="0">
+                <a:latin typeface="微软雅黑" panose="020B0503020204020204" pitchFamily="34" charset="-122"/>
+                <a:ea typeface="微软雅黑" panose="020B0503020204020204" pitchFamily="34" charset="-122"/>
+              </a:rPr>
+              <a:t>10s</a:t>
+            </a:r>
+            <a:endParaRPr lang="zh-CN" altLang="en-US" sz="900" dirty="0">
+              <a:latin typeface="微软雅黑" panose="020B0503020204020204" pitchFamily="34" charset="-122"/>
+              <a:ea typeface="微软雅黑" panose="020B0503020204020204" pitchFamily="34" charset="-122"/>
+            </a:endParaRPr>
+          </a:p>
+        </p:txBody>
+      </p:sp>
+      <p:sp>
+        <p:nvSpPr>
+          <p:cNvPr id="45" name="Rectangle 224">
+            <a:extLst>
+              <a:ext uri="{FF2B5EF4-FFF2-40B4-BE49-F238E27FC236}">
+                <a16:creationId xmlns:a16="http://schemas.microsoft.com/office/drawing/2014/main" id="{8E5579A4-7DC5-4061-9117-2141C1F10689}"/>
+              </a:ext>
+            </a:extLst>
+          </p:cNvPr>
+          <p:cNvSpPr>
+            <a:spLocks noChangeArrowheads="1"/>
+          </p:cNvSpPr>
+          <p:nvPr/>
+        </p:nvSpPr>
+        <p:spPr bwMode="auto">
+          <a:xfrm>
+            <a:off x="4231443" y="3862063"/>
+            <a:ext cx="1568045" cy="276715"/>
+          </a:xfrm>
+          <a:prstGeom prst="rect">
+            <a:avLst/>
+          </a:prstGeom>
+          <a:solidFill>
+            <a:srgbClr val="ABCD7D"/>
+          </a:solidFill>
+          <a:ln w="12700">
+            <a:solidFill>
+              <a:srgbClr val="000000"/>
+            </a:solidFill>
+            <a:miter lim="800000"/>
+            <a:headEnd/>
+            <a:tailEnd/>
+          </a:ln>
+        </p:spPr>
+        <p:txBody>
+          <a:bodyPr vert="horz" wrap="square" lIns="91440" tIns="45720" rIns="91440" bIns="45720" numCol="1" anchor="ctr" anchorCtr="0" compatLnSpc="1">
+            <a:prstTxWarp prst="textNoShape">
+              <a:avLst/>
+            </a:prstTxWarp>
+          </a:bodyPr>
+          <a:lstStyle/>
+          <a:p>
+            <a:pPr algn="ctr"/>
+            <a:r>
+              <a:rPr lang="en-US" altLang="zh-CN" sz="900" dirty="0">
+                <a:latin typeface="微软雅黑" panose="020B0503020204020204" pitchFamily="34" charset="-122"/>
+                <a:ea typeface="微软雅黑" panose="020B0503020204020204" pitchFamily="34" charset="-122"/>
+              </a:rPr>
+              <a:t>5s preceding</a:t>
+            </a:r>
+            <a:endParaRPr lang="zh-CN" altLang="en-US" sz="900" dirty="0">
+              <a:latin typeface="微软雅黑" panose="020B0503020204020204" pitchFamily="34" charset="-122"/>
+              <a:ea typeface="微软雅黑" panose="020B0503020204020204" pitchFamily="34" charset="-122"/>
+            </a:endParaRPr>
+          </a:p>
+        </p:txBody>
+      </p:sp>
+      <p:sp>
+        <p:nvSpPr>
+          <p:cNvPr id="46" name="Rectangle 225">
+            <a:extLst>
+              <a:ext uri="{FF2B5EF4-FFF2-40B4-BE49-F238E27FC236}">
+                <a16:creationId xmlns:a16="http://schemas.microsoft.com/office/drawing/2014/main" id="{ACCE613F-BED7-4630-9548-58C79468AD31}"/>
+              </a:ext>
+            </a:extLst>
+          </p:cNvPr>
+          <p:cNvSpPr>
+            <a:spLocks noChangeArrowheads="1"/>
+          </p:cNvSpPr>
+          <p:nvPr/>
+        </p:nvSpPr>
+        <p:spPr bwMode="auto">
+          <a:xfrm>
+            <a:off x="3855900" y="4138777"/>
+            <a:ext cx="375543" cy="276715"/>
+          </a:xfrm>
+          <a:prstGeom prst="rect">
+            <a:avLst/>
+          </a:prstGeom>
+          <a:solidFill>
+            <a:srgbClr val="ABCD7D"/>
+          </a:solidFill>
+          <a:ln w="12700">
+            <a:solidFill>
+              <a:srgbClr val="000000"/>
+            </a:solidFill>
+            <a:miter lim="800000"/>
+            <a:headEnd/>
+            <a:tailEnd/>
+          </a:ln>
+        </p:spPr>
+        <p:txBody>
+          <a:bodyPr vert="horz" wrap="square" lIns="91440" tIns="45720" rIns="91440" bIns="45720" numCol="1" anchor="ctr" anchorCtr="0" compatLnSpc="1">
+            <a:prstTxWarp prst="textNoShape">
+              <a:avLst/>
+            </a:prstTxWarp>
+          </a:bodyPr>
+          <a:lstStyle/>
+          <a:p>
+            <a:pPr algn="ctr"/>
+            <a:r>
+              <a:rPr lang="en-US" altLang="zh-CN" sz="900" dirty="0">
+                <a:latin typeface="微软雅黑" panose="020B0503020204020204" pitchFamily="34" charset="-122"/>
+                <a:ea typeface="微软雅黑" panose="020B0503020204020204" pitchFamily="34" charset="-122"/>
+              </a:rPr>
+              <a:t>15s</a:t>
+            </a:r>
+            <a:endParaRPr lang="zh-CN" altLang="en-US" sz="900" dirty="0">
+              <a:latin typeface="微软雅黑" panose="020B0503020204020204" pitchFamily="34" charset="-122"/>
+              <a:ea typeface="微软雅黑" panose="020B0503020204020204" pitchFamily="34" charset="-122"/>
+            </a:endParaRPr>
+          </a:p>
+        </p:txBody>
+      </p:sp>
+      <p:sp>
+        <p:nvSpPr>
+          <p:cNvPr id="47" name="Rectangle 226">
+            <a:extLst>
+              <a:ext uri="{FF2B5EF4-FFF2-40B4-BE49-F238E27FC236}">
+                <a16:creationId xmlns:a16="http://schemas.microsoft.com/office/drawing/2014/main" id="{644A4F69-3AF9-457D-AA1C-A83CFE0A27FB}"/>
+              </a:ext>
+            </a:extLst>
+          </p:cNvPr>
+          <p:cNvSpPr>
+            <a:spLocks noChangeArrowheads="1"/>
+          </p:cNvSpPr>
+          <p:nvPr/>
+        </p:nvSpPr>
+        <p:spPr bwMode="auto">
+          <a:xfrm>
+            <a:off x="4231443" y="4138777"/>
+            <a:ext cx="1568045" cy="276715"/>
+          </a:xfrm>
+          <a:prstGeom prst="rect">
+            <a:avLst/>
+          </a:prstGeom>
+          <a:solidFill>
+            <a:srgbClr val="ABCD7D"/>
+          </a:solidFill>
+          <a:ln w="12700">
+            <a:solidFill>
+              <a:srgbClr val="000000"/>
+            </a:solidFill>
+            <a:miter lim="800000"/>
+            <a:headEnd/>
+            <a:tailEnd/>
+          </a:ln>
+        </p:spPr>
+        <p:txBody>
+          <a:bodyPr vert="horz" wrap="square" lIns="91440" tIns="45720" rIns="91440" bIns="45720" numCol="1" anchor="ctr" anchorCtr="0" compatLnSpc="1">
+            <a:prstTxWarp prst="textNoShape">
+              <a:avLst/>
+            </a:prstTxWarp>
+          </a:bodyPr>
+          <a:lstStyle/>
+          <a:p>
+            <a:pPr algn="ctr"/>
+            <a:r>
+              <a:rPr lang="en-US" altLang="zh-CN" sz="900" dirty="0">
+                <a:latin typeface="微软雅黑" panose="020B0503020204020204" pitchFamily="34" charset="-122"/>
+                <a:ea typeface="微软雅黑" panose="020B0503020204020204" pitchFamily="34" charset="-122"/>
+              </a:rPr>
+              <a:t>0s preceding</a:t>
+            </a:r>
+            <a:endParaRPr lang="zh-CN" altLang="en-US" sz="900" dirty="0">
+              <a:latin typeface="微软雅黑" panose="020B0503020204020204" pitchFamily="34" charset="-122"/>
+              <a:ea typeface="微软雅黑" panose="020B0503020204020204" pitchFamily="34" charset="-122"/>
+            </a:endParaRPr>
+          </a:p>
+        </p:txBody>
+      </p:sp>
+      <p:sp>
+        <p:nvSpPr>
+          <p:cNvPr id="48" name="Rectangle 227">
+            <a:extLst>
+              <a:ext uri="{FF2B5EF4-FFF2-40B4-BE49-F238E27FC236}">
+                <a16:creationId xmlns:a16="http://schemas.microsoft.com/office/drawing/2014/main" id="{9BE79482-5098-4B8B-AD3E-2F7D6BAE12A7}"/>
+              </a:ext>
+            </a:extLst>
+          </p:cNvPr>
+          <p:cNvSpPr>
+            <a:spLocks noChangeArrowheads="1"/>
+          </p:cNvSpPr>
+          <p:nvPr/>
+        </p:nvSpPr>
+        <p:spPr bwMode="auto">
+          <a:xfrm>
+            <a:off x="3855900" y="4415491"/>
+            <a:ext cx="375543" cy="270128"/>
+          </a:xfrm>
+          <a:prstGeom prst="rect">
+            <a:avLst/>
+          </a:prstGeom>
+          <a:solidFill>
+            <a:srgbClr val="ABCD7D"/>
+          </a:solidFill>
+          <a:ln w="12700">
+            <a:solidFill>
+              <a:srgbClr val="000000"/>
+            </a:solidFill>
+            <a:miter lim="800000"/>
+            <a:headEnd/>
+            <a:tailEnd/>
+          </a:ln>
+        </p:spPr>
+        <p:txBody>
+          <a:bodyPr vert="horz" wrap="square" lIns="91440" tIns="45720" rIns="91440" bIns="45720" numCol="1" anchor="ctr" anchorCtr="0" compatLnSpc="1">
+            <a:prstTxWarp prst="textNoShape">
+              <a:avLst/>
+            </a:prstTxWarp>
+          </a:bodyPr>
+          <a:lstStyle/>
+          <a:p>
+            <a:pPr algn="ctr"/>
+            <a:r>
+              <a:rPr lang="en-US" altLang="zh-CN" sz="900" dirty="0">
+                <a:latin typeface="微软雅黑" panose="020B0503020204020204" pitchFamily="34" charset="-122"/>
+                <a:ea typeface="微软雅黑" panose="020B0503020204020204" pitchFamily="34" charset="-122"/>
+              </a:rPr>
+              <a:t>15s</a:t>
+            </a:r>
+            <a:endParaRPr lang="zh-CN" altLang="en-US" sz="900" dirty="0">
+              <a:latin typeface="微软雅黑" panose="020B0503020204020204" pitchFamily="34" charset="-122"/>
+              <a:ea typeface="微软雅黑" panose="020B0503020204020204" pitchFamily="34" charset="-122"/>
+            </a:endParaRPr>
+          </a:p>
+        </p:txBody>
+      </p:sp>
+      <p:sp>
+        <p:nvSpPr>
+          <p:cNvPr id="49" name="Rectangle 228">
+            <a:extLst>
+              <a:ext uri="{FF2B5EF4-FFF2-40B4-BE49-F238E27FC236}">
+                <a16:creationId xmlns:a16="http://schemas.microsoft.com/office/drawing/2014/main" id="{F1A8BB6F-31D3-4D19-B808-5F94F89D9A8D}"/>
+              </a:ext>
+            </a:extLst>
+          </p:cNvPr>
+          <p:cNvSpPr>
+            <a:spLocks noChangeArrowheads="1"/>
+          </p:cNvSpPr>
+          <p:nvPr/>
+        </p:nvSpPr>
+        <p:spPr bwMode="auto">
+          <a:xfrm>
+            <a:off x="4231443" y="4415491"/>
+            <a:ext cx="1568045" cy="270128"/>
+          </a:xfrm>
+          <a:prstGeom prst="rect">
+            <a:avLst/>
+          </a:prstGeom>
+          <a:solidFill>
+            <a:srgbClr val="ABCD7D"/>
+          </a:solidFill>
+          <a:ln w="12700">
+            <a:solidFill>
+              <a:srgbClr val="000000"/>
+            </a:solidFill>
+            <a:miter lim="800000"/>
+            <a:headEnd/>
+            <a:tailEnd/>
+          </a:ln>
+        </p:spPr>
+        <p:txBody>
+          <a:bodyPr vert="horz" wrap="square" lIns="91440" tIns="45720" rIns="91440" bIns="45720" numCol="1" anchor="ctr" anchorCtr="0" compatLnSpc="1">
+            <a:prstTxWarp prst="textNoShape">
+              <a:avLst/>
+            </a:prstTxWarp>
+          </a:bodyPr>
+          <a:lstStyle/>
+          <a:p>
+            <a:pPr algn="ctr"/>
+            <a:r>
+              <a:rPr lang="en-US" altLang="zh-CN" sz="900" dirty="0">
+                <a:latin typeface="微软雅黑" panose="020B0503020204020204" pitchFamily="34" charset="-122"/>
+                <a:ea typeface="微软雅黑" panose="020B0503020204020204" pitchFamily="34" charset="-122"/>
+              </a:rPr>
+              <a:t>0s preceding</a:t>
+            </a:r>
+            <a:endParaRPr lang="zh-CN" altLang="en-US" sz="900" dirty="0">
+              <a:latin typeface="微软雅黑" panose="020B0503020204020204" pitchFamily="34" charset="-122"/>
+              <a:ea typeface="微软雅黑" panose="020B0503020204020204" pitchFamily="34" charset="-122"/>
+            </a:endParaRPr>
+          </a:p>
+        </p:txBody>
+      </p:sp>
+      <p:sp>
+        <p:nvSpPr>
+          <p:cNvPr id="50" name="Rectangle 229">
+            <a:extLst>
+              <a:ext uri="{FF2B5EF4-FFF2-40B4-BE49-F238E27FC236}">
+                <a16:creationId xmlns:a16="http://schemas.microsoft.com/office/drawing/2014/main" id="{58DF2C70-2433-4F5A-9324-E041C2370D31}"/>
+              </a:ext>
+            </a:extLst>
+          </p:cNvPr>
+          <p:cNvSpPr>
+            <a:spLocks noChangeArrowheads="1"/>
+          </p:cNvSpPr>
+          <p:nvPr/>
+        </p:nvSpPr>
+        <p:spPr bwMode="auto">
+          <a:xfrm>
+            <a:off x="3855900" y="4685616"/>
+            <a:ext cx="375543" cy="276715"/>
+          </a:xfrm>
+          <a:prstGeom prst="rect">
+            <a:avLst/>
+          </a:prstGeom>
+          <a:solidFill>
+            <a:srgbClr val="ABCD7D"/>
+          </a:solidFill>
+          <a:ln w="12700">
+            <a:solidFill>
+              <a:srgbClr val="000000"/>
+            </a:solidFill>
+            <a:miter lim="800000"/>
+            <a:headEnd/>
+            <a:tailEnd/>
+          </a:ln>
+        </p:spPr>
+        <p:txBody>
+          <a:bodyPr vert="horz" wrap="square" lIns="91440" tIns="45720" rIns="91440" bIns="45720" numCol="1" anchor="ctr" anchorCtr="0" compatLnSpc="1">
+            <a:prstTxWarp prst="textNoShape">
+              <a:avLst/>
+            </a:prstTxWarp>
+          </a:bodyPr>
+          <a:lstStyle/>
+          <a:p>
+            <a:pPr algn="ctr"/>
+            <a:r>
+              <a:rPr lang="en-US" altLang="zh-CN" sz="900" dirty="0">
+                <a:latin typeface="微软雅黑" panose="020B0503020204020204" pitchFamily="34" charset="-122"/>
+                <a:ea typeface="微软雅黑" panose="020B0503020204020204" pitchFamily="34" charset="-122"/>
+              </a:rPr>
+              <a:t>15s</a:t>
+            </a:r>
+            <a:endParaRPr lang="zh-CN" altLang="en-US" sz="900" dirty="0">
+              <a:latin typeface="微软雅黑" panose="020B0503020204020204" pitchFamily="34" charset="-122"/>
+              <a:ea typeface="微软雅黑" panose="020B0503020204020204" pitchFamily="34" charset="-122"/>
+            </a:endParaRPr>
+          </a:p>
+        </p:txBody>
+      </p:sp>
+      <p:sp>
+        <p:nvSpPr>
+          <p:cNvPr id="51" name="Rectangle 230">
+            <a:extLst>
+              <a:ext uri="{FF2B5EF4-FFF2-40B4-BE49-F238E27FC236}">
+                <a16:creationId xmlns:a16="http://schemas.microsoft.com/office/drawing/2014/main" id="{3DF79AC1-3145-40E8-B809-93EC3D6C19E8}"/>
+              </a:ext>
+            </a:extLst>
+          </p:cNvPr>
+          <p:cNvSpPr>
+            <a:spLocks noChangeArrowheads="1"/>
+          </p:cNvSpPr>
+          <p:nvPr/>
+        </p:nvSpPr>
+        <p:spPr bwMode="auto">
+          <a:xfrm>
+            <a:off x="4231443" y="4685616"/>
+            <a:ext cx="1568045" cy="276715"/>
+          </a:xfrm>
+          <a:prstGeom prst="rect">
+            <a:avLst/>
+          </a:prstGeom>
+          <a:solidFill>
+            <a:srgbClr val="ABCD7D"/>
+          </a:solidFill>
+          <a:ln w="12700">
+            <a:solidFill>
+              <a:srgbClr val="000000"/>
+            </a:solidFill>
+            <a:miter lim="800000"/>
+            <a:headEnd/>
+            <a:tailEnd/>
+          </a:ln>
+        </p:spPr>
+        <p:txBody>
+          <a:bodyPr vert="horz" wrap="square" lIns="91440" tIns="45720" rIns="91440" bIns="45720" numCol="1" anchor="ctr" anchorCtr="0" compatLnSpc="1">
+            <a:prstTxWarp prst="textNoShape">
+              <a:avLst/>
+            </a:prstTxWarp>
+          </a:bodyPr>
+          <a:lstStyle/>
+          <a:p>
+            <a:pPr algn="ctr"/>
+            <a:r>
+              <a:rPr lang="en-US" altLang="zh-CN" sz="900">
+                <a:latin typeface="微软雅黑" panose="020B0503020204020204" pitchFamily="34" charset="-122"/>
+                <a:ea typeface="微软雅黑" panose="020B0503020204020204" pitchFamily="34" charset="-122"/>
+              </a:rPr>
+              <a:t>curernt row</a:t>
+            </a:r>
+            <a:endParaRPr lang="zh-CN" altLang="en-US" sz="900">
+              <a:latin typeface="微软雅黑" panose="020B0503020204020204" pitchFamily="34" charset="-122"/>
+              <a:ea typeface="微软雅黑" panose="020B0503020204020204" pitchFamily="34" charset="-122"/>
+            </a:endParaRPr>
+          </a:p>
+        </p:txBody>
+      </p:sp>
+      <p:sp>
+        <p:nvSpPr>
+          <p:cNvPr id="52" name="Rectangle 231">
+            <a:extLst>
+              <a:ext uri="{FF2B5EF4-FFF2-40B4-BE49-F238E27FC236}">
+                <a16:creationId xmlns:a16="http://schemas.microsoft.com/office/drawing/2014/main" id="{FC1B1399-A7E5-4DD7-BCD5-8633B7765F89}"/>
+              </a:ext>
+            </a:extLst>
+          </p:cNvPr>
+          <p:cNvSpPr>
+            <a:spLocks noChangeArrowheads="1"/>
+          </p:cNvSpPr>
+          <p:nvPr/>
+        </p:nvSpPr>
+        <p:spPr bwMode="auto">
+          <a:xfrm>
+            <a:off x="6820693" y="4171718"/>
+            <a:ext cx="401896" cy="276715"/>
+          </a:xfrm>
+          <a:prstGeom prst="rect">
+            <a:avLst/>
+          </a:prstGeom>
+          <a:solidFill>
+            <a:srgbClr val="ABCD7D"/>
+          </a:solidFill>
+          <a:ln w="12700">
+            <a:solidFill>
+              <a:srgbClr val="000000"/>
+            </a:solidFill>
+            <a:miter lim="800000"/>
+            <a:headEnd/>
+            <a:tailEnd/>
+          </a:ln>
+        </p:spPr>
+        <p:txBody>
+          <a:bodyPr vert="horz" wrap="square" lIns="91440" tIns="45720" rIns="91440" bIns="45720" numCol="1" anchor="ctr" anchorCtr="0" compatLnSpc="1">
+            <a:prstTxWarp prst="textNoShape">
+              <a:avLst/>
+            </a:prstTxWarp>
+          </a:bodyPr>
+          <a:lstStyle/>
+          <a:p>
+            <a:pPr algn="ctr"/>
+            <a:r>
+              <a:rPr lang="en-US" altLang="zh-CN" sz="900" dirty="0">
+                <a:latin typeface="微软雅黑" panose="020B0503020204020204" pitchFamily="34" charset="-122"/>
+                <a:ea typeface="微软雅黑" panose="020B0503020204020204" pitchFamily="34" charset="-122"/>
+              </a:rPr>
+              <a:t>15s</a:t>
+            </a:r>
+            <a:endParaRPr lang="zh-CN" altLang="en-US" sz="900" dirty="0">
+              <a:latin typeface="微软雅黑" panose="020B0503020204020204" pitchFamily="34" charset="-122"/>
+              <a:ea typeface="微软雅黑" panose="020B0503020204020204" pitchFamily="34" charset="-122"/>
+            </a:endParaRPr>
+          </a:p>
+        </p:txBody>
+      </p:sp>
+      <p:sp>
+        <p:nvSpPr>
+          <p:cNvPr id="53" name="Rectangle 232">
+            <a:extLst>
+              <a:ext uri="{FF2B5EF4-FFF2-40B4-BE49-F238E27FC236}">
+                <a16:creationId xmlns:a16="http://schemas.microsoft.com/office/drawing/2014/main" id="{E3B44994-147E-40CD-92D9-A96E318F2AB2}"/>
+              </a:ext>
+            </a:extLst>
+          </p:cNvPr>
+          <p:cNvSpPr>
+            <a:spLocks noChangeArrowheads="1"/>
+          </p:cNvSpPr>
+          <p:nvPr/>
+        </p:nvSpPr>
+        <p:spPr bwMode="auto">
+          <a:xfrm>
+            <a:off x="7222590" y="4171718"/>
+            <a:ext cx="1633931" cy="276715"/>
+          </a:xfrm>
+          <a:prstGeom prst="rect">
+            <a:avLst/>
+          </a:prstGeom>
+          <a:solidFill>
+            <a:srgbClr val="ABCD7D"/>
+          </a:solidFill>
+          <a:ln w="12700">
+            <a:solidFill>
+              <a:srgbClr val="000000"/>
+            </a:solidFill>
+            <a:miter lim="800000"/>
+            <a:headEnd/>
+            <a:tailEnd/>
+          </a:ln>
+        </p:spPr>
+        <p:txBody>
+          <a:bodyPr vert="horz" wrap="square" lIns="91440" tIns="45720" rIns="91440" bIns="45720" numCol="1" anchor="ctr" anchorCtr="0" compatLnSpc="1">
+            <a:prstTxWarp prst="textNoShape">
+              <a:avLst/>
+            </a:prstTxWarp>
+          </a:bodyPr>
+          <a:lstStyle/>
+          <a:p>
+            <a:pPr algn="ctr"/>
+            <a:r>
+              <a:rPr lang="en-US" altLang="zh-CN" sz="900" dirty="0">
+                <a:latin typeface="微软雅黑" panose="020B0503020204020204" pitchFamily="34" charset="-122"/>
+                <a:ea typeface="微软雅黑" panose="020B0503020204020204" pitchFamily="34" charset="-122"/>
+              </a:rPr>
+              <a:t>0s preceding</a:t>
+            </a:r>
+            <a:endParaRPr lang="zh-CN" altLang="en-US" sz="900" dirty="0">
+              <a:latin typeface="微软雅黑" panose="020B0503020204020204" pitchFamily="34" charset="-122"/>
+              <a:ea typeface="微软雅黑" panose="020B0503020204020204" pitchFamily="34" charset="-122"/>
+            </a:endParaRPr>
+          </a:p>
+        </p:txBody>
+      </p:sp>
+      <p:sp>
+        <p:nvSpPr>
+          <p:cNvPr id="54" name="Rectangle 233">
+            <a:extLst>
+              <a:ext uri="{FF2B5EF4-FFF2-40B4-BE49-F238E27FC236}">
+                <a16:creationId xmlns:a16="http://schemas.microsoft.com/office/drawing/2014/main" id="{22D54B66-7DA8-4AC8-9E0C-D6C8368F4CD4}"/>
+              </a:ext>
+            </a:extLst>
+          </p:cNvPr>
+          <p:cNvSpPr>
+            <a:spLocks noChangeArrowheads="1"/>
+          </p:cNvSpPr>
+          <p:nvPr/>
+        </p:nvSpPr>
+        <p:spPr bwMode="auto">
+          <a:xfrm>
+            <a:off x="6820693" y="4448432"/>
+            <a:ext cx="401896" cy="270128"/>
+          </a:xfrm>
+          <a:prstGeom prst="rect">
+            <a:avLst/>
+          </a:prstGeom>
+          <a:solidFill>
+            <a:srgbClr val="ABCD7D"/>
+          </a:solidFill>
+          <a:ln w="12700">
+            <a:solidFill>
+              <a:srgbClr val="000000"/>
+            </a:solidFill>
+            <a:miter lim="800000"/>
+            <a:headEnd/>
+            <a:tailEnd/>
+          </a:ln>
+        </p:spPr>
+        <p:txBody>
+          <a:bodyPr vert="horz" wrap="square" lIns="91440" tIns="45720" rIns="91440" bIns="45720" numCol="1" anchor="ctr" anchorCtr="0" compatLnSpc="1">
+            <a:prstTxWarp prst="textNoShape">
+              <a:avLst/>
+            </a:prstTxWarp>
+          </a:bodyPr>
+          <a:lstStyle/>
+          <a:p>
+            <a:pPr algn="ctr"/>
+            <a:r>
+              <a:rPr lang="en-US" altLang="zh-CN" sz="900" dirty="0">
+                <a:latin typeface="微软雅黑" panose="020B0503020204020204" pitchFamily="34" charset="-122"/>
+                <a:ea typeface="微软雅黑" panose="020B0503020204020204" pitchFamily="34" charset="-122"/>
+              </a:rPr>
+              <a:t>15s</a:t>
+            </a:r>
+            <a:endParaRPr lang="zh-CN" altLang="en-US" sz="900" dirty="0">
+              <a:latin typeface="微软雅黑" panose="020B0503020204020204" pitchFamily="34" charset="-122"/>
+              <a:ea typeface="微软雅黑" panose="020B0503020204020204" pitchFamily="34" charset="-122"/>
+            </a:endParaRPr>
+          </a:p>
+        </p:txBody>
+      </p:sp>
+      <p:sp>
+        <p:nvSpPr>
+          <p:cNvPr id="55" name="Rectangle 234">
+            <a:extLst>
+              <a:ext uri="{FF2B5EF4-FFF2-40B4-BE49-F238E27FC236}">
+                <a16:creationId xmlns:a16="http://schemas.microsoft.com/office/drawing/2014/main" id="{EB6C8AE6-1AA9-4588-A028-8A790B305AE0}"/>
+              </a:ext>
+            </a:extLst>
+          </p:cNvPr>
+          <p:cNvSpPr>
+            <a:spLocks noChangeArrowheads="1"/>
+          </p:cNvSpPr>
+          <p:nvPr/>
+        </p:nvSpPr>
+        <p:spPr bwMode="auto">
+          <a:xfrm>
+            <a:off x="7222590" y="4448432"/>
+            <a:ext cx="1633931" cy="270128"/>
+          </a:xfrm>
+          <a:prstGeom prst="rect">
+            <a:avLst/>
+          </a:prstGeom>
+          <a:solidFill>
+            <a:srgbClr val="ABCD7D"/>
+          </a:solidFill>
+          <a:ln w="12700">
+            <a:solidFill>
+              <a:srgbClr val="000000"/>
+            </a:solidFill>
+            <a:miter lim="800000"/>
+            <a:headEnd/>
+            <a:tailEnd/>
+          </a:ln>
+        </p:spPr>
+        <p:txBody>
+          <a:bodyPr vert="horz" wrap="square" lIns="91440" tIns="45720" rIns="91440" bIns="45720" numCol="1" anchor="ctr" anchorCtr="0" compatLnSpc="1">
+            <a:prstTxWarp prst="textNoShape">
+              <a:avLst/>
+            </a:prstTxWarp>
+          </a:bodyPr>
+          <a:lstStyle/>
+          <a:p>
+            <a:pPr algn="ctr"/>
+            <a:r>
+              <a:rPr lang="en-US" altLang="zh-CN" sz="900" dirty="0">
+                <a:latin typeface="微软雅黑" panose="020B0503020204020204" pitchFamily="34" charset="-122"/>
+                <a:ea typeface="微软雅黑" panose="020B0503020204020204" pitchFamily="34" charset="-122"/>
+              </a:rPr>
+              <a:t>0s preceding</a:t>
+            </a:r>
+            <a:endParaRPr lang="zh-CN" altLang="en-US" sz="900" dirty="0">
+              <a:latin typeface="微软雅黑" panose="020B0503020204020204" pitchFamily="34" charset="-122"/>
+              <a:ea typeface="微软雅黑" panose="020B0503020204020204" pitchFamily="34" charset="-122"/>
+            </a:endParaRPr>
+          </a:p>
+        </p:txBody>
+      </p:sp>
+      <p:sp>
+        <p:nvSpPr>
+          <p:cNvPr id="56" name="Rectangle 235">
+            <a:extLst>
+              <a:ext uri="{FF2B5EF4-FFF2-40B4-BE49-F238E27FC236}">
+                <a16:creationId xmlns:a16="http://schemas.microsoft.com/office/drawing/2014/main" id="{AC21BC79-829B-458C-8B6D-1EBFFC58F8A2}"/>
+              </a:ext>
+            </a:extLst>
+          </p:cNvPr>
+          <p:cNvSpPr>
+            <a:spLocks noChangeArrowheads="1"/>
+          </p:cNvSpPr>
+          <p:nvPr/>
+        </p:nvSpPr>
+        <p:spPr bwMode="auto">
+          <a:xfrm>
+            <a:off x="6820693" y="4718559"/>
+            <a:ext cx="401896" cy="276715"/>
+          </a:xfrm>
+          <a:prstGeom prst="rect">
+            <a:avLst/>
+          </a:prstGeom>
+          <a:solidFill>
+            <a:srgbClr val="F0CDCC"/>
+          </a:solidFill>
+          <a:ln w="12700">
+            <a:solidFill>
+              <a:srgbClr val="000000"/>
+            </a:solidFill>
+            <a:miter lim="800000"/>
+            <a:headEnd/>
+            <a:tailEnd/>
+          </a:ln>
+        </p:spPr>
+        <p:txBody>
+          <a:bodyPr vert="horz" wrap="square" lIns="91440" tIns="45720" rIns="91440" bIns="45720" numCol="1" anchor="ctr" anchorCtr="0" compatLnSpc="1">
+            <a:prstTxWarp prst="textNoShape">
+              <a:avLst/>
+            </a:prstTxWarp>
+          </a:bodyPr>
+          <a:lstStyle/>
+          <a:p>
+            <a:pPr algn="ctr"/>
+            <a:r>
+              <a:rPr lang="en-US" altLang="zh-CN" sz="900" dirty="0">
+                <a:latin typeface="微软雅黑" panose="020B0503020204020204" pitchFamily="34" charset="-122"/>
+                <a:ea typeface="微软雅黑" panose="020B0503020204020204" pitchFamily="34" charset="-122"/>
+              </a:rPr>
+              <a:t>15s</a:t>
+            </a:r>
+            <a:endParaRPr lang="zh-CN" altLang="en-US" sz="900" dirty="0">
+              <a:latin typeface="微软雅黑" panose="020B0503020204020204" pitchFamily="34" charset="-122"/>
+              <a:ea typeface="微软雅黑" panose="020B0503020204020204" pitchFamily="34" charset="-122"/>
+            </a:endParaRPr>
+          </a:p>
+        </p:txBody>
+      </p:sp>
+      <p:sp>
+        <p:nvSpPr>
+          <p:cNvPr id="57" name="Rectangle 236">
+            <a:extLst>
+              <a:ext uri="{FF2B5EF4-FFF2-40B4-BE49-F238E27FC236}">
+                <a16:creationId xmlns:a16="http://schemas.microsoft.com/office/drawing/2014/main" id="{EF183E22-6950-47EA-8C6E-FB51167C2D8A}"/>
+              </a:ext>
+            </a:extLst>
+          </p:cNvPr>
+          <p:cNvSpPr>
+            <a:spLocks noChangeArrowheads="1"/>
+          </p:cNvSpPr>
+          <p:nvPr/>
+        </p:nvSpPr>
+        <p:spPr bwMode="auto">
+          <a:xfrm>
+            <a:off x="7222590" y="4718559"/>
+            <a:ext cx="1633931" cy="276715"/>
+          </a:xfrm>
+          <a:prstGeom prst="rect">
+            <a:avLst/>
+          </a:prstGeom>
+          <a:solidFill>
+            <a:srgbClr val="F0CDCC"/>
+          </a:solidFill>
+          <a:ln w="12700">
+            <a:solidFill>
+              <a:srgbClr val="000000"/>
+            </a:solidFill>
+            <a:miter lim="800000"/>
+            <a:headEnd/>
+            <a:tailEnd/>
+          </a:ln>
+        </p:spPr>
+        <p:txBody>
+          <a:bodyPr vert="horz" wrap="square" lIns="91440" tIns="45720" rIns="91440" bIns="45720" numCol="1" anchor="ctr" anchorCtr="0" compatLnSpc="1">
+            <a:prstTxWarp prst="textNoShape">
+              <a:avLst/>
+            </a:prstTxWarp>
+          </a:bodyPr>
+          <a:lstStyle/>
+          <a:p>
+            <a:pPr algn="ctr"/>
+            <a:r>
+              <a:rPr lang="en-US" altLang="zh-CN" sz="900">
+                <a:latin typeface="微软雅黑" panose="020B0503020204020204" pitchFamily="34" charset="-122"/>
+                <a:ea typeface="微软雅黑" panose="020B0503020204020204" pitchFamily="34" charset="-122"/>
+              </a:rPr>
+              <a:t>curernt row</a:t>
+            </a:r>
+            <a:endParaRPr lang="zh-CN" altLang="en-US" sz="900">
+              <a:latin typeface="微软雅黑" panose="020B0503020204020204" pitchFamily="34" charset="-122"/>
+              <a:ea typeface="微软雅黑" panose="020B0503020204020204" pitchFamily="34" charset="-122"/>
+            </a:endParaRPr>
+          </a:p>
+        </p:txBody>
+      </p:sp>
+      <p:sp>
+        <p:nvSpPr>
+          <p:cNvPr id="59" name="文本框 58">
+            <a:extLst>
+              <a:ext uri="{FF2B5EF4-FFF2-40B4-BE49-F238E27FC236}">
+                <a16:creationId xmlns:a16="http://schemas.microsoft.com/office/drawing/2014/main" id="{581F1110-D22A-45F7-9D36-6B8D3D00B022}"/>
+              </a:ext>
+            </a:extLst>
+          </p:cNvPr>
+          <p:cNvSpPr txBox="1"/>
+          <p:nvPr/>
+        </p:nvSpPr>
+        <p:spPr>
+          <a:xfrm>
+            <a:off x="3907873" y="1704029"/>
+            <a:ext cx="1839653" cy="356421"/>
+          </a:xfrm>
+          <a:prstGeom prst="rect">
+            <a:avLst/>
+          </a:prstGeom>
+          <a:noFill/>
+        </p:spPr>
+        <p:txBody>
+          <a:bodyPr wrap="none" rtlCol="0" anchor="ctr">
+            <a:spAutoFit/>
+          </a:bodyPr>
+          <a:lstStyle/>
+          <a:p>
+            <a:pPr algn="ctr"/>
+            <a:r>
+              <a:rPr lang="en-US" altLang="zh-CN" sz="900" dirty="0">
+                <a:latin typeface="微软雅黑" panose="020B0503020204020204" pitchFamily="34" charset="-122"/>
+                <a:ea typeface="微软雅黑" panose="020B0503020204020204" pitchFamily="34" charset="-122"/>
+                <a:sym typeface="微软雅黑" panose="020B0503020204020204" pitchFamily="34" charset="-122"/>
+              </a:rPr>
+              <a:t>ROWS_RANGE between</a:t>
+            </a:r>
+          </a:p>
+          <a:p>
+            <a:pPr algn="ctr"/>
+            <a:r>
+              <a:rPr lang="en-US" altLang="zh-CN" sz="900" dirty="0">
+                <a:latin typeface="微软雅黑" panose="020B0503020204020204" pitchFamily="34" charset="-122"/>
+                <a:ea typeface="微软雅黑" panose="020B0503020204020204" pitchFamily="34" charset="-122"/>
+                <a:sym typeface="微软雅黑" panose="020B0503020204020204" pitchFamily="34" charset="-122"/>
+              </a:rPr>
+              <a:t>10s preceding and current row </a:t>
+            </a:r>
+            <a:endParaRPr lang="zh-CN" altLang="en-US" sz="900" dirty="0">
+              <a:latin typeface="微软雅黑" panose="020B0503020204020204" pitchFamily="34" charset="-122"/>
+              <a:ea typeface="微软雅黑" panose="020B0503020204020204" pitchFamily="34" charset="-122"/>
+              <a:sym typeface="微软雅黑" panose="020B0503020204020204" pitchFamily="34" charset="-122"/>
+            </a:endParaRPr>
+          </a:p>
+        </p:txBody>
+      </p:sp>
+      <p:sp>
+        <p:nvSpPr>
+          <p:cNvPr id="60" name="文本框 59">
+            <a:extLst>
+              <a:ext uri="{FF2B5EF4-FFF2-40B4-BE49-F238E27FC236}">
+                <a16:creationId xmlns:a16="http://schemas.microsoft.com/office/drawing/2014/main" id="{44008B91-7622-4098-80C1-71BFF103F37B}"/>
+              </a:ext>
+            </a:extLst>
+          </p:cNvPr>
+          <p:cNvSpPr txBox="1"/>
+          <p:nvPr/>
+        </p:nvSpPr>
+        <p:spPr>
+          <a:xfrm>
+            <a:off x="6885463" y="1628325"/>
+            <a:ext cx="1906292" cy="507831"/>
+          </a:xfrm>
+          <a:prstGeom prst="rect">
+            <a:avLst/>
+          </a:prstGeom>
+          <a:noFill/>
+        </p:spPr>
+        <p:txBody>
+          <a:bodyPr wrap="none" rtlCol="0" anchor="ctr">
+            <a:spAutoFit/>
+          </a:bodyPr>
+          <a:lstStyle/>
+          <a:p>
+            <a:pPr algn="ctr"/>
+            <a:r>
+              <a:rPr lang="en-US" altLang="zh-CN" sz="900" dirty="0">
+                <a:latin typeface="微软雅黑" panose="020B0503020204020204" pitchFamily="34" charset="-122"/>
+                <a:ea typeface="微软雅黑" panose="020B0503020204020204" pitchFamily="34" charset="-122"/>
+                <a:sym typeface="微软雅黑" panose="020B0503020204020204" pitchFamily="34" charset="-122"/>
+              </a:rPr>
+              <a:t>ROWS_RANGE between</a:t>
+            </a:r>
+          </a:p>
+          <a:p>
+            <a:pPr algn="ctr"/>
+            <a:r>
+              <a:rPr lang="en-US" altLang="zh-CN" sz="900" dirty="0">
+                <a:latin typeface="微软雅黑" panose="020B0503020204020204" pitchFamily="34" charset="-122"/>
+                <a:ea typeface="微软雅黑" panose="020B0503020204020204" pitchFamily="34" charset="-122"/>
+                <a:sym typeface="微软雅黑" panose="020B0503020204020204" pitchFamily="34" charset="-122"/>
+              </a:rPr>
+              <a:t>10s preceding and current row </a:t>
+            </a:r>
+          </a:p>
+          <a:p>
+            <a:pPr algn="ctr"/>
+            <a:r>
+              <a:rPr lang="en-US" altLang="zh-CN" sz="900" dirty="0">
+                <a:latin typeface="微软雅黑" panose="020B0503020204020204" pitchFamily="34" charset="-122"/>
+                <a:ea typeface="微软雅黑" panose="020B0503020204020204" pitchFamily="34" charset="-122"/>
+                <a:sym typeface="微软雅黑" panose="020B0503020204020204" pitchFamily="34" charset="-122"/>
+              </a:rPr>
+              <a:t>EXCLUDE CURRENT_ROW</a:t>
+            </a:r>
+            <a:endParaRPr lang="zh-CN" altLang="en-US" sz="900" dirty="0">
+              <a:latin typeface="微软雅黑" panose="020B0503020204020204" pitchFamily="34" charset="-122"/>
+              <a:ea typeface="微软雅黑" panose="020B0503020204020204" pitchFamily="34" charset="-122"/>
+              <a:sym typeface="微软雅黑" panose="020B0503020204020204" pitchFamily="34" charset="-122"/>
+            </a:endParaRPr>
+          </a:p>
+        </p:txBody>
+      </p:sp>
+      <p:sp>
+        <p:nvSpPr>
+          <p:cNvPr id="58" name="Line 112">
+            <a:extLst>
+              <a:ext uri="{FF2B5EF4-FFF2-40B4-BE49-F238E27FC236}">
+                <a16:creationId xmlns:a16="http://schemas.microsoft.com/office/drawing/2014/main" id="{C8FA68F4-3C18-4849-7B0D-48120EDD0748}"/>
+              </a:ext>
+            </a:extLst>
+          </p:cNvPr>
+          <p:cNvSpPr>
+            <a:spLocks noChangeShapeType="1"/>
+          </p:cNvSpPr>
+          <p:nvPr/>
+        </p:nvSpPr>
+        <p:spPr bwMode="auto">
+          <a:xfrm flipH="1" flipV="1">
+            <a:off x="8922058" y="3071452"/>
+            <a:ext cx="6681" cy="1632204"/>
+          </a:xfrm>
+          <a:prstGeom prst="line">
+            <a:avLst/>
+          </a:prstGeom>
+          <a:ln>
+            <a:headEnd type="arrow" w="med" len="med"/>
+            <a:tailEnd type="arrow" w="med" len="med"/>
+          </a:ln>
+          <a:extLst>
+            <a:ext uri="{909E8E84-426E-40DD-AFC4-6F175D3DCCD1}">
+              <a14:hiddenFill xmlns:a14="http://schemas.microsoft.com/office/drawing/2010/main">
+                <a:noFill/>
+              </a14:hiddenFill>
+            </a:ext>
+          </a:extLst>
+        </p:spPr>
+        <p:style>
+          <a:lnRef idx="2">
+            <a:schemeClr val="dk1"/>
+          </a:lnRef>
+          <a:fillRef idx="0">
+            <a:schemeClr val="dk1"/>
+          </a:fillRef>
+          <a:effectRef idx="1">
+            <a:schemeClr val="dk1"/>
+          </a:effectRef>
+          <a:fontRef idx="minor">
+            <a:schemeClr val="tx1"/>
+          </a:fontRef>
+        </p:style>
+        <p:txBody>
+          <a:bodyPr vert="horz" wrap="square" lIns="91440" tIns="45720" rIns="91440" bIns="45720" numCol="1" anchor="ctr" anchorCtr="0" compatLnSpc="1">
+            <a:prstTxWarp prst="textNoShape">
+              <a:avLst/>
+            </a:prstTxWarp>
+          </a:bodyPr>
+          <a:lstStyle/>
+          <a:p>
+            <a:pPr algn="ctr"/>
+            <a:endParaRPr lang="zh-CN" altLang="en-US" sz="900">
+              <a:latin typeface="微软雅黑" panose="020B0503020204020204" pitchFamily="34" charset="-122"/>
+              <a:ea typeface="微软雅黑" panose="020B0503020204020204" pitchFamily="34" charset="-122"/>
+            </a:endParaRPr>
+          </a:p>
+        </p:txBody>
+      </p:sp>
+      <p:sp>
+        <p:nvSpPr>
+          <p:cNvPr id="61" name="文本框 60">
+            <a:extLst>
+              <a:ext uri="{FF2B5EF4-FFF2-40B4-BE49-F238E27FC236}">
+                <a16:creationId xmlns:a16="http://schemas.microsoft.com/office/drawing/2014/main" id="{5F7DDD5A-EA96-16E1-3C8B-4B5D6D498379}"/>
+              </a:ext>
+            </a:extLst>
+          </p:cNvPr>
+          <p:cNvSpPr txBox="1"/>
+          <p:nvPr/>
+        </p:nvSpPr>
+        <p:spPr>
+          <a:xfrm>
+            <a:off x="8994276" y="3779587"/>
+            <a:ext cx="1015996" cy="230832"/>
+          </a:xfrm>
+          <a:prstGeom prst="rect">
+            <a:avLst/>
+          </a:prstGeom>
+          <a:solidFill>
+            <a:schemeClr val="bg1"/>
+          </a:solidFill>
+        </p:spPr>
+        <p:txBody>
+          <a:bodyPr wrap="none" rtlCol="0" anchor="ctr">
+            <a:spAutoFit/>
+          </a:bodyPr>
+          <a:lstStyle/>
+          <a:p>
+            <a:pPr algn="ctr"/>
+            <a:r>
+              <a:rPr lang="en-US" altLang="zh-CN" sz="900" dirty="0">
+                <a:latin typeface="微软雅黑" panose="020B0503020204020204" pitchFamily="34" charset="-122"/>
+                <a:ea typeface="微软雅黑" panose="020B0503020204020204" pitchFamily="34" charset="-122"/>
+                <a:sym typeface="微软雅黑" panose="020B0503020204020204" pitchFamily="34" charset="-122"/>
+              </a:rPr>
+              <a:t>Effective Data</a:t>
+            </a:r>
+            <a:endParaRPr lang="zh-CN" altLang="en-US" sz="900" dirty="0">
+              <a:latin typeface="微软雅黑" panose="020B0503020204020204" pitchFamily="34" charset="-122"/>
+              <a:ea typeface="微软雅黑" panose="020B0503020204020204" pitchFamily="34" charset="-122"/>
+              <a:sym typeface="微软雅黑" panose="020B0503020204020204" pitchFamily="34" charset="-122"/>
+            </a:endParaRPr>
+          </a:p>
+        </p:txBody>
+      </p:sp>
+    </p:spTree>
+    <p:extLst>
+      <p:ext uri="{BB962C8B-B14F-4D97-AF65-F5344CB8AC3E}">
+        <p14:creationId xmlns:p14="http://schemas.microsoft.com/office/powerpoint/2010/main" val="2938959512"/>
+      </p:ext>
+    </p:extLst>
+  </p:cSld>
+  <p:clrMapOvr>
+    <a:masterClrMapping/>
+  </p:clrMapOvr>
+</p:sld>
+</file>
+
+<file path=ppt/slides/slide6.xml><?xml version="1.0" encoding="utf-8"?>
 <p:sld xmlns:a="http://schemas.openxmlformats.org/drawingml/2006/main" xmlns:r="http://schemas.openxmlformats.org/officeDocument/2006/relationships" xmlns:p="http://schemas.openxmlformats.org/presentationml/2006/main">
   <p:cSld>
     <p:spTree>

</xml_diff>

<commit_message>
docs: added images for exclude_current_row in dql/window (#2297)
</commit_message>
<xml_diff>
--- a/docs/zh/reference/sql/dql/images/dql_images.pptx
+++ b/docs/zh/reference/sql/dql/images/dql_images.pptx
@@ -5,14 +5,15 @@
     <p:sldMasterId id="2147483648" r:id="rId1"/>
   </p:sldMasterIdLst>
   <p:notesMasterIdLst>
-    <p:notesMasterId r:id="rId7"/>
+    <p:notesMasterId r:id="rId8"/>
   </p:notesMasterIdLst>
   <p:sldIdLst>
     <p:sldId id="263" r:id="rId2"/>
     <p:sldId id="264" r:id="rId3"/>
     <p:sldId id="265" r:id="rId4"/>
     <p:sldId id="257" r:id="rId5"/>
-    <p:sldId id="266" r:id="rId6"/>
+    <p:sldId id="267" r:id="rId6"/>
+    <p:sldId id="266" r:id="rId7"/>
   </p:sldIdLst>
   <p:sldSz cx="12192000" cy="6858000"/>
   <p:notesSz cx="6858000" cy="9144000"/>
@@ -201,7 +202,7 @@
           <a:p>
             <a:fld id="{97351201-B07B-4AB9-86C5-3A1CFE99DA39}" type="datetimeFigureOut">
               <a:rPr lang="zh-CN" altLang="en-US" smtClean="0"/>
-              <a:t>2022/7/26</a:t>
+              <a:t>2022/8/4</a:t>
             </a:fld>
             <a:endParaRPr lang="zh-CN" altLang="en-US"/>
           </a:p>
@@ -508,7 +509,7 @@
           <a:p>
             <a:fld id="{EFFE7D04-47E2-4784-B5F9-3CCCC4CE3F05}" type="datetimeFigureOut">
               <a:rPr lang="zh-CN" altLang="en-US" smtClean="0"/>
-              <a:t>2022/7/26</a:t>
+              <a:t>2022/8/4</a:t>
             </a:fld>
             <a:endParaRPr lang="zh-CN" altLang="en-US"/>
           </a:p>
@@ -749,7 +750,7 @@
           <a:p>
             <a:fld id="{EFFE7D04-47E2-4784-B5F9-3CCCC4CE3F05}" type="datetimeFigureOut">
               <a:rPr lang="zh-CN" altLang="en-US" smtClean="0"/>
-              <a:t>2022/7/26</a:t>
+              <a:t>2022/8/4</a:t>
             </a:fld>
             <a:endParaRPr lang="zh-CN" altLang="en-US"/>
           </a:p>
@@ -17159,6 +17160,2748 @@
 </file>
 
 <file path=ppt/slides/slide5.xml><?xml version="1.0" encoding="utf-8"?>
+<p:sld xmlns:a="http://schemas.openxmlformats.org/drawingml/2006/main" xmlns:r="http://schemas.openxmlformats.org/officeDocument/2006/relationships" xmlns:p="http://schemas.openxmlformats.org/presentationml/2006/main">
+  <p:cSld>
+    <p:spTree>
+      <p:nvGrpSpPr>
+        <p:cNvPr id="1" name=""/>
+        <p:cNvGrpSpPr/>
+        <p:nvPr/>
+      </p:nvGrpSpPr>
+      <p:grpSpPr>
+        <a:xfrm>
+          <a:off x="0" y="0"/>
+          <a:ext cx="0" cy="0"/>
+          <a:chOff x="0" y="0"/>
+          <a:chExt cx="0" cy="0"/>
+        </a:xfrm>
+      </p:grpSpPr>
+      <p:sp>
+        <p:nvSpPr>
+          <p:cNvPr id="16" name="Rectangle 7">
+            <a:extLst>
+              <a:ext uri="{FF2B5EF4-FFF2-40B4-BE49-F238E27FC236}">
+                <a16:creationId xmlns:a16="http://schemas.microsoft.com/office/drawing/2014/main" id="{99079B57-452E-48DC-BE64-CF42D6A722F7}"/>
+              </a:ext>
+            </a:extLst>
+          </p:cNvPr>
+          <p:cNvSpPr>
+            <a:spLocks noChangeArrowheads="1"/>
+          </p:cNvSpPr>
+          <p:nvPr/>
+        </p:nvSpPr>
+        <p:spPr bwMode="auto">
+          <a:xfrm>
+            <a:off x="3855905" y="2208366"/>
+            <a:ext cx="375543" cy="276715"/>
+          </a:xfrm>
+          <a:prstGeom prst="rect">
+            <a:avLst/>
+          </a:prstGeom>
+          <a:noFill/>
+          <a:ln w="12700" cap="flat">
+            <a:solidFill>
+              <a:schemeClr val="tx1"/>
+            </a:solidFill>
+            <a:prstDash val="solid"/>
+            <a:miter lim="800000"/>
+            <a:headEnd/>
+            <a:tailEnd/>
+          </a:ln>
+          <a:extLst>
+            <a:ext uri="{909E8E84-426E-40DD-AFC4-6F175D3DCCD1}">
+              <a14:hiddenFill xmlns:a14="http://schemas.microsoft.com/office/drawing/2010/main">
+                <a:solidFill>
+                  <a:srgbClr val="FFFFFF"/>
+                </a:solidFill>
+              </a14:hiddenFill>
+            </a:ext>
+          </a:extLst>
+        </p:spPr>
+        <p:txBody>
+          <a:bodyPr vert="horz" wrap="square" lIns="91440" tIns="45720" rIns="91440" bIns="45720" numCol="1" anchor="ctr" anchorCtr="0" compatLnSpc="1">
+            <a:prstTxWarp prst="textNoShape">
+              <a:avLst/>
+            </a:prstTxWarp>
+          </a:bodyPr>
+          <a:lstStyle/>
+          <a:p>
+            <a:pPr algn="ctr"/>
+            <a:r>
+              <a:rPr lang="en-US" altLang="zh-CN" sz="900" dirty="0">
+                <a:latin typeface="微软雅黑" panose="020B0503020204020204" pitchFamily="34" charset="-122"/>
+                <a:ea typeface="微软雅黑" panose="020B0503020204020204" pitchFamily="34" charset="-122"/>
+              </a:rPr>
+              <a:t>ts</a:t>
+            </a:r>
+            <a:endParaRPr lang="zh-CN" altLang="en-US" sz="900" dirty="0">
+              <a:latin typeface="微软雅黑" panose="020B0503020204020204" pitchFamily="34" charset="-122"/>
+              <a:ea typeface="微软雅黑" panose="020B0503020204020204" pitchFamily="34" charset="-122"/>
+            </a:endParaRPr>
+          </a:p>
+        </p:txBody>
+      </p:sp>
+      <p:sp>
+        <p:nvSpPr>
+          <p:cNvPr id="17" name="Rectangle 8">
+            <a:extLst>
+              <a:ext uri="{FF2B5EF4-FFF2-40B4-BE49-F238E27FC236}">
+                <a16:creationId xmlns:a16="http://schemas.microsoft.com/office/drawing/2014/main" id="{23ECAE6C-D14A-497D-8AEF-FCDC303477DE}"/>
+              </a:ext>
+            </a:extLst>
+          </p:cNvPr>
+          <p:cNvSpPr>
+            <a:spLocks noChangeArrowheads="1"/>
+          </p:cNvSpPr>
+          <p:nvPr/>
+        </p:nvSpPr>
+        <p:spPr bwMode="auto">
+          <a:xfrm>
+            <a:off x="4231443" y="2208366"/>
+            <a:ext cx="1568045" cy="276715"/>
+          </a:xfrm>
+          <a:prstGeom prst="rect">
+            <a:avLst/>
+          </a:prstGeom>
+          <a:noFill/>
+          <a:ln w="12700" cap="flat">
+            <a:solidFill>
+              <a:schemeClr val="tx1"/>
+            </a:solidFill>
+            <a:prstDash val="solid"/>
+            <a:miter lim="800000"/>
+            <a:headEnd/>
+            <a:tailEnd/>
+          </a:ln>
+          <a:extLst>
+            <a:ext uri="{909E8E84-426E-40DD-AFC4-6F175D3DCCD1}">
+              <a14:hiddenFill xmlns:a14="http://schemas.microsoft.com/office/drawing/2010/main">
+                <a:solidFill>
+                  <a:srgbClr val="FFFFFF"/>
+                </a:solidFill>
+              </a14:hiddenFill>
+            </a:ext>
+          </a:extLst>
+        </p:spPr>
+        <p:txBody>
+          <a:bodyPr vert="horz" wrap="square" lIns="91440" tIns="45720" rIns="91440" bIns="45720" numCol="1" anchor="ctr" anchorCtr="0" compatLnSpc="1">
+            <a:prstTxWarp prst="textNoShape">
+              <a:avLst/>
+            </a:prstTxWarp>
+          </a:bodyPr>
+          <a:lstStyle/>
+          <a:p>
+            <a:pPr algn="ctr"/>
+            <a:endParaRPr lang="zh-CN" altLang="en-US" sz="900">
+              <a:latin typeface="微软雅黑" panose="020B0503020204020204" pitchFamily="34" charset="-122"/>
+              <a:ea typeface="微软雅黑" panose="020B0503020204020204" pitchFamily="34" charset="-122"/>
+            </a:endParaRPr>
+          </a:p>
+        </p:txBody>
+      </p:sp>
+      <p:sp>
+        <p:nvSpPr>
+          <p:cNvPr id="18" name="Rectangle 9">
+            <a:extLst>
+              <a:ext uri="{FF2B5EF4-FFF2-40B4-BE49-F238E27FC236}">
+                <a16:creationId xmlns:a16="http://schemas.microsoft.com/office/drawing/2014/main" id="{65227786-A83F-466C-9691-0D4046870FEA}"/>
+              </a:ext>
+            </a:extLst>
+          </p:cNvPr>
+          <p:cNvSpPr>
+            <a:spLocks noChangeArrowheads="1"/>
+          </p:cNvSpPr>
+          <p:nvPr/>
+        </p:nvSpPr>
+        <p:spPr bwMode="auto">
+          <a:xfrm>
+            <a:off x="3855905" y="2485079"/>
+            <a:ext cx="375543" cy="276715"/>
+          </a:xfrm>
+          <a:prstGeom prst="rect">
+            <a:avLst/>
+          </a:prstGeom>
+          <a:noFill/>
+          <a:ln w="12700" cap="flat">
+            <a:solidFill>
+              <a:schemeClr val="tx1"/>
+            </a:solidFill>
+            <a:prstDash val="solid"/>
+            <a:miter lim="800000"/>
+            <a:headEnd/>
+            <a:tailEnd/>
+          </a:ln>
+          <a:extLst>
+            <a:ext uri="{909E8E84-426E-40DD-AFC4-6F175D3DCCD1}">
+              <a14:hiddenFill xmlns:a14="http://schemas.microsoft.com/office/drawing/2010/main">
+                <a:solidFill>
+                  <a:srgbClr val="FFFFFF"/>
+                </a:solidFill>
+              </a14:hiddenFill>
+            </a:ext>
+          </a:extLst>
+        </p:spPr>
+        <p:txBody>
+          <a:bodyPr vert="horz" wrap="square" lIns="91440" tIns="45720" rIns="91440" bIns="45720" numCol="1" anchor="ctr" anchorCtr="0" compatLnSpc="1">
+            <a:prstTxWarp prst="textNoShape">
+              <a:avLst/>
+            </a:prstTxWarp>
+          </a:bodyPr>
+          <a:lstStyle/>
+          <a:p>
+            <a:pPr algn="ctr"/>
+            <a:r>
+              <a:rPr lang="en-US" altLang="zh-CN" sz="900" dirty="0">
+                <a:latin typeface="微软雅黑" panose="020B0503020204020204" pitchFamily="34" charset="-122"/>
+                <a:ea typeface="微软雅黑" panose="020B0503020204020204" pitchFamily="34" charset="-122"/>
+              </a:rPr>
+              <a:t>0s</a:t>
+            </a:r>
+            <a:endParaRPr lang="zh-CN" altLang="en-US" sz="900" dirty="0">
+              <a:latin typeface="微软雅黑" panose="020B0503020204020204" pitchFamily="34" charset="-122"/>
+              <a:ea typeface="微软雅黑" panose="020B0503020204020204" pitchFamily="34" charset="-122"/>
+            </a:endParaRPr>
+          </a:p>
+        </p:txBody>
+      </p:sp>
+      <p:sp>
+        <p:nvSpPr>
+          <p:cNvPr id="19" name="Rectangle 10">
+            <a:extLst>
+              <a:ext uri="{FF2B5EF4-FFF2-40B4-BE49-F238E27FC236}">
+                <a16:creationId xmlns:a16="http://schemas.microsoft.com/office/drawing/2014/main" id="{A583A3ED-17AA-493B-B1AC-E71BFDE2B921}"/>
+              </a:ext>
+            </a:extLst>
+          </p:cNvPr>
+          <p:cNvSpPr>
+            <a:spLocks noChangeArrowheads="1"/>
+          </p:cNvSpPr>
+          <p:nvPr/>
+        </p:nvSpPr>
+        <p:spPr bwMode="auto">
+          <a:xfrm>
+            <a:off x="4231443" y="2485079"/>
+            <a:ext cx="1568045" cy="276715"/>
+          </a:xfrm>
+          <a:prstGeom prst="rect">
+            <a:avLst/>
+          </a:prstGeom>
+          <a:noFill/>
+          <a:ln w="12700" cap="flat">
+            <a:solidFill>
+              <a:schemeClr val="tx1"/>
+            </a:solidFill>
+            <a:prstDash val="solid"/>
+            <a:miter lim="800000"/>
+            <a:headEnd/>
+            <a:tailEnd/>
+          </a:ln>
+          <a:extLst>
+            <a:ext uri="{909E8E84-426E-40DD-AFC4-6F175D3DCCD1}">
+              <a14:hiddenFill xmlns:a14="http://schemas.microsoft.com/office/drawing/2010/main">
+                <a:solidFill>
+                  <a:srgbClr val="FFFFFF"/>
+                </a:solidFill>
+              </a14:hiddenFill>
+            </a:ext>
+          </a:extLst>
+        </p:spPr>
+        <p:txBody>
+          <a:bodyPr vert="horz" wrap="square" lIns="91440" tIns="45720" rIns="91440" bIns="45720" numCol="1" anchor="ctr" anchorCtr="0" compatLnSpc="1">
+            <a:prstTxWarp prst="textNoShape">
+              <a:avLst/>
+            </a:prstTxWarp>
+          </a:bodyPr>
+          <a:lstStyle/>
+          <a:p>
+            <a:pPr algn="ctr"/>
+            <a:r>
+              <a:rPr lang="en-US" altLang="zh-CN" sz="900">
+                <a:latin typeface="微软雅黑" panose="020B0503020204020204" pitchFamily="34" charset="-122"/>
+                <a:ea typeface="微软雅黑" panose="020B0503020204020204" pitchFamily="34" charset="-122"/>
+              </a:rPr>
+              <a:t>15s preceding</a:t>
+            </a:r>
+            <a:endParaRPr lang="zh-CN" altLang="en-US" sz="900">
+              <a:latin typeface="微软雅黑" panose="020B0503020204020204" pitchFamily="34" charset="-122"/>
+              <a:ea typeface="微软雅黑" panose="020B0503020204020204" pitchFamily="34" charset="-122"/>
+            </a:endParaRPr>
+          </a:p>
+        </p:txBody>
+      </p:sp>
+      <p:sp>
+        <p:nvSpPr>
+          <p:cNvPr id="20" name="Rectangle 11">
+            <a:extLst>
+              <a:ext uri="{FF2B5EF4-FFF2-40B4-BE49-F238E27FC236}">
+                <a16:creationId xmlns:a16="http://schemas.microsoft.com/office/drawing/2014/main" id="{BF580139-6B98-4B16-BF7A-3D360A333E09}"/>
+              </a:ext>
+            </a:extLst>
+          </p:cNvPr>
+          <p:cNvSpPr>
+            <a:spLocks noChangeArrowheads="1"/>
+          </p:cNvSpPr>
+          <p:nvPr/>
+        </p:nvSpPr>
+        <p:spPr bwMode="auto">
+          <a:xfrm>
+            <a:off x="3855905" y="2761793"/>
+            <a:ext cx="375543" cy="276715"/>
+          </a:xfrm>
+          <a:prstGeom prst="rect">
+            <a:avLst/>
+          </a:prstGeom>
+          <a:noFill/>
+          <a:ln w="12700" cap="flat">
+            <a:solidFill>
+              <a:schemeClr val="tx1"/>
+            </a:solidFill>
+            <a:prstDash val="solid"/>
+            <a:miter lim="800000"/>
+            <a:headEnd/>
+            <a:tailEnd/>
+          </a:ln>
+          <a:extLst>
+            <a:ext uri="{909E8E84-426E-40DD-AFC4-6F175D3DCCD1}">
+              <a14:hiddenFill xmlns:a14="http://schemas.microsoft.com/office/drawing/2010/main">
+                <a:solidFill>
+                  <a:srgbClr val="FFFFFF"/>
+                </a:solidFill>
+              </a14:hiddenFill>
+            </a:ext>
+          </a:extLst>
+        </p:spPr>
+        <p:txBody>
+          <a:bodyPr vert="horz" wrap="square" lIns="91440" tIns="45720" rIns="91440" bIns="45720" numCol="1" anchor="ctr" anchorCtr="0" compatLnSpc="1">
+            <a:prstTxWarp prst="textNoShape">
+              <a:avLst/>
+            </a:prstTxWarp>
+          </a:bodyPr>
+          <a:lstStyle/>
+          <a:p>
+            <a:pPr algn="ctr"/>
+            <a:r>
+              <a:rPr lang="en-US" altLang="zh-CN" sz="900" dirty="0">
+                <a:latin typeface="微软雅黑" panose="020B0503020204020204" pitchFamily="34" charset="-122"/>
+                <a:ea typeface="微软雅黑" panose="020B0503020204020204" pitchFamily="34" charset="-122"/>
+              </a:rPr>
+              <a:t>1s</a:t>
+            </a:r>
+            <a:endParaRPr lang="zh-CN" altLang="en-US" sz="900" dirty="0">
+              <a:latin typeface="微软雅黑" panose="020B0503020204020204" pitchFamily="34" charset="-122"/>
+              <a:ea typeface="微软雅黑" panose="020B0503020204020204" pitchFamily="34" charset="-122"/>
+            </a:endParaRPr>
+          </a:p>
+        </p:txBody>
+      </p:sp>
+      <p:sp>
+        <p:nvSpPr>
+          <p:cNvPr id="21" name="Rectangle 12">
+            <a:extLst>
+              <a:ext uri="{FF2B5EF4-FFF2-40B4-BE49-F238E27FC236}">
+                <a16:creationId xmlns:a16="http://schemas.microsoft.com/office/drawing/2014/main" id="{05F0F34E-C849-4FDE-961A-0F5BF749FEC5}"/>
+              </a:ext>
+            </a:extLst>
+          </p:cNvPr>
+          <p:cNvSpPr>
+            <a:spLocks noChangeArrowheads="1"/>
+          </p:cNvSpPr>
+          <p:nvPr/>
+        </p:nvSpPr>
+        <p:spPr bwMode="auto">
+          <a:xfrm>
+            <a:off x="4231443" y="2761793"/>
+            <a:ext cx="1568045" cy="276715"/>
+          </a:xfrm>
+          <a:prstGeom prst="rect">
+            <a:avLst/>
+          </a:prstGeom>
+          <a:noFill/>
+          <a:ln w="12700" cap="flat">
+            <a:solidFill>
+              <a:schemeClr val="tx1"/>
+            </a:solidFill>
+            <a:prstDash val="solid"/>
+            <a:miter lim="800000"/>
+            <a:headEnd/>
+            <a:tailEnd/>
+          </a:ln>
+          <a:extLst>
+            <a:ext uri="{909E8E84-426E-40DD-AFC4-6F175D3DCCD1}">
+              <a14:hiddenFill xmlns:a14="http://schemas.microsoft.com/office/drawing/2010/main">
+                <a:solidFill>
+                  <a:srgbClr val="FFFFFF"/>
+                </a:solidFill>
+              </a14:hiddenFill>
+            </a:ext>
+          </a:extLst>
+        </p:spPr>
+        <p:txBody>
+          <a:bodyPr vert="horz" wrap="square" lIns="91440" tIns="45720" rIns="91440" bIns="45720" numCol="1" anchor="ctr" anchorCtr="0" compatLnSpc="1">
+            <a:prstTxWarp prst="textNoShape">
+              <a:avLst/>
+            </a:prstTxWarp>
+          </a:bodyPr>
+          <a:lstStyle/>
+          <a:p>
+            <a:pPr algn="ctr"/>
+            <a:r>
+              <a:rPr lang="en-US" altLang="zh-CN" sz="900">
+                <a:latin typeface="微软雅黑" panose="020B0503020204020204" pitchFamily="34" charset="-122"/>
+                <a:ea typeface="微软雅黑" panose="020B0503020204020204" pitchFamily="34" charset="-122"/>
+              </a:rPr>
+              <a:t>14s preceding</a:t>
+            </a:r>
+            <a:endParaRPr lang="zh-CN" altLang="en-US" sz="900">
+              <a:latin typeface="微软雅黑" panose="020B0503020204020204" pitchFamily="34" charset="-122"/>
+              <a:ea typeface="微软雅黑" panose="020B0503020204020204" pitchFamily="34" charset="-122"/>
+            </a:endParaRPr>
+          </a:p>
+        </p:txBody>
+      </p:sp>
+      <p:sp>
+        <p:nvSpPr>
+          <p:cNvPr id="22" name="Rectangle 39">
+            <a:extLst>
+              <a:ext uri="{FF2B5EF4-FFF2-40B4-BE49-F238E27FC236}">
+                <a16:creationId xmlns:a16="http://schemas.microsoft.com/office/drawing/2014/main" id="{B72E159F-086D-45BC-9425-23C81D2F77B6}"/>
+              </a:ext>
+            </a:extLst>
+          </p:cNvPr>
+          <p:cNvSpPr>
+            <a:spLocks noChangeArrowheads="1"/>
+          </p:cNvSpPr>
+          <p:nvPr/>
+        </p:nvSpPr>
+        <p:spPr bwMode="auto">
+          <a:xfrm>
+            <a:off x="3645075" y="1556113"/>
+            <a:ext cx="2365248" cy="3557752"/>
+          </a:xfrm>
+          <a:prstGeom prst="rect">
+            <a:avLst/>
+          </a:prstGeom>
+          <a:noFill/>
+          <a:ln w="12700" cap="flat">
+            <a:solidFill>
+              <a:schemeClr val="tx1"/>
+            </a:solidFill>
+            <a:prstDash val="solid"/>
+            <a:miter lim="800000"/>
+            <a:headEnd/>
+            <a:tailEnd/>
+          </a:ln>
+          <a:extLst>
+            <a:ext uri="{909E8E84-426E-40DD-AFC4-6F175D3DCCD1}">
+              <a14:hiddenFill xmlns:a14="http://schemas.microsoft.com/office/drawing/2010/main">
+                <a:solidFill>
+                  <a:srgbClr val="FFFFFF"/>
+                </a:solidFill>
+              </a14:hiddenFill>
+            </a:ext>
+          </a:extLst>
+        </p:spPr>
+        <p:txBody>
+          <a:bodyPr vert="horz" wrap="square" lIns="91440" tIns="45720" rIns="91440" bIns="45720" numCol="1" anchor="ctr" anchorCtr="0" compatLnSpc="1">
+            <a:prstTxWarp prst="textNoShape">
+              <a:avLst/>
+            </a:prstTxWarp>
+          </a:bodyPr>
+          <a:lstStyle/>
+          <a:p>
+            <a:pPr algn="ctr"/>
+            <a:endParaRPr lang="zh-CN" altLang="en-US" sz="900">
+              <a:latin typeface="微软雅黑" panose="020B0503020204020204" pitchFamily="34" charset="-122"/>
+              <a:ea typeface="微软雅黑" panose="020B0503020204020204" pitchFamily="34" charset="-122"/>
+            </a:endParaRPr>
+          </a:p>
+        </p:txBody>
+      </p:sp>
+      <p:sp>
+        <p:nvSpPr>
+          <p:cNvPr id="23" name="Rectangle 40">
+            <a:extLst>
+              <a:ext uri="{FF2B5EF4-FFF2-40B4-BE49-F238E27FC236}">
+                <a16:creationId xmlns:a16="http://schemas.microsoft.com/office/drawing/2014/main" id="{1808FC4D-793B-4614-86A7-778F50648AF2}"/>
+              </a:ext>
+            </a:extLst>
+          </p:cNvPr>
+          <p:cNvSpPr>
+            <a:spLocks noChangeArrowheads="1"/>
+          </p:cNvSpPr>
+          <p:nvPr/>
+        </p:nvSpPr>
+        <p:spPr bwMode="auto">
+          <a:xfrm>
+            <a:off x="6820698" y="2241310"/>
+            <a:ext cx="401896" cy="276715"/>
+          </a:xfrm>
+          <a:prstGeom prst="rect">
+            <a:avLst/>
+          </a:prstGeom>
+          <a:noFill/>
+          <a:ln w="12700" cap="flat">
+            <a:solidFill>
+              <a:schemeClr val="tx1"/>
+            </a:solidFill>
+            <a:prstDash val="solid"/>
+            <a:miter lim="800000"/>
+            <a:headEnd/>
+            <a:tailEnd/>
+          </a:ln>
+          <a:extLst>
+            <a:ext uri="{909E8E84-426E-40DD-AFC4-6F175D3DCCD1}">
+              <a14:hiddenFill xmlns:a14="http://schemas.microsoft.com/office/drawing/2010/main">
+                <a:solidFill>
+                  <a:srgbClr val="FFFFFF"/>
+                </a:solidFill>
+              </a14:hiddenFill>
+            </a:ext>
+          </a:extLst>
+        </p:spPr>
+        <p:txBody>
+          <a:bodyPr vert="horz" wrap="square" lIns="91440" tIns="45720" rIns="91440" bIns="45720" numCol="1" anchor="ctr" anchorCtr="0" compatLnSpc="1">
+            <a:prstTxWarp prst="textNoShape">
+              <a:avLst/>
+            </a:prstTxWarp>
+          </a:bodyPr>
+          <a:lstStyle/>
+          <a:p>
+            <a:pPr algn="ctr"/>
+            <a:r>
+              <a:rPr lang="en-US" altLang="zh-CN" sz="900" dirty="0">
+                <a:latin typeface="微软雅黑" panose="020B0503020204020204" pitchFamily="34" charset="-122"/>
+                <a:ea typeface="微软雅黑" panose="020B0503020204020204" pitchFamily="34" charset="-122"/>
+              </a:rPr>
+              <a:t>1s</a:t>
+            </a:r>
+            <a:endParaRPr lang="zh-CN" altLang="en-US" sz="900" dirty="0">
+              <a:latin typeface="微软雅黑" panose="020B0503020204020204" pitchFamily="34" charset="-122"/>
+              <a:ea typeface="微软雅黑" panose="020B0503020204020204" pitchFamily="34" charset="-122"/>
+            </a:endParaRPr>
+          </a:p>
+        </p:txBody>
+      </p:sp>
+      <p:sp>
+        <p:nvSpPr>
+          <p:cNvPr id="24" name="Rectangle 41">
+            <a:extLst>
+              <a:ext uri="{FF2B5EF4-FFF2-40B4-BE49-F238E27FC236}">
+                <a16:creationId xmlns:a16="http://schemas.microsoft.com/office/drawing/2014/main" id="{730FFF58-699B-4020-9FFA-97CC54C7AB3A}"/>
+              </a:ext>
+            </a:extLst>
+          </p:cNvPr>
+          <p:cNvSpPr>
+            <a:spLocks noChangeArrowheads="1"/>
+          </p:cNvSpPr>
+          <p:nvPr/>
+        </p:nvSpPr>
+        <p:spPr bwMode="auto">
+          <a:xfrm>
+            <a:off x="7222590" y="2241310"/>
+            <a:ext cx="1633931" cy="276715"/>
+          </a:xfrm>
+          <a:prstGeom prst="rect">
+            <a:avLst/>
+          </a:prstGeom>
+          <a:noFill/>
+          <a:ln w="12700" cap="flat">
+            <a:solidFill>
+              <a:schemeClr val="tx1"/>
+            </a:solidFill>
+            <a:prstDash val="solid"/>
+            <a:miter lim="800000"/>
+            <a:headEnd/>
+            <a:tailEnd/>
+          </a:ln>
+          <a:extLst>
+            <a:ext uri="{909E8E84-426E-40DD-AFC4-6F175D3DCCD1}">
+              <a14:hiddenFill xmlns:a14="http://schemas.microsoft.com/office/drawing/2010/main">
+                <a:solidFill>
+                  <a:srgbClr val="FFFFFF"/>
+                </a:solidFill>
+              </a14:hiddenFill>
+            </a:ext>
+          </a:extLst>
+        </p:spPr>
+        <p:txBody>
+          <a:bodyPr vert="horz" wrap="square" lIns="91440" tIns="45720" rIns="91440" bIns="45720" numCol="1" anchor="ctr" anchorCtr="0" compatLnSpc="1">
+            <a:prstTxWarp prst="textNoShape">
+              <a:avLst/>
+            </a:prstTxWarp>
+          </a:bodyPr>
+          <a:lstStyle/>
+          <a:p>
+            <a:pPr algn="ctr"/>
+            <a:endParaRPr lang="zh-CN" altLang="en-US" sz="900">
+              <a:latin typeface="微软雅黑" panose="020B0503020204020204" pitchFamily="34" charset="-122"/>
+              <a:ea typeface="微软雅黑" panose="020B0503020204020204" pitchFamily="34" charset="-122"/>
+            </a:endParaRPr>
+          </a:p>
+        </p:txBody>
+      </p:sp>
+      <p:sp>
+        <p:nvSpPr>
+          <p:cNvPr id="25" name="Rectangle 42">
+            <a:extLst>
+              <a:ext uri="{FF2B5EF4-FFF2-40B4-BE49-F238E27FC236}">
+                <a16:creationId xmlns:a16="http://schemas.microsoft.com/office/drawing/2014/main" id="{E613DDDE-DBF5-4133-A972-53D36C07F37C}"/>
+              </a:ext>
+            </a:extLst>
+          </p:cNvPr>
+          <p:cNvSpPr>
+            <a:spLocks noChangeArrowheads="1"/>
+          </p:cNvSpPr>
+          <p:nvPr/>
+        </p:nvSpPr>
+        <p:spPr bwMode="auto">
+          <a:xfrm>
+            <a:off x="6820698" y="2518025"/>
+            <a:ext cx="401896" cy="276715"/>
+          </a:xfrm>
+          <a:prstGeom prst="rect">
+            <a:avLst/>
+          </a:prstGeom>
+          <a:noFill/>
+          <a:ln w="12700" cap="flat">
+            <a:solidFill>
+              <a:schemeClr val="tx1"/>
+            </a:solidFill>
+            <a:prstDash val="solid"/>
+            <a:miter lim="800000"/>
+            <a:headEnd/>
+            <a:tailEnd/>
+          </a:ln>
+          <a:extLst>
+            <a:ext uri="{909E8E84-426E-40DD-AFC4-6F175D3DCCD1}">
+              <a14:hiddenFill xmlns:a14="http://schemas.microsoft.com/office/drawing/2010/main">
+                <a:solidFill>
+                  <a:srgbClr val="FFFFFF"/>
+                </a:solidFill>
+              </a14:hiddenFill>
+            </a:ext>
+          </a:extLst>
+        </p:spPr>
+        <p:txBody>
+          <a:bodyPr vert="horz" wrap="square" lIns="91440" tIns="45720" rIns="91440" bIns="45720" numCol="1" anchor="ctr" anchorCtr="0" compatLnSpc="1">
+            <a:prstTxWarp prst="textNoShape">
+              <a:avLst/>
+            </a:prstTxWarp>
+          </a:bodyPr>
+          <a:lstStyle/>
+          <a:p>
+            <a:pPr algn="ctr"/>
+            <a:r>
+              <a:rPr lang="en-US" altLang="zh-CN" sz="900" dirty="0">
+                <a:latin typeface="微软雅黑" panose="020B0503020204020204" pitchFamily="34" charset="-122"/>
+                <a:ea typeface="微软雅黑" panose="020B0503020204020204" pitchFamily="34" charset="-122"/>
+              </a:rPr>
+              <a:t>0s</a:t>
+            </a:r>
+            <a:endParaRPr lang="zh-CN" altLang="en-US" sz="900" dirty="0">
+              <a:latin typeface="微软雅黑" panose="020B0503020204020204" pitchFamily="34" charset="-122"/>
+              <a:ea typeface="微软雅黑" panose="020B0503020204020204" pitchFamily="34" charset="-122"/>
+            </a:endParaRPr>
+          </a:p>
+        </p:txBody>
+      </p:sp>
+      <p:sp>
+        <p:nvSpPr>
+          <p:cNvPr id="26" name="Rectangle 43">
+            <a:extLst>
+              <a:ext uri="{FF2B5EF4-FFF2-40B4-BE49-F238E27FC236}">
+                <a16:creationId xmlns:a16="http://schemas.microsoft.com/office/drawing/2014/main" id="{B602C1FB-B80C-4C42-B543-C3A55234A424}"/>
+              </a:ext>
+            </a:extLst>
+          </p:cNvPr>
+          <p:cNvSpPr>
+            <a:spLocks noChangeArrowheads="1"/>
+          </p:cNvSpPr>
+          <p:nvPr/>
+        </p:nvSpPr>
+        <p:spPr bwMode="auto">
+          <a:xfrm>
+            <a:off x="7222590" y="2518025"/>
+            <a:ext cx="1633931" cy="276715"/>
+          </a:xfrm>
+          <a:prstGeom prst="rect">
+            <a:avLst/>
+          </a:prstGeom>
+          <a:noFill/>
+          <a:ln w="12700" cap="flat">
+            <a:solidFill>
+              <a:schemeClr val="tx1"/>
+            </a:solidFill>
+            <a:prstDash val="solid"/>
+            <a:miter lim="800000"/>
+            <a:headEnd/>
+            <a:tailEnd/>
+          </a:ln>
+          <a:extLst>
+            <a:ext uri="{909E8E84-426E-40DD-AFC4-6F175D3DCCD1}">
+              <a14:hiddenFill xmlns:a14="http://schemas.microsoft.com/office/drawing/2010/main">
+                <a:solidFill>
+                  <a:srgbClr val="FFFFFF"/>
+                </a:solidFill>
+              </a14:hiddenFill>
+            </a:ext>
+          </a:extLst>
+        </p:spPr>
+        <p:txBody>
+          <a:bodyPr vert="horz" wrap="square" lIns="91440" tIns="45720" rIns="91440" bIns="45720" numCol="1" anchor="ctr" anchorCtr="0" compatLnSpc="1">
+            <a:prstTxWarp prst="textNoShape">
+              <a:avLst/>
+            </a:prstTxWarp>
+          </a:bodyPr>
+          <a:lstStyle/>
+          <a:p>
+            <a:pPr algn="ctr"/>
+            <a:r>
+              <a:rPr lang="en-US" altLang="zh-CN" sz="900" dirty="0">
+                <a:latin typeface="微软雅黑" panose="020B0503020204020204" pitchFamily="34" charset="-122"/>
+                <a:ea typeface="微软雅黑" panose="020B0503020204020204" pitchFamily="34" charset="-122"/>
+              </a:rPr>
+              <a:t>15s preceding</a:t>
+            </a:r>
+            <a:endParaRPr lang="zh-CN" altLang="en-US" sz="900" dirty="0">
+              <a:latin typeface="微软雅黑" panose="020B0503020204020204" pitchFamily="34" charset="-122"/>
+              <a:ea typeface="微软雅黑" panose="020B0503020204020204" pitchFamily="34" charset="-122"/>
+            </a:endParaRPr>
+          </a:p>
+        </p:txBody>
+      </p:sp>
+      <p:sp>
+        <p:nvSpPr>
+          <p:cNvPr id="27" name="Rectangle 44">
+            <a:extLst>
+              <a:ext uri="{FF2B5EF4-FFF2-40B4-BE49-F238E27FC236}">
+                <a16:creationId xmlns:a16="http://schemas.microsoft.com/office/drawing/2014/main" id="{5556CF12-E51A-47EC-B35F-9AAFCFAB2CC0}"/>
+              </a:ext>
+            </a:extLst>
+          </p:cNvPr>
+          <p:cNvSpPr>
+            <a:spLocks noChangeArrowheads="1"/>
+          </p:cNvSpPr>
+          <p:nvPr/>
+        </p:nvSpPr>
+        <p:spPr bwMode="auto">
+          <a:xfrm>
+            <a:off x="6820698" y="2794737"/>
+            <a:ext cx="401896" cy="276715"/>
+          </a:xfrm>
+          <a:prstGeom prst="rect">
+            <a:avLst/>
+          </a:prstGeom>
+          <a:noFill/>
+          <a:ln w="12700" cap="flat">
+            <a:solidFill>
+              <a:schemeClr val="tx1"/>
+            </a:solidFill>
+            <a:prstDash val="solid"/>
+            <a:miter lim="800000"/>
+            <a:headEnd/>
+            <a:tailEnd/>
+          </a:ln>
+          <a:extLst>
+            <a:ext uri="{909E8E84-426E-40DD-AFC4-6F175D3DCCD1}">
+              <a14:hiddenFill xmlns:a14="http://schemas.microsoft.com/office/drawing/2010/main">
+                <a:solidFill>
+                  <a:srgbClr val="FFFFFF"/>
+                </a:solidFill>
+              </a14:hiddenFill>
+            </a:ext>
+          </a:extLst>
+        </p:spPr>
+        <p:txBody>
+          <a:bodyPr vert="horz" wrap="square" lIns="91440" tIns="45720" rIns="91440" bIns="45720" numCol="1" anchor="ctr" anchorCtr="0" compatLnSpc="1">
+            <a:prstTxWarp prst="textNoShape">
+              <a:avLst/>
+            </a:prstTxWarp>
+          </a:bodyPr>
+          <a:lstStyle/>
+          <a:p>
+            <a:pPr algn="ctr"/>
+            <a:r>
+              <a:rPr lang="en-US" altLang="zh-CN" sz="900" dirty="0">
+                <a:latin typeface="微软雅黑" panose="020B0503020204020204" pitchFamily="34" charset="-122"/>
+                <a:ea typeface="微软雅黑" panose="020B0503020204020204" pitchFamily="34" charset="-122"/>
+              </a:rPr>
+              <a:t>1s</a:t>
+            </a:r>
+            <a:endParaRPr lang="zh-CN" altLang="en-US" sz="900" dirty="0">
+              <a:latin typeface="微软雅黑" panose="020B0503020204020204" pitchFamily="34" charset="-122"/>
+              <a:ea typeface="微软雅黑" panose="020B0503020204020204" pitchFamily="34" charset="-122"/>
+            </a:endParaRPr>
+          </a:p>
+        </p:txBody>
+      </p:sp>
+      <p:sp>
+        <p:nvSpPr>
+          <p:cNvPr id="28" name="Rectangle 45">
+            <a:extLst>
+              <a:ext uri="{FF2B5EF4-FFF2-40B4-BE49-F238E27FC236}">
+                <a16:creationId xmlns:a16="http://schemas.microsoft.com/office/drawing/2014/main" id="{CA2AEE56-CE9D-4DDE-A96E-AAFD87F8A9BC}"/>
+              </a:ext>
+            </a:extLst>
+          </p:cNvPr>
+          <p:cNvSpPr>
+            <a:spLocks noChangeArrowheads="1"/>
+          </p:cNvSpPr>
+          <p:nvPr/>
+        </p:nvSpPr>
+        <p:spPr bwMode="auto">
+          <a:xfrm>
+            <a:off x="7222590" y="2794737"/>
+            <a:ext cx="1633931" cy="276715"/>
+          </a:xfrm>
+          <a:prstGeom prst="rect">
+            <a:avLst/>
+          </a:prstGeom>
+          <a:noFill/>
+          <a:ln w="12700" cap="flat">
+            <a:solidFill>
+              <a:schemeClr val="tx1"/>
+            </a:solidFill>
+            <a:prstDash val="solid"/>
+            <a:miter lim="800000"/>
+            <a:headEnd/>
+            <a:tailEnd/>
+          </a:ln>
+          <a:extLst>
+            <a:ext uri="{909E8E84-426E-40DD-AFC4-6F175D3DCCD1}">
+              <a14:hiddenFill xmlns:a14="http://schemas.microsoft.com/office/drawing/2010/main">
+                <a:solidFill>
+                  <a:srgbClr val="FFFFFF"/>
+                </a:solidFill>
+              </a14:hiddenFill>
+            </a:ext>
+          </a:extLst>
+        </p:spPr>
+        <p:txBody>
+          <a:bodyPr vert="horz" wrap="square" lIns="91440" tIns="45720" rIns="91440" bIns="45720" numCol="1" anchor="ctr" anchorCtr="0" compatLnSpc="1">
+            <a:prstTxWarp prst="textNoShape">
+              <a:avLst/>
+            </a:prstTxWarp>
+          </a:bodyPr>
+          <a:lstStyle/>
+          <a:p>
+            <a:pPr algn="ctr"/>
+            <a:r>
+              <a:rPr lang="en-US" altLang="zh-CN" sz="900" dirty="0">
+                <a:latin typeface="微软雅黑" panose="020B0503020204020204" pitchFamily="34" charset="-122"/>
+                <a:ea typeface="微软雅黑" panose="020B0503020204020204" pitchFamily="34" charset="-122"/>
+              </a:rPr>
+              <a:t>14s preceding</a:t>
+            </a:r>
+            <a:endParaRPr lang="zh-CN" altLang="en-US" sz="900" dirty="0">
+              <a:latin typeface="微软雅黑" panose="020B0503020204020204" pitchFamily="34" charset="-122"/>
+              <a:ea typeface="微软雅黑" panose="020B0503020204020204" pitchFamily="34" charset="-122"/>
+            </a:endParaRPr>
+          </a:p>
+        </p:txBody>
+      </p:sp>
+      <p:sp>
+        <p:nvSpPr>
+          <p:cNvPr id="29" name="Rectangle 46">
+            <a:extLst>
+              <a:ext uri="{FF2B5EF4-FFF2-40B4-BE49-F238E27FC236}">
+                <a16:creationId xmlns:a16="http://schemas.microsoft.com/office/drawing/2014/main" id="{89DF4168-90BB-44C3-8965-8C0505399967}"/>
+              </a:ext>
+            </a:extLst>
+          </p:cNvPr>
+          <p:cNvSpPr>
+            <a:spLocks noChangeArrowheads="1"/>
+          </p:cNvSpPr>
+          <p:nvPr/>
+        </p:nvSpPr>
+        <p:spPr bwMode="auto">
+          <a:xfrm>
+            <a:off x="6655985" y="1556113"/>
+            <a:ext cx="2365248" cy="3557752"/>
+          </a:xfrm>
+          <a:prstGeom prst="rect">
+            <a:avLst/>
+          </a:prstGeom>
+          <a:noFill/>
+          <a:ln w="12700" cap="flat">
+            <a:solidFill>
+              <a:schemeClr val="tx1"/>
+            </a:solidFill>
+            <a:prstDash val="solid"/>
+            <a:miter lim="800000"/>
+            <a:headEnd/>
+            <a:tailEnd/>
+          </a:ln>
+          <a:extLst>
+            <a:ext uri="{909E8E84-426E-40DD-AFC4-6F175D3DCCD1}">
+              <a14:hiddenFill xmlns:a14="http://schemas.microsoft.com/office/drawing/2010/main">
+                <a:solidFill>
+                  <a:srgbClr val="FFFFFF"/>
+                </a:solidFill>
+              </a14:hiddenFill>
+            </a:ext>
+          </a:extLst>
+        </p:spPr>
+        <p:txBody>
+          <a:bodyPr vert="horz" wrap="square" lIns="91440" tIns="45720" rIns="91440" bIns="45720" numCol="1" anchor="ctr" anchorCtr="0" compatLnSpc="1">
+            <a:prstTxWarp prst="textNoShape">
+              <a:avLst/>
+            </a:prstTxWarp>
+          </a:bodyPr>
+          <a:lstStyle/>
+          <a:p>
+            <a:pPr algn="ctr"/>
+            <a:endParaRPr lang="zh-CN" altLang="en-US" sz="900">
+              <a:latin typeface="微软雅黑" panose="020B0503020204020204" pitchFamily="34" charset="-122"/>
+              <a:ea typeface="微软雅黑" panose="020B0503020204020204" pitchFamily="34" charset="-122"/>
+            </a:endParaRPr>
+          </a:p>
+        </p:txBody>
+      </p:sp>
+      <p:sp>
+        <p:nvSpPr>
+          <p:cNvPr id="30" name="Rectangle 182">
+            <a:extLst>
+              <a:ext uri="{FF2B5EF4-FFF2-40B4-BE49-F238E27FC236}">
+                <a16:creationId xmlns:a16="http://schemas.microsoft.com/office/drawing/2014/main" id="{AA6C7286-8199-4084-B2E5-B083BE1994B7}"/>
+              </a:ext>
+            </a:extLst>
+          </p:cNvPr>
+          <p:cNvSpPr>
+            <a:spLocks noChangeArrowheads="1"/>
+          </p:cNvSpPr>
+          <p:nvPr/>
+        </p:nvSpPr>
+        <p:spPr bwMode="auto">
+          <a:xfrm>
+            <a:off x="6820698" y="3071452"/>
+            <a:ext cx="401896" cy="276715"/>
+          </a:xfrm>
+          <a:prstGeom prst="rect">
+            <a:avLst/>
+          </a:prstGeom>
+          <a:solidFill>
+            <a:srgbClr val="ABCD7D"/>
+          </a:solidFill>
+          <a:ln w="12700">
+            <a:solidFill>
+              <a:srgbClr val="000000"/>
+            </a:solidFill>
+            <a:miter lim="800000"/>
+            <a:headEnd/>
+            <a:tailEnd/>
+          </a:ln>
+        </p:spPr>
+        <p:txBody>
+          <a:bodyPr vert="horz" wrap="square" lIns="91440" tIns="45720" rIns="91440" bIns="45720" numCol="1" anchor="ctr" anchorCtr="0" compatLnSpc="1">
+            <a:prstTxWarp prst="textNoShape">
+              <a:avLst/>
+            </a:prstTxWarp>
+          </a:bodyPr>
+          <a:lstStyle/>
+          <a:p>
+            <a:pPr algn="ctr"/>
+            <a:r>
+              <a:rPr lang="en-US" altLang="zh-CN" sz="900" dirty="0">
+                <a:latin typeface="微软雅黑" panose="020B0503020204020204" pitchFamily="34" charset="-122"/>
+                <a:ea typeface="微软雅黑" panose="020B0503020204020204" pitchFamily="34" charset="-122"/>
+              </a:rPr>
+              <a:t>5s</a:t>
+            </a:r>
+            <a:endParaRPr lang="zh-CN" altLang="en-US" sz="900" dirty="0">
+              <a:latin typeface="微软雅黑" panose="020B0503020204020204" pitchFamily="34" charset="-122"/>
+              <a:ea typeface="微软雅黑" panose="020B0503020204020204" pitchFamily="34" charset="-122"/>
+            </a:endParaRPr>
+          </a:p>
+        </p:txBody>
+      </p:sp>
+      <p:sp>
+        <p:nvSpPr>
+          <p:cNvPr id="31" name="Rectangle 183">
+            <a:extLst>
+              <a:ext uri="{FF2B5EF4-FFF2-40B4-BE49-F238E27FC236}">
+                <a16:creationId xmlns:a16="http://schemas.microsoft.com/office/drawing/2014/main" id="{FFEE2016-6729-4F97-A9C2-A540E881E817}"/>
+              </a:ext>
+            </a:extLst>
+          </p:cNvPr>
+          <p:cNvSpPr>
+            <a:spLocks noChangeArrowheads="1"/>
+          </p:cNvSpPr>
+          <p:nvPr/>
+        </p:nvSpPr>
+        <p:spPr bwMode="auto">
+          <a:xfrm>
+            <a:off x="7222590" y="3071452"/>
+            <a:ext cx="1633931" cy="276715"/>
+          </a:xfrm>
+          <a:prstGeom prst="rect">
+            <a:avLst/>
+          </a:prstGeom>
+          <a:solidFill>
+            <a:srgbClr val="ABCD7D"/>
+          </a:solidFill>
+          <a:ln w="12700">
+            <a:solidFill>
+              <a:srgbClr val="000000"/>
+            </a:solidFill>
+            <a:miter lim="800000"/>
+            <a:headEnd/>
+            <a:tailEnd/>
+          </a:ln>
+        </p:spPr>
+        <p:txBody>
+          <a:bodyPr vert="horz" wrap="square" lIns="91440" tIns="45720" rIns="91440" bIns="45720" numCol="1" anchor="ctr" anchorCtr="0" compatLnSpc="1">
+            <a:prstTxWarp prst="textNoShape">
+              <a:avLst/>
+            </a:prstTxWarp>
+          </a:bodyPr>
+          <a:lstStyle/>
+          <a:p>
+            <a:pPr algn="ctr"/>
+            <a:r>
+              <a:rPr lang="en-US" altLang="zh-CN" sz="900" dirty="0">
+                <a:latin typeface="微软雅黑" panose="020B0503020204020204" pitchFamily="34" charset="-122"/>
+                <a:ea typeface="微软雅黑" panose="020B0503020204020204" pitchFamily="34" charset="-122"/>
+              </a:rPr>
+              <a:t>10s preceding</a:t>
+            </a:r>
+            <a:endParaRPr lang="zh-CN" altLang="en-US" sz="900" dirty="0">
+              <a:latin typeface="微软雅黑" panose="020B0503020204020204" pitchFamily="34" charset="-122"/>
+              <a:ea typeface="微软雅黑" panose="020B0503020204020204" pitchFamily="34" charset="-122"/>
+            </a:endParaRPr>
+          </a:p>
+        </p:txBody>
+      </p:sp>
+      <p:sp>
+        <p:nvSpPr>
+          <p:cNvPr id="32" name="Rectangle 184">
+            <a:extLst>
+              <a:ext uri="{FF2B5EF4-FFF2-40B4-BE49-F238E27FC236}">
+                <a16:creationId xmlns:a16="http://schemas.microsoft.com/office/drawing/2014/main" id="{5EF9DAD6-E865-431C-83F2-327E7D71FC14}"/>
+              </a:ext>
+            </a:extLst>
+          </p:cNvPr>
+          <p:cNvSpPr>
+            <a:spLocks noChangeArrowheads="1"/>
+          </p:cNvSpPr>
+          <p:nvPr/>
+        </p:nvSpPr>
+        <p:spPr bwMode="auto">
+          <a:xfrm>
+            <a:off x="6820698" y="3348166"/>
+            <a:ext cx="401896" cy="276715"/>
+          </a:xfrm>
+          <a:prstGeom prst="rect">
+            <a:avLst/>
+          </a:prstGeom>
+          <a:solidFill>
+            <a:srgbClr val="ABCD7D"/>
+          </a:solidFill>
+          <a:ln w="12700">
+            <a:solidFill>
+              <a:srgbClr val="000000"/>
+            </a:solidFill>
+            <a:miter lim="800000"/>
+            <a:headEnd/>
+            <a:tailEnd/>
+          </a:ln>
+        </p:spPr>
+        <p:txBody>
+          <a:bodyPr vert="horz" wrap="square" lIns="91440" tIns="45720" rIns="91440" bIns="45720" numCol="1" anchor="ctr" anchorCtr="0" compatLnSpc="1">
+            <a:prstTxWarp prst="textNoShape">
+              <a:avLst/>
+            </a:prstTxWarp>
+          </a:bodyPr>
+          <a:lstStyle/>
+          <a:p>
+            <a:pPr algn="ctr"/>
+            <a:r>
+              <a:rPr lang="en-US" altLang="zh-CN" sz="900" dirty="0">
+                <a:latin typeface="微软雅黑" panose="020B0503020204020204" pitchFamily="34" charset="-122"/>
+                <a:ea typeface="微软雅黑" panose="020B0503020204020204" pitchFamily="34" charset="-122"/>
+              </a:rPr>
+              <a:t>7s</a:t>
+            </a:r>
+            <a:endParaRPr lang="zh-CN" altLang="en-US" sz="900" dirty="0">
+              <a:latin typeface="微软雅黑" panose="020B0503020204020204" pitchFamily="34" charset="-122"/>
+              <a:ea typeface="微软雅黑" panose="020B0503020204020204" pitchFamily="34" charset="-122"/>
+            </a:endParaRPr>
+          </a:p>
+        </p:txBody>
+      </p:sp>
+      <p:sp>
+        <p:nvSpPr>
+          <p:cNvPr id="33" name="Rectangle 185">
+            <a:extLst>
+              <a:ext uri="{FF2B5EF4-FFF2-40B4-BE49-F238E27FC236}">
+                <a16:creationId xmlns:a16="http://schemas.microsoft.com/office/drawing/2014/main" id="{E511D0F0-7C19-4048-AA06-2D67DA68C805}"/>
+              </a:ext>
+            </a:extLst>
+          </p:cNvPr>
+          <p:cNvSpPr>
+            <a:spLocks noChangeArrowheads="1"/>
+          </p:cNvSpPr>
+          <p:nvPr/>
+        </p:nvSpPr>
+        <p:spPr bwMode="auto">
+          <a:xfrm>
+            <a:off x="7222590" y="3348166"/>
+            <a:ext cx="1633931" cy="276715"/>
+          </a:xfrm>
+          <a:prstGeom prst="rect">
+            <a:avLst/>
+          </a:prstGeom>
+          <a:solidFill>
+            <a:srgbClr val="ABCD7D"/>
+          </a:solidFill>
+          <a:ln w="12700">
+            <a:solidFill>
+              <a:srgbClr val="000000"/>
+            </a:solidFill>
+            <a:miter lim="800000"/>
+            <a:headEnd/>
+            <a:tailEnd/>
+          </a:ln>
+        </p:spPr>
+        <p:txBody>
+          <a:bodyPr vert="horz" wrap="square" lIns="91440" tIns="45720" rIns="91440" bIns="45720" numCol="1" anchor="ctr" anchorCtr="0" compatLnSpc="1">
+            <a:prstTxWarp prst="textNoShape">
+              <a:avLst/>
+            </a:prstTxWarp>
+          </a:bodyPr>
+          <a:lstStyle/>
+          <a:p>
+            <a:pPr algn="ctr"/>
+            <a:r>
+              <a:rPr lang="en-US" altLang="zh-CN" sz="900" dirty="0">
+                <a:latin typeface="微软雅黑" panose="020B0503020204020204" pitchFamily="34" charset="-122"/>
+                <a:ea typeface="微软雅黑" panose="020B0503020204020204" pitchFamily="34" charset="-122"/>
+              </a:rPr>
+              <a:t>8s preceding</a:t>
+            </a:r>
+            <a:endParaRPr lang="zh-CN" altLang="en-US" sz="900" dirty="0">
+              <a:latin typeface="微软雅黑" panose="020B0503020204020204" pitchFamily="34" charset="-122"/>
+              <a:ea typeface="微软雅黑" panose="020B0503020204020204" pitchFamily="34" charset="-122"/>
+            </a:endParaRPr>
+          </a:p>
+        </p:txBody>
+      </p:sp>
+      <p:sp>
+        <p:nvSpPr>
+          <p:cNvPr id="34" name="Rectangle 186">
+            <a:extLst>
+              <a:ext uri="{FF2B5EF4-FFF2-40B4-BE49-F238E27FC236}">
+                <a16:creationId xmlns:a16="http://schemas.microsoft.com/office/drawing/2014/main" id="{18F7C13B-C645-461D-ADEF-543184410779}"/>
+              </a:ext>
+            </a:extLst>
+          </p:cNvPr>
+          <p:cNvSpPr>
+            <a:spLocks noChangeArrowheads="1"/>
+          </p:cNvSpPr>
+          <p:nvPr/>
+        </p:nvSpPr>
+        <p:spPr bwMode="auto">
+          <a:xfrm>
+            <a:off x="6820698" y="3624880"/>
+            <a:ext cx="401896" cy="270128"/>
+          </a:xfrm>
+          <a:prstGeom prst="rect">
+            <a:avLst/>
+          </a:prstGeom>
+          <a:solidFill>
+            <a:srgbClr val="ABCD7D"/>
+          </a:solidFill>
+          <a:ln w="12700">
+            <a:solidFill>
+              <a:srgbClr val="000000"/>
+            </a:solidFill>
+            <a:miter lim="800000"/>
+            <a:headEnd/>
+            <a:tailEnd/>
+          </a:ln>
+        </p:spPr>
+        <p:txBody>
+          <a:bodyPr vert="horz" wrap="square" lIns="91440" tIns="45720" rIns="91440" bIns="45720" numCol="1" anchor="ctr" anchorCtr="0" compatLnSpc="1">
+            <a:prstTxWarp prst="textNoShape">
+              <a:avLst/>
+            </a:prstTxWarp>
+          </a:bodyPr>
+          <a:lstStyle/>
+          <a:p>
+            <a:pPr algn="ctr"/>
+            <a:r>
+              <a:rPr lang="en-US" altLang="zh-CN" sz="900" dirty="0">
+                <a:latin typeface="微软雅黑" panose="020B0503020204020204" pitchFamily="34" charset="-122"/>
+                <a:ea typeface="微软雅黑" panose="020B0503020204020204" pitchFamily="34" charset="-122"/>
+              </a:rPr>
+              <a:t>8s</a:t>
+            </a:r>
+            <a:endParaRPr lang="zh-CN" altLang="en-US" sz="900" dirty="0">
+              <a:latin typeface="微软雅黑" panose="020B0503020204020204" pitchFamily="34" charset="-122"/>
+              <a:ea typeface="微软雅黑" panose="020B0503020204020204" pitchFamily="34" charset="-122"/>
+            </a:endParaRPr>
+          </a:p>
+        </p:txBody>
+      </p:sp>
+      <p:sp>
+        <p:nvSpPr>
+          <p:cNvPr id="35" name="Rectangle 187">
+            <a:extLst>
+              <a:ext uri="{FF2B5EF4-FFF2-40B4-BE49-F238E27FC236}">
+                <a16:creationId xmlns:a16="http://schemas.microsoft.com/office/drawing/2014/main" id="{DB53FEDC-963D-47C0-BF4B-E4F76FABCE04}"/>
+              </a:ext>
+            </a:extLst>
+          </p:cNvPr>
+          <p:cNvSpPr>
+            <a:spLocks noChangeArrowheads="1"/>
+          </p:cNvSpPr>
+          <p:nvPr/>
+        </p:nvSpPr>
+        <p:spPr bwMode="auto">
+          <a:xfrm>
+            <a:off x="7222590" y="3624880"/>
+            <a:ext cx="1633931" cy="270128"/>
+          </a:xfrm>
+          <a:prstGeom prst="rect">
+            <a:avLst/>
+          </a:prstGeom>
+          <a:solidFill>
+            <a:srgbClr val="ABCD7D"/>
+          </a:solidFill>
+          <a:ln w="12700">
+            <a:solidFill>
+              <a:srgbClr val="000000"/>
+            </a:solidFill>
+            <a:miter lim="800000"/>
+            <a:headEnd/>
+            <a:tailEnd/>
+          </a:ln>
+        </p:spPr>
+        <p:txBody>
+          <a:bodyPr vert="horz" wrap="square" lIns="91440" tIns="45720" rIns="91440" bIns="45720" numCol="1" anchor="ctr" anchorCtr="0" compatLnSpc="1">
+            <a:prstTxWarp prst="textNoShape">
+              <a:avLst/>
+            </a:prstTxWarp>
+          </a:bodyPr>
+          <a:lstStyle/>
+          <a:p>
+            <a:pPr algn="ctr"/>
+            <a:r>
+              <a:rPr lang="en-US" altLang="zh-CN" sz="900" dirty="0">
+                <a:latin typeface="微软雅黑" panose="020B0503020204020204" pitchFamily="34" charset="-122"/>
+                <a:ea typeface="微软雅黑" panose="020B0503020204020204" pitchFamily="34" charset="-122"/>
+              </a:rPr>
+              <a:t>7s preceding</a:t>
+            </a:r>
+            <a:endParaRPr lang="zh-CN" altLang="en-US" sz="900" dirty="0">
+              <a:latin typeface="微软雅黑" panose="020B0503020204020204" pitchFamily="34" charset="-122"/>
+              <a:ea typeface="微软雅黑" panose="020B0503020204020204" pitchFamily="34" charset="-122"/>
+            </a:endParaRPr>
+          </a:p>
+        </p:txBody>
+      </p:sp>
+      <p:sp>
+        <p:nvSpPr>
+          <p:cNvPr id="36" name="Rectangle 188">
+            <a:extLst>
+              <a:ext uri="{FF2B5EF4-FFF2-40B4-BE49-F238E27FC236}">
+                <a16:creationId xmlns:a16="http://schemas.microsoft.com/office/drawing/2014/main" id="{286639F4-F13A-4922-BA15-D9E87DB11232}"/>
+              </a:ext>
+            </a:extLst>
+          </p:cNvPr>
+          <p:cNvSpPr>
+            <a:spLocks noChangeArrowheads="1"/>
+          </p:cNvSpPr>
+          <p:nvPr/>
+        </p:nvSpPr>
+        <p:spPr bwMode="auto">
+          <a:xfrm>
+            <a:off x="6820698" y="3895003"/>
+            <a:ext cx="401896" cy="276715"/>
+          </a:xfrm>
+          <a:prstGeom prst="rect">
+            <a:avLst/>
+          </a:prstGeom>
+          <a:solidFill>
+            <a:srgbClr val="ABCD7D"/>
+          </a:solidFill>
+          <a:ln w="12700">
+            <a:solidFill>
+              <a:srgbClr val="000000"/>
+            </a:solidFill>
+            <a:miter lim="800000"/>
+            <a:headEnd/>
+            <a:tailEnd/>
+          </a:ln>
+        </p:spPr>
+        <p:txBody>
+          <a:bodyPr vert="horz" wrap="square" lIns="91440" tIns="45720" rIns="91440" bIns="45720" numCol="1" anchor="ctr" anchorCtr="0" compatLnSpc="1">
+            <a:prstTxWarp prst="textNoShape">
+              <a:avLst/>
+            </a:prstTxWarp>
+          </a:bodyPr>
+          <a:lstStyle/>
+          <a:p>
+            <a:pPr algn="ctr"/>
+            <a:r>
+              <a:rPr lang="en-US" altLang="zh-CN" sz="900" dirty="0">
+                <a:latin typeface="微软雅黑" panose="020B0503020204020204" pitchFamily="34" charset="-122"/>
+                <a:ea typeface="微软雅黑" panose="020B0503020204020204" pitchFamily="34" charset="-122"/>
+              </a:rPr>
+              <a:t>10s</a:t>
+            </a:r>
+            <a:endParaRPr lang="zh-CN" altLang="en-US" sz="900" dirty="0">
+              <a:latin typeface="微软雅黑" panose="020B0503020204020204" pitchFamily="34" charset="-122"/>
+              <a:ea typeface="微软雅黑" panose="020B0503020204020204" pitchFamily="34" charset="-122"/>
+            </a:endParaRPr>
+          </a:p>
+        </p:txBody>
+      </p:sp>
+      <p:sp>
+        <p:nvSpPr>
+          <p:cNvPr id="37" name="Rectangle 189">
+            <a:extLst>
+              <a:ext uri="{FF2B5EF4-FFF2-40B4-BE49-F238E27FC236}">
+                <a16:creationId xmlns:a16="http://schemas.microsoft.com/office/drawing/2014/main" id="{4E228433-EE2D-4B2B-90E0-A56EA0A6B097}"/>
+              </a:ext>
+            </a:extLst>
+          </p:cNvPr>
+          <p:cNvSpPr>
+            <a:spLocks noChangeArrowheads="1"/>
+          </p:cNvSpPr>
+          <p:nvPr/>
+        </p:nvSpPr>
+        <p:spPr bwMode="auto">
+          <a:xfrm>
+            <a:off x="7222590" y="3895003"/>
+            <a:ext cx="1633931" cy="276715"/>
+          </a:xfrm>
+          <a:prstGeom prst="rect">
+            <a:avLst/>
+          </a:prstGeom>
+          <a:solidFill>
+            <a:srgbClr val="ABCD7D"/>
+          </a:solidFill>
+          <a:ln w="12700">
+            <a:solidFill>
+              <a:srgbClr val="000000"/>
+            </a:solidFill>
+            <a:miter lim="800000"/>
+            <a:headEnd/>
+            <a:tailEnd/>
+          </a:ln>
+        </p:spPr>
+        <p:txBody>
+          <a:bodyPr vert="horz" wrap="square" lIns="91440" tIns="45720" rIns="91440" bIns="45720" numCol="1" anchor="ctr" anchorCtr="0" compatLnSpc="1">
+            <a:prstTxWarp prst="textNoShape">
+              <a:avLst/>
+            </a:prstTxWarp>
+          </a:bodyPr>
+          <a:lstStyle/>
+          <a:p>
+            <a:pPr algn="ctr"/>
+            <a:r>
+              <a:rPr lang="en-US" altLang="zh-CN" sz="900" dirty="0">
+                <a:latin typeface="微软雅黑" panose="020B0503020204020204" pitchFamily="34" charset="-122"/>
+                <a:ea typeface="微软雅黑" panose="020B0503020204020204" pitchFamily="34" charset="-122"/>
+              </a:rPr>
+              <a:t>5s preceding</a:t>
+            </a:r>
+            <a:endParaRPr lang="zh-CN" altLang="en-US" sz="900" dirty="0">
+              <a:latin typeface="微软雅黑" panose="020B0503020204020204" pitchFamily="34" charset="-122"/>
+              <a:ea typeface="微软雅黑" panose="020B0503020204020204" pitchFamily="34" charset="-122"/>
+            </a:endParaRPr>
+          </a:p>
+        </p:txBody>
+      </p:sp>
+      <p:sp>
+        <p:nvSpPr>
+          <p:cNvPr id="38" name="Rectangle 217">
+            <a:extLst>
+              <a:ext uri="{FF2B5EF4-FFF2-40B4-BE49-F238E27FC236}">
+                <a16:creationId xmlns:a16="http://schemas.microsoft.com/office/drawing/2014/main" id="{711CCA03-E479-425E-9A38-891C717AB358}"/>
+              </a:ext>
+            </a:extLst>
+          </p:cNvPr>
+          <p:cNvSpPr>
+            <a:spLocks noChangeArrowheads="1"/>
+          </p:cNvSpPr>
+          <p:nvPr/>
+        </p:nvSpPr>
+        <p:spPr bwMode="auto">
+          <a:xfrm>
+            <a:off x="3855900" y="3038508"/>
+            <a:ext cx="375543" cy="270128"/>
+          </a:xfrm>
+          <a:prstGeom prst="rect">
+            <a:avLst/>
+          </a:prstGeom>
+          <a:solidFill>
+            <a:srgbClr val="ABCD7D"/>
+          </a:solidFill>
+          <a:ln w="12700">
+            <a:solidFill>
+              <a:srgbClr val="000000"/>
+            </a:solidFill>
+            <a:miter lim="800000"/>
+            <a:headEnd/>
+            <a:tailEnd/>
+          </a:ln>
+        </p:spPr>
+        <p:txBody>
+          <a:bodyPr vert="horz" wrap="square" lIns="91440" tIns="45720" rIns="91440" bIns="45720" numCol="1" anchor="ctr" anchorCtr="0" compatLnSpc="1">
+            <a:prstTxWarp prst="textNoShape">
+              <a:avLst/>
+            </a:prstTxWarp>
+          </a:bodyPr>
+          <a:lstStyle/>
+          <a:p>
+            <a:pPr algn="ctr"/>
+            <a:r>
+              <a:rPr lang="en-US" altLang="zh-CN" sz="900" dirty="0">
+                <a:latin typeface="微软雅黑" panose="020B0503020204020204" pitchFamily="34" charset="-122"/>
+                <a:ea typeface="微软雅黑" panose="020B0503020204020204" pitchFamily="34" charset="-122"/>
+              </a:rPr>
+              <a:t>5s</a:t>
+            </a:r>
+            <a:endParaRPr lang="zh-CN" altLang="en-US" sz="900" dirty="0">
+              <a:latin typeface="微软雅黑" panose="020B0503020204020204" pitchFamily="34" charset="-122"/>
+              <a:ea typeface="微软雅黑" panose="020B0503020204020204" pitchFamily="34" charset="-122"/>
+            </a:endParaRPr>
+          </a:p>
+        </p:txBody>
+      </p:sp>
+      <p:sp>
+        <p:nvSpPr>
+          <p:cNvPr id="39" name="Rectangle 218">
+            <a:extLst>
+              <a:ext uri="{FF2B5EF4-FFF2-40B4-BE49-F238E27FC236}">
+                <a16:creationId xmlns:a16="http://schemas.microsoft.com/office/drawing/2014/main" id="{EFB7855F-6165-4C94-8771-2466059FFE2E}"/>
+              </a:ext>
+            </a:extLst>
+          </p:cNvPr>
+          <p:cNvSpPr>
+            <a:spLocks noChangeArrowheads="1"/>
+          </p:cNvSpPr>
+          <p:nvPr/>
+        </p:nvSpPr>
+        <p:spPr bwMode="auto">
+          <a:xfrm>
+            <a:off x="4231443" y="3038508"/>
+            <a:ext cx="1568045" cy="270128"/>
+          </a:xfrm>
+          <a:prstGeom prst="rect">
+            <a:avLst/>
+          </a:prstGeom>
+          <a:solidFill>
+            <a:srgbClr val="ABCD7D"/>
+          </a:solidFill>
+          <a:ln w="12700">
+            <a:solidFill>
+              <a:srgbClr val="000000"/>
+            </a:solidFill>
+            <a:miter lim="800000"/>
+            <a:headEnd/>
+            <a:tailEnd/>
+          </a:ln>
+        </p:spPr>
+        <p:txBody>
+          <a:bodyPr vert="horz" wrap="square" lIns="91440" tIns="45720" rIns="91440" bIns="45720" numCol="1" anchor="ctr" anchorCtr="0" compatLnSpc="1">
+            <a:prstTxWarp prst="textNoShape">
+              <a:avLst/>
+            </a:prstTxWarp>
+          </a:bodyPr>
+          <a:lstStyle/>
+          <a:p>
+            <a:pPr algn="ctr"/>
+            <a:r>
+              <a:rPr lang="en-US" altLang="zh-CN" sz="900" dirty="0">
+                <a:latin typeface="微软雅黑" panose="020B0503020204020204" pitchFamily="34" charset="-122"/>
+                <a:ea typeface="微软雅黑" panose="020B0503020204020204" pitchFamily="34" charset="-122"/>
+              </a:rPr>
+              <a:t>10s preceding</a:t>
+            </a:r>
+            <a:endParaRPr lang="zh-CN" altLang="en-US" sz="900" dirty="0">
+              <a:latin typeface="微软雅黑" panose="020B0503020204020204" pitchFamily="34" charset="-122"/>
+              <a:ea typeface="微软雅黑" panose="020B0503020204020204" pitchFamily="34" charset="-122"/>
+            </a:endParaRPr>
+          </a:p>
+        </p:txBody>
+      </p:sp>
+      <p:sp>
+        <p:nvSpPr>
+          <p:cNvPr id="40" name="Rectangle 219">
+            <a:extLst>
+              <a:ext uri="{FF2B5EF4-FFF2-40B4-BE49-F238E27FC236}">
+                <a16:creationId xmlns:a16="http://schemas.microsoft.com/office/drawing/2014/main" id="{546D6A4F-3747-4C7C-AED3-E6BA4A7E2CB8}"/>
+              </a:ext>
+            </a:extLst>
+          </p:cNvPr>
+          <p:cNvSpPr>
+            <a:spLocks noChangeArrowheads="1"/>
+          </p:cNvSpPr>
+          <p:nvPr/>
+        </p:nvSpPr>
+        <p:spPr bwMode="auto">
+          <a:xfrm>
+            <a:off x="3855900" y="3308635"/>
+            <a:ext cx="375543" cy="283305"/>
+          </a:xfrm>
+          <a:prstGeom prst="rect">
+            <a:avLst/>
+          </a:prstGeom>
+          <a:solidFill>
+            <a:srgbClr val="ABCD7D"/>
+          </a:solidFill>
+          <a:ln w="12700">
+            <a:solidFill>
+              <a:srgbClr val="000000"/>
+            </a:solidFill>
+            <a:miter lim="800000"/>
+            <a:headEnd/>
+            <a:tailEnd/>
+          </a:ln>
+        </p:spPr>
+        <p:txBody>
+          <a:bodyPr vert="horz" wrap="square" lIns="91440" tIns="45720" rIns="91440" bIns="45720" numCol="1" anchor="ctr" anchorCtr="0" compatLnSpc="1">
+            <a:prstTxWarp prst="textNoShape">
+              <a:avLst/>
+            </a:prstTxWarp>
+          </a:bodyPr>
+          <a:lstStyle/>
+          <a:p>
+            <a:pPr algn="ctr"/>
+            <a:r>
+              <a:rPr lang="en-US" altLang="zh-CN" sz="900" dirty="0">
+                <a:latin typeface="微软雅黑" panose="020B0503020204020204" pitchFamily="34" charset="-122"/>
+                <a:ea typeface="微软雅黑" panose="020B0503020204020204" pitchFamily="34" charset="-122"/>
+              </a:rPr>
+              <a:t>7s</a:t>
+            </a:r>
+            <a:endParaRPr lang="zh-CN" altLang="en-US" sz="900" dirty="0">
+              <a:latin typeface="微软雅黑" panose="020B0503020204020204" pitchFamily="34" charset="-122"/>
+              <a:ea typeface="微软雅黑" panose="020B0503020204020204" pitchFamily="34" charset="-122"/>
+            </a:endParaRPr>
+          </a:p>
+        </p:txBody>
+      </p:sp>
+      <p:sp>
+        <p:nvSpPr>
+          <p:cNvPr id="41" name="Rectangle 220">
+            <a:extLst>
+              <a:ext uri="{FF2B5EF4-FFF2-40B4-BE49-F238E27FC236}">
+                <a16:creationId xmlns:a16="http://schemas.microsoft.com/office/drawing/2014/main" id="{98B39BF5-7BAF-4781-9E39-69123917ED33}"/>
+              </a:ext>
+            </a:extLst>
+          </p:cNvPr>
+          <p:cNvSpPr>
+            <a:spLocks noChangeArrowheads="1"/>
+          </p:cNvSpPr>
+          <p:nvPr/>
+        </p:nvSpPr>
+        <p:spPr bwMode="auto">
+          <a:xfrm>
+            <a:off x="4231443" y="3308635"/>
+            <a:ext cx="1568045" cy="283305"/>
+          </a:xfrm>
+          <a:prstGeom prst="rect">
+            <a:avLst/>
+          </a:prstGeom>
+          <a:solidFill>
+            <a:srgbClr val="ABCD7D"/>
+          </a:solidFill>
+          <a:ln w="12700">
+            <a:solidFill>
+              <a:srgbClr val="000000"/>
+            </a:solidFill>
+            <a:miter lim="800000"/>
+            <a:headEnd/>
+            <a:tailEnd/>
+          </a:ln>
+        </p:spPr>
+        <p:txBody>
+          <a:bodyPr vert="horz" wrap="square" lIns="91440" tIns="45720" rIns="91440" bIns="45720" numCol="1" anchor="ctr" anchorCtr="0" compatLnSpc="1">
+            <a:prstTxWarp prst="textNoShape">
+              <a:avLst/>
+            </a:prstTxWarp>
+          </a:bodyPr>
+          <a:lstStyle/>
+          <a:p>
+            <a:pPr algn="ctr"/>
+            <a:r>
+              <a:rPr lang="en-US" altLang="zh-CN" sz="900" dirty="0">
+                <a:latin typeface="微软雅黑" panose="020B0503020204020204" pitchFamily="34" charset="-122"/>
+                <a:ea typeface="微软雅黑" panose="020B0503020204020204" pitchFamily="34" charset="-122"/>
+              </a:rPr>
+              <a:t>8s preceding</a:t>
+            </a:r>
+            <a:endParaRPr lang="zh-CN" altLang="en-US" sz="900" dirty="0">
+              <a:latin typeface="微软雅黑" panose="020B0503020204020204" pitchFamily="34" charset="-122"/>
+              <a:ea typeface="微软雅黑" panose="020B0503020204020204" pitchFamily="34" charset="-122"/>
+            </a:endParaRPr>
+          </a:p>
+        </p:txBody>
+      </p:sp>
+      <p:sp>
+        <p:nvSpPr>
+          <p:cNvPr id="42" name="Rectangle 221">
+            <a:extLst>
+              <a:ext uri="{FF2B5EF4-FFF2-40B4-BE49-F238E27FC236}">
+                <a16:creationId xmlns:a16="http://schemas.microsoft.com/office/drawing/2014/main" id="{90A1F0D9-5844-4A6B-B210-867509432110}"/>
+              </a:ext>
+            </a:extLst>
+          </p:cNvPr>
+          <p:cNvSpPr>
+            <a:spLocks noChangeArrowheads="1"/>
+          </p:cNvSpPr>
+          <p:nvPr/>
+        </p:nvSpPr>
+        <p:spPr bwMode="auto">
+          <a:xfrm>
+            <a:off x="3855900" y="3591935"/>
+            <a:ext cx="375543" cy="270128"/>
+          </a:xfrm>
+          <a:prstGeom prst="rect">
+            <a:avLst/>
+          </a:prstGeom>
+          <a:solidFill>
+            <a:srgbClr val="ABCD7D"/>
+          </a:solidFill>
+          <a:ln w="12700">
+            <a:solidFill>
+              <a:srgbClr val="000000"/>
+            </a:solidFill>
+            <a:miter lim="800000"/>
+            <a:headEnd/>
+            <a:tailEnd/>
+          </a:ln>
+        </p:spPr>
+        <p:txBody>
+          <a:bodyPr vert="horz" wrap="square" lIns="91440" tIns="45720" rIns="91440" bIns="45720" numCol="1" anchor="ctr" anchorCtr="0" compatLnSpc="1">
+            <a:prstTxWarp prst="textNoShape">
+              <a:avLst/>
+            </a:prstTxWarp>
+          </a:bodyPr>
+          <a:lstStyle/>
+          <a:p>
+            <a:pPr algn="ctr"/>
+            <a:r>
+              <a:rPr lang="en-US" altLang="zh-CN" sz="900" dirty="0">
+                <a:latin typeface="微软雅黑" panose="020B0503020204020204" pitchFamily="34" charset="-122"/>
+                <a:ea typeface="微软雅黑" panose="020B0503020204020204" pitchFamily="34" charset="-122"/>
+              </a:rPr>
+              <a:t>8s</a:t>
+            </a:r>
+            <a:endParaRPr lang="zh-CN" altLang="en-US" sz="900" dirty="0">
+              <a:latin typeface="微软雅黑" panose="020B0503020204020204" pitchFamily="34" charset="-122"/>
+              <a:ea typeface="微软雅黑" panose="020B0503020204020204" pitchFamily="34" charset="-122"/>
+            </a:endParaRPr>
+          </a:p>
+        </p:txBody>
+      </p:sp>
+      <p:sp>
+        <p:nvSpPr>
+          <p:cNvPr id="43" name="Rectangle 222">
+            <a:extLst>
+              <a:ext uri="{FF2B5EF4-FFF2-40B4-BE49-F238E27FC236}">
+                <a16:creationId xmlns:a16="http://schemas.microsoft.com/office/drawing/2014/main" id="{50C83AE5-24F4-4541-9E02-56673D7630BA}"/>
+              </a:ext>
+            </a:extLst>
+          </p:cNvPr>
+          <p:cNvSpPr>
+            <a:spLocks noChangeArrowheads="1"/>
+          </p:cNvSpPr>
+          <p:nvPr/>
+        </p:nvSpPr>
+        <p:spPr bwMode="auto">
+          <a:xfrm>
+            <a:off x="4231443" y="3591935"/>
+            <a:ext cx="1568045" cy="270128"/>
+          </a:xfrm>
+          <a:prstGeom prst="rect">
+            <a:avLst/>
+          </a:prstGeom>
+          <a:solidFill>
+            <a:srgbClr val="ABCD7D"/>
+          </a:solidFill>
+          <a:ln w="12700">
+            <a:solidFill>
+              <a:srgbClr val="000000"/>
+            </a:solidFill>
+            <a:miter lim="800000"/>
+            <a:headEnd/>
+            <a:tailEnd/>
+          </a:ln>
+        </p:spPr>
+        <p:txBody>
+          <a:bodyPr vert="horz" wrap="square" lIns="91440" tIns="45720" rIns="91440" bIns="45720" numCol="1" anchor="ctr" anchorCtr="0" compatLnSpc="1">
+            <a:prstTxWarp prst="textNoShape">
+              <a:avLst/>
+            </a:prstTxWarp>
+          </a:bodyPr>
+          <a:lstStyle/>
+          <a:p>
+            <a:pPr algn="ctr"/>
+            <a:r>
+              <a:rPr lang="en-US" altLang="zh-CN" sz="900" dirty="0">
+                <a:latin typeface="微软雅黑" panose="020B0503020204020204" pitchFamily="34" charset="-122"/>
+                <a:ea typeface="微软雅黑" panose="020B0503020204020204" pitchFamily="34" charset="-122"/>
+              </a:rPr>
+              <a:t>7s preceding</a:t>
+            </a:r>
+            <a:endParaRPr lang="zh-CN" altLang="en-US" sz="900" dirty="0">
+              <a:latin typeface="微软雅黑" panose="020B0503020204020204" pitchFamily="34" charset="-122"/>
+              <a:ea typeface="微软雅黑" panose="020B0503020204020204" pitchFamily="34" charset="-122"/>
+            </a:endParaRPr>
+          </a:p>
+        </p:txBody>
+      </p:sp>
+      <p:sp>
+        <p:nvSpPr>
+          <p:cNvPr id="44" name="Rectangle 223">
+            <a:extLst>
+              <a:ext uri="{FF2B5EF4-FFF2-40B4-BE49-F238E27FC236}">
+                <a16:creationId xmlns:a16="http://schemas.microsoft.com/office/drawing/2014/main" id="{96457E75-64E3-4D35-A365-BD9CC5929E52}"/>
+              </a:ext>
+            </a:extLst>
+          </p:cNvPr>
+          <p:cNvSpPr>
+            <a:spLocks noChangeArrowheads="1"/>
+          </p:cNvSpPr>
+          <p:nvPr/>
+        </p:nvSpPr>
+        <p:spPr bwMode="auto">
+          <a:xfrm>
+            <a:off x="3855900" y="3862063"/>
+            <a:ext cx="375543" cy="276715"/>
+          </a:xfrm>
+          <a:prstGeom prst="rect">
+            <a:avLst/>
+          </a:prstGeom>
+          <a:solidFill>
+            <a:srgbClr val="ABCD7D"/>
+          </a:solidFill>
+          <a:ln w="12700">
+            <a:solidFill>
+              <a:srgbClr val="000000"/>
+            </a:solidFill>
+            <a:miter lim="800000"/>
+            <a:headEnd/>
+            <a:tailEnd/>
+          </a:ln>
+        </p:spPr>
+        <p:txBody>
+          <a:bodyPr vert="horz" wrap="square" lIns="91440" tIns="45720" rIns="91440" bIns="45720" numCol="1" anchor="ctr" anchorCtr="0" compatLnSpc="1">
+            <a:prstTxWarp prst="textNoShape">
+              <a:avLst/>
+            </a:prstTxWarp>
+          </a:bodyPr>
+          <a:lstStyle/>
+          <a:p>
+            <a:pPr algn="ctr"/>
+            <a:r>
+              <a:rPr lang="en-US" altLang="zh-CN" sz="900" dirty="0">
+                <a:latin typeface="微软雅黑" panose="020B0503020204020204" pitchFamily="34" charset="-122"/>
+                <a:ea typeface="微软雅黑" panose="020B0503020204020204" pitchFamily="34" charset="-122"/>
+              </a:rPr>
+              <a:t>10s</a:t>
+            </a:r>
+            <a:endParaRPr lang="zh-CN" altLang="en-US" sz="900" dirty="0">
+              <a:latin typeface="微软雅黑" panose="020B0503020204020204" pitchFamily="34" charset="-122"/>
+              <a:ea typeface="微软雅黑" panose="020B0503020204020204" pitchFamily="34" charset="-122"/>
+            </a:endParaRPr>
+          </a:p>
+        </p:txBody>
+      </p:sp>
+      <p:sp>
+        <p:nvSpPr>
+          <p:cNvPr id="45" name="Rectangle 224">
+            <a:extLst>
+              <a:ext uri="{FF2B5EF4-FFF2-40B4-BE49-F238E27FC236}">
+                <a16:creationId xmlns:a16="http://schemas.microsoft.com/office/drawing/2014/main" id="{8E5579A4-7DC5-4061-9117-2141C1F10689}"/>
+              </a:ext>
+            </a:extLst>
+          </p:cNvPr>
+          <p:cNvSpPr>
+            <a:spLocks noChangeArrowheads="1"/>
+          </p:cNvSpPr>
+          <p:nvPr/>
+        </p:nvSpPr>
+        <p:spPr bwMode="auto">
+          <a:xfrm>
+            <a:off x="4231443" y="3862063"/>
+            <a:ext cx="1568045" cy="276715"/>
+          </a:xfrm>
+          <a:prstGeom prst="rect">
+            <a:avLst/>
+          </a:prstGeom>
+          <a:solidFill>
+            <a:srgbClr val="ABCD7D"/>
+          </a:solidFill>
+          <a:ln w="12700">
+            <a:solidFill>
+              <a:srgbClr val="000000"/>
+            </a:solidFill>
+            <a:miter lim="800000"/>
+            <a:headEnd/>
+            <a:tailEnd/>
+          </a:ln>
+        </p:spPr>
+        <p:txBody>
+          <a:bodyPr vert="horz" wrap="square" lIns="91440" tIns="45720" rIns="91440" bIns="45720" numCol="1" anchor="ctr" anchorCtr="0" compatLnSpc="1">
+            <a:prstTxWarp prst="textNoShape">
+              <a:avLst/>
+            </a:prstTxWarp>
+          </a:bodyPr>
+          <a:lstStyle/>
+          <a:p>
+            <a:pPr algn="ctr"/>
+            <a:r>
+              <a:rPr lang="en-US" altLang="zh-CN" sz="900" dirty="0">
+                <a:latin typeface="微软雅黑" panose="020B0503020204020204" pitchFamily="34" charset="-122"/>
+                <a:ea typeface="微软雅黑" panose="020B0503020204020204" pitchFamily="34" charset="-122"/>
+              </a:rPr>
+              <a:t>5s preceding</a:t>
+            </a:r>
+            <a:endParaRPr lang="zh-CN" altLang="en-US" sz="900" dirty="0">
+              <a:latin typeface="微软雅黑" panose="020B0503020204020204" pitchFamily="34" charset="-122"/>
+              <a:ea typeface="微软雅黑" panose="020B0503020204020204" pitchFamily="34" charset="-122"/>
+            </a:endParaRPr>
+          </a:p>
+        </p:txBody>
+      </p:sp>
+      <p:sp>
+        <p:nvSpPr>
+          <p:cNvPr id="46" name="Rectangle 225">
+            <a:extLst>
+              <a:ext uri="{FF2B5EF4-FFF2-40B4-BE49-F238E27FC236}">
+                <a16:creationId xmlns:a16="http://schemas.microsoft.com/office/drawing/2014/main" id="{ACCE613F-BED7-4630-9548-58C79468AD31}"/>
+              </a:ext>
+            </a:extLst>
+          </p:cNvPr>
+          <p:cNvSpPr>
+            <a:spLocks noChangeArrowheads="1"/>
+          </p:cNvSpPr>
+          <p:nvPr/>
+        </p:nvSpPr>
+        <p:spPr bwMode="auto">
+          <a:xfrm>
+            <a:off x="3855900" y="4138777"/>
+            <a:ext cx="375543" cy="276715"/>
+          </a:xfrm>
+          <a:prstGeom prst="rect">
+            <a:avLst/>
+          </a:prstGeom>
+          <a:solidFill>
+            <a:srgbClr val="ABCD7D"/>
+          </a:solidFill>
+          <a:ln w="12700">
+            <a:solidFill>
+              <a:srgbClr val="000000"/>
+            </a:solidFill>
+            <a:miter lim="800000"/>
+            <a:headEnd/>
+            <a:tailEnd/>
+          </a:ln>
+        </p:spPr>
+        <p:txBody>
+          <a:bodyPr vert="horz" wrap="square" lIns="91440" tIns="45720" rIns="91440" bIns="45720" numCol="1" anchor="ctr" anchorCtr="0" compatLnSpc="1">
+            <a:prstTxWarp prst="textNoShape">
+              <a:avLst/>
+            </a:prstTxWarp>
+          </a:bodyPr>
+          <a:lstStyle/>
+          <a:p>
+            <a:pPr algn="ctr"/>
+            <a:r>
+              <a:rPr lang="en-US" altLang="zh-CN" sz="900" dirty="0">
+                <a:latin typeface="微软雅黑" panose="020B0503020204020204" pitchFamily="34" charset="-122"/>
+                <a:ea typeface="微软雅黑" panose="020B0503020204020204" pitchFamily="34" charset="-122"/>
+              </a:rPr>
+              <a:t>15s</a:t>
+            </a:r>
+            <a:endParaRPr lang="zh-CN" altLang="en-US" sz="900" dirty="0">
+              <a:latin typeface="微软雅黑" panose="020B0503020204020204" pitchFamily="34" charset="-122"/>
+              <a:ea typeface="微软雅黑" panose="020B0503020204020204" pitchFamily="34" charset="-122"/>
+            </a:endParaRPr>
+          </a:p>
+        </p:txBody>
+      </p:sp>
+      <p:sp>
+        <p:nvSpPr>
+          <p:cNvPr id="47" name="Rectangle 226">
+            <a:extLst>
+              <a:ext uri="{FF2B5EF4-FFF2-40B4-BE49-F238E27FC236}">
+                <a16:creationId xmlns:a16="http://schemas.microsoft.com/office/drawing/2014/main" id="{644A4F69-3AF9-457D-AA1C-A83CFE0A27FB}"/>
+              </a:ext>
+            </a:extLst>
+          </p:cNvPr>
+          <p:cNvSpPr>
+            <a:spLocks noChangeArrowheads="1"/>
+          </p:cNvSpPr>
+          <p:nvPr/>
+        </p:nvSpPr>
+        <p:spPr bwMode="auto">
+          <a:xfrm>
+            <a:off x="4231443" y="4138777"/>
+            <a:ext cx="1568045" cy="276715"/>
+          </a:xfrm>
+          <a:prstGeom prst="rect">
+            <a:avLst/>
+          </a:prstGeom>
+          <a:solidFill>
+            <a:srgbClr val="ABCD7D"/>
+          </a:solidFill>
+          <a:ln w="12700">
+            <a:solidFill>
+              <a:srgbClr val="000000"/>
+            </a:solidFill>
+            <a:miter lim="800000"/>
+            <a:headEnd/>
+            <a:tailEnd/>
+          </a:ln>
+        </p:spPr>
+        <p:txBody>
+          <a:bodyPr vert="horz" wrap="square" lIns="91440" tIns="45720" rIns="91440" bIns="45720" numCol="1" anchor="ctr" anchorCtr="0" compatLnSpc="1">
+            <a:prstTxWarp prst="textNoShape">
+              <a:avLst/>
+            </a:prstTxWarp>
+          </a:bodyPr>
+          <a:lstStyle/>
+          <a:p>
+            <a:pPr algn="ctr"/>
+            <a:r>
+              <a:rPr lang="en-US" altLang="zh-CN" sz="900" dirty="0">
+                <a:latin typeface="微软雅黑" panose="020B0503020204020204" pitchFamily="34" charset="-122"/>
+                <a:ea typeface="微软雅黑" panose="020B0503020204020204" pitchFamily="34" charset="-122"/>
+              </a:rPr>
+              <a:t>0s preceding</a:t>
+            </a:r>
+            <a:endParaRPr lang="zh-CN" altLang="en-US" sz="900" dirty="0">
+              <a:latin typeface="微软雅黑" panose="020B0503020204020204" pitchFamily="34" charset="-122"/>
+              <a:ea typeface="微软雅黑" panose="020B0503020204020204" pitchFamily="34" charset="-122"/>
+            </a:endParaRPr>
+          </a:p>
+        </p:txBody>
+      </p:sp>
+      <p:sp>
+        <p:nvSpPr>
+          <p:cNvPr id="48" name="Rectangle 227">
+            <a:extLst>
+              <a:ext uri="{FF2B5EF4-FFF2-40B4-BE49-F238E27FC236}">
+                <a16:creationId xmlns:a16="http://schemas.microsoft.com/office/drawing/2014/main" id="{9BE79482-5098-4B8B-AD3E-2F7D6BAE12A7}"/>
+              </a:ext>
+            </a:extLst>
+          </p:cNvPr>
+          <p:cNvSpPr>
+            <a:spLocks noChangeArrowheads="1"/>
+          </p:cNvSpPr>
+          <p:nvPr/>
+        </p:nvSpPr>
+        <p:spPr bwMode="auto">
+          <a:xfrm>
+            <a:off x="3855900" y="4415491"/>
+            <a:ext cx="375543" cy="270128"/>
+          </a:xfrm>
+          <a:prstGeom prst="rect">
+            <a:avLst/>
+          </a:prstGeom>
+          <a:solidFill>
+            <a:srgbClr val="ABCD7D"/>
+          </a:solidFill>
+          <a:ln w="12700">
+            <a:solidFill>
+              <a:srgbClr val="000000"/>
+            </a:solidFill>
+            <a:miter lim="800000"/>
+            <a:headEnd/>
+            <a:tailEnd/>
+          </a:ln>
+        </p:spPr>
+        <p:txBody>
+          <a:bodyPr vert="horz" wrap="square" lIns="91440" tIns="45720" rIns="91440" bIns="45720" numCol="1" anchor="ctr" anchorCtr="0" compatLnSpc="1">
+            <a:prstTxWarp prst="textNoShape">
+              <a:avLst/>
+            </a:prstTxWarp>
+          </a:bodyPr>
+          <a:lstStyle/>
+          <a:p>
+            <a:pPr algn="ctr"/>
+            <a:r>
+              <a:rPr lang="en-US" altLang="zh-CN" sz="900" dirty="0">
+                <a:latin typeface="微软雅黑" panose="020B0503020204020204" pitchFamily="34" charset="-122"/>
+                <a:ea typeface="微软雅黑" panose="020B0503020204020204" pitchFamily="34" charset="-122"/>
+              </a:rPr>
+              <a:t>15s</a:t>
+            </a:r>
+            <a:endParaRPr lang="zh-CN" altLang="en-US" sz="900" dirty="0">
+              <a:latin typeface="微软雅黑" panose="020B0503020204020204" pitchFamily="34" charset="-122"/>
+              <a:ea typeface="微软雅黑" panose="020B0503020204020204" pitchFamily="34" charset="-122"/>
+            </a:endParaRPr>
+          </a:p>
+        </p:txBody>
+      </p:sp>
+      <p:sp>
+        <p:nvSpPr>
+          <p:cNvPr id="49" name="Rectangle 228">
+            <a:extLst>
+              <a:ext uri="{FF2B5EF4-FFF2-40B4-BE49-F238E27FC236}">
+                <a16:creationId xmlns:a16="http://schemas.microsoft.com/office/drawing/2014/main" id="{F1A8BB6F-31D3-4D19-B808-5F94F89D9A8D}"/>
+              </a:ext>
+            </a:extLst>
+          </p:cNvPr>
+          <p:cNvSpPr>
+            <a:spLocks noChangeArrowheads="1"/>
+          </p:cNvSpPr>
+          <p:nvPr/>
+        </p:nvSpPr>
+        <p:spPr bwMode="auto">
+          <a:xfrm>
+            <a:off x="4231443" y="4415491"/>
+            <a:ext cx="1568045" cy="270128"/>
+          </a:xfrm>
+          <a:prstGeom prst="rect">
+            <a:avLst/>
+          </a:prstGeom>
+          <a:solidFill>
+            <a:srgbClr val="ABCD7D"/>
+          </a:solidFill>
+          <a:ln w="12700">
+            <a:solidFill>
+              <a:srgbClr val="000000"/>
+            </a:solidFill>
+            <a:miter lim="800000"/>
+            <a:headEnd/>
+            <a:tailEnd/>
+          </a:ln>
+        </p:spPr>
+        <p:txBody>
+          <a:bodyPr vert="horz" wrap="square" lIns="91440" tIns="45720" rIns="91440" bIns="45720" numCol="1" anchor="ctr" anchorCtr="0" compatLnSpc="1">
+            <a:prstTxWarp prst="textNoShape">
+              <a:avLst/>
+            </a:prstTxWarp>
+          </a:bodyPr>
+          <a:lstStyle/>
+          <a:p>
+            <a:pPr algn="ctr"/>
+            <a:r>
+              <a:rPr lang="en-US" altLang="zh-CN" sz="900" dirty="0">
+                <a:latin typeface="微软雅黑" panose="020B0503020204020204" pitchFamily="34" charset="-122"/>
+                <a:ea typeface="微软雅黑" panose="020B0503020204020204" pitchFamily="34" charset="-122"/>
+              </a:rPr>
+              <a:t>0s preceding</a:t>
+            </a:r>
+            <a:endParaRPr lang="zh-CN" altLang="en-US" sz="900" dirty="0">
+              <a:latin typeface="微软雅黑" panose="020B0503020204020204" pitchFamily="34" charset="-122"/>
+              <a:ea typeface="微软雅黑" panose="020B0503020204020204" pitchFamily="34" charset="-122"/>
+            </a:endParaRPr>
+          </a:p>
+        </p:txBody>
+      </p:sp>
+      <p:sp>
+        <p:nvSpPr>
+          <p:cNvPr id="50" name="Rectangle 229">
+            <a:extLst>
+              <a:ext uri="{FF2B5EF4-FFF2-40B4-BE49-F238E27FC236}">
+                <a16:creationId xmlns:a16="http://schemas.microsoft.com/office/drawing/2014/main" id="{58DF2C70-2433-4F5A-9324-E041C2370D31}"/>
+              </a:ext>
+            </a:extLst>
+          </p:cNvPr>
+          <p:cNvSpPr>
+            <a:spLocks noChangeArrowheads="1"/>
+          </p:cNvSpPr>
+          <p:nvPr/>
+        </p:nvSpPr>
+        <p:spPr bwMode="auto">
+          <a:xfrm>
+            <a:off x="3855900" y="4685616"/>
+            <a:ext cx="375543" cy="276715"/>
+          </a:xfrm>
+          <a:prstGeom prst="rect">
+            <a:avLst/>
+          </a:prstGeom>
+          <a:solidFill>
+            <a:srgbClr val="ABCD7D"/>
+          </a:solidFill>
+          <a:ln w="12700">
+            <a:solidFill>
+              <a:srgbClr val="000000"/>
+            </a:solidFill>
+            <a:miter lim="800000"/>
+            <a:headEnd/>
+            <a:tailEnd/>
+          </a:ln>
+        </p:spPr>
+        <p:txBody>
+          <a:bodyPr vert="horz" wrap="square" lIns="91440" tIns="45720" rIns="91440" bIns="45720" numCol="1" anchor="ctr" anchorCtr="0" compatLnSpc="1">
+            <a:prstTxWarp prst="textNoShape">
+              <a:avLst/>
+            </a:prstTxWarp>
+          </a:bodyPr>
+          <a:lstStyle/>
+          <a:p>
+            <a:pPr algn="ctr"/>
+            <a:r>
+              <a:rPr lang="en-US" altLang="zh-CN" sz="900" dirty="0">
+                <a:latin typeface="微软雅黑" panose="020B0503020204020204" pitchFamily="34" charset="-122"/>
+                <a:ea typeface="微软雅黑" panose="020B0503020204020204" pitchFamily="34" charset="-122"/>
+              </a:rPr>
+              <a:t>15s</a:t>
+            </a:r>
+            <a:endParaRPr lang="zh-CN" altLang="en-US" sz="900" dirty="0">
+              <a:latin typeface="微软雅黑" panose="020B0503020204020204" pitchFamily="34" charset="-122"/>
+              <a:ea typeface="微软雅黑" panose="020B0503020204020204" pitchFamily="34" charset="-122"/>
+            </a:endParaRPr>
+          </a:p>
+        </p:txBody>
+      </p:sp>
+      <p:sp>
+        <p:nvSpPr>
+          <p:cNvPr id="51" name="Rectangle 230">
+            <a:extLst>
+              <a:ext uri="{FF2B5EF4-FFF2-40B4-BE49-F238E27FC236}">
+                <a16:creationId xmlns:a16="http://schemas.microsoft.com/office/drawing/2014/main" id="{3DF79AC1-3145-40E8-B809-93EC3D6C19E8}"/>
+              </a:ext>
+            </a:extLst>
+          </p:cNvPr>
+          <p:cNvSpPr>
+            <a:spLocks noChangeArrowheads="1"/>
+          </p:cNvSpPr>
+          <p:nvPr/>
+        </p:nvSpPr>
+        <p:spPr bwMode="auto">
+          <a:xfrm>
+            <a:off x="4231443" y="4685616"/>
+            <a:ext cx="1568045" cy="276715"/>
+          </a:xfrm>
+          <a:prstGeom prst="rect">
+            <a:avLst/>
+          </a:prstGeom>
+          <a:solidFill>
+            <a:srgbClr val="ABCD7D"/>
+          </a:solidFill>
+          <a:ln w="12700">
+            <a:solidFill>
+              <a:srgbClr val="000000"/>
+            </a:solidFill>
+            <a:miter lim="800000"/>
+            <a:headEnd/>
+            <a:tailEnd/>
+          </a:ln>
+        </p:spPr>
+        <p:txBody>
+          <a:bodyPr vert="horz" wrap="square" lIns="91440" tIns="45720" rIns="91440" bIns="45720" numCol="1" anchor="ctr" anchorCtr="0" compatLnSpc="1">
+            <a:prstTxWarp prst="textNoShape">
+              <a:avLst/>
+            </a:prstTxWarp>
+          </a:bodyPr>
+          <a:lstStyle/>
+          <a:p>
+            <a:pPr algn="ctr"/>
+            <a:r>
+              <a:rPr lang="en-US" altLang="zh-CN" sz="900">
+                <a:latin typeface="微软雅黑" panose="020B0503020204020204" pitchFamily="34" charset="-122"/>
+                <a:ea typeface="微软雅黑" panose="020B0503020204020204" pitchFamily="34" charset="-122"/>
+              </a:rPr>
+              <a:t>curernt row</a:t>
+            </a:r>
+            <a:endParaRPr lang="zh-CN" altLang="en-US" sz="900">
+              <a:latin typeface="微软雅黑" panose="020B0503020204020204" pitchFamily="34" charset="-122"/>
+              <a:ea typeface="微软雅黑" panose="020B0503020204020204" pitchFamily="34" charset="-122"/>
+            </a:endParaRPr>
+          </a:p>
+        </p:txBody>
+      </p:sp>
+      <p:sp>
+        <p:nvSpPr>
+          <p:cNvPr id="52" name="Rectangle 231">
+            <a:extLst>
+              <a:ext uri="{FF2B5EF4-FFF2-40B4-BE49-F238E27FC236}">
+                <a16:creationId xmlns:a16="http://schemas.microsoft.com/office/drawing/2014/main" id="{FC1B1399-A7E5-4DD7-BCD5-8633B7765F89}"/>
+              </a:ext>
+            </a:extLst>
+          </p:cNvPr>
+          <p:cNvSpPr>
+            <a:spLocks noChangeArrowheads="1"/>
+          </p:cNvSpPr>
+          <p:nvPr/>
+        </p:nvSpPr>
+        <p:spPr bwMode="auto">
+          <a:xfrm>
+            <a:off x="6820693" y="4171718"/>
+            <a:ext cx="401896" cy="276715"/>
+          </a:xfrm>
+          <a:prstGeom prst="rect">
+            <a:avLst/>
+          </a:prstGeom>
+          <a:solidFill>
+            <a:srgbClr val="ABCD7D"/>
+          </a:solidFill>
+          <a:ln w="12700">
+            <a:solidFill>
+              <a:srgbClr val="000000"/>
+            </a:solidFill>
+            <a:miter lim="800000"/>
+            <a:headEnd/>
+            <a:tailEnd/>
+          </a:ln>
+        </p:spPr>
+        <p:txBody>
+          <a:bodyPr vert="horz" wrap="square" lIns="91440" tIns="45720" rIns="91440" bIns="45720" numCol="1" anchor="ctr" anchorCtr="0" compatLnSpc="1">
+            <a:prstTxWarp prst="textNoShape">
+              <a:avLst/>
+            </a:prstTxWarp>
+          </a:bodyPr>
+          <a:lstStyle/>
+          <a:p>
+            <a:pPr algn="ctr"/>
+            <a:r>
+              <a:rPr lang="en-US" altLang="zh-CN" sz="900" dirty="0">
+                <a:latin typeface="微软雅黑" panose="020B0503020204020204" pitchFamily="34" charset="-122"/>
+                <a:ea typeface="微软雅黑" panose="020B0503020204020204" pitchFamily="34" charset="-122"/>
+              </a:rPr>
+              <a:t>15s</a:t>
+            </a:r>
+            <a:endParaRPr lang="zh-CN" altLang="en-US" sz="900" dirty="0">
+              <a:latin typeface="微软雅黑" panose="020B0503020204020204" pitchFamily="34" charset="-122"/>
+              <a:ea typeface="微软雅黑" panose="020B0503020204020204" pitchFamily="34" charset="-122"/>
+            </a:endParaRPr>
+          </a:p>
+        </p:txBody>
+      </p:sp>
+      <p:sp>
+        <p:nvSpPr>
+          <p:cNvPr id="53" name="Rectangle 232">
+            <a:extLst>
+              <a:ext uri="{FF2B5EF4-FFF2-40B4-BE49-F238E27FC236}">
+                <a16:creationId xmlns:a16="http://schemas.microsoft.com/office/drawing/2014/main" id="{E3B44994-147E-40CD-92D9-A96E318F2AB2}"/>
+              </a:ext>
+            </a:extLst>
+          </p:cNvPr>
+          <p:cNvSpPr>
+            <a:spLocks noChangeArrowheads="1"/>
+          </p:cNvSpPr>
+          <p:nvPr/>
+        </p:nvSpPr>
+        <p:spPr bwMode="auto">
+          <a:xfrm>
+            <a:off x="7222590" y="4171718"/>
+            <a:ext cx="1633931" cy="276715"/>
+          </a:xfrm>
+          <a:prstGeom prst="rect">
+            <a:avLst/>
+          </a:prstGeom>
+          <a:solidFill>
+            <a:srgbClr val="ABCD7D"/>
+          </a:solidFill>
+          <a:ln w="12700">
+            <a:solidFill>
+              <a:srgbClr val="000000"/>
+            </a:solidFill>
+            <a:miter lim="800000"/>
+            <a:headEnd/>
+            <a:tailEnd/>
+          </a:ln>
+        </p:spPr>
+        <p:txBody>
+          <a:bodyPr vert="horz" wrap="square" lIns="91440" tIns="45720" rIns="91440" bIns="45720" numCol="1" anchor="ctr" anchorCtr="0" compatLnSpc="1">
+            <a:prstTxWarp prst="textNoShape">
+              <a:avLst/>
+            </a:prstTxWarp>
+          </a:bodyPr>
+          <a:lstStyle/>
+          <a:p>
+            <a:pPr algn="ctr"/>
+            <a:r>
+              <a:rPr lang="en-US" altLang="zh-CN" sz="900" dirty="0">
+                <a:latin typeface="微软雅黑" panose="020B0503020204020204" pitchFamily="34" charset="-122"/>
+                <a:ea typeface="微软雅黑" panose="020B0503020204020204" pitchFamily="34" charset="-122"/>
+              </a:rPr>
+              <a:t>0s preceding</a:t>
+            </a:r>
+            <a:endParaRPr lang="zh-CN" altLang="en-US" sz="900" dirty="0">
+              <a:latin typeface="微软雅黑" panose="020B0503020204020204" pitchFamily="34" charset="-122"/>
+              <a:ea typeface="微软雅黑" panose="020B0503020204020204" pitchFamily="34" charset="-122"/>
+            </a:endParaRPr>
+          </a:p>
+        </p:txBody>
+      </p:sp>
+      <p:sp>
+        <p:nvSpPr>
+          <p:cNvPr id="54" name="Rectangle 233">
+            <a:extLst>
+              <a:ext uri="{FF2B5EF4-FFF2-40B4-BE49-F238E27FC236}">
+                <a16:creationId xmlns:a16="http://schemas.microsoft.com/office/drawing/2014/main" id="{22D54B66-7DA8-4AC8-9E0C-D6C8368F4CD4}"/>
+              </a:ext>
+            </a:extLst>
+          </p:cNvPr>
+          <p:cNvSpPr>
+            <a:spLocks noChangeArrowheads="1"/>
+          </p:cNvSpPr>
+          <p:nvPr/>
+        </p:nvSpPr>
+        <p:spPr bwMode="auto">
+          <a:xfrm>
+            <a:off x="6820693" y="4448432"/>
+            <a:ext cx="401896" cy="270128"/>
+          </a:xfrm>
+          <a:prstGeom prst="rect">
+            <a:avLst/>
+          </a:prstGeom>
+          <a:solidFill>
+            <a:srgbClr val="ABCD7D"/>
+          </a:solidFill>
+          <a:ln w="12700">
+            <a:solidFill>
+              <a:srgbClr val="000000"/>
+            </a:solidFill>
+            <a:miter lim="800000"/>
+            <a:headEnd/>
+            <a:tailEnd/>
+          </a:ln>
+        </p:spPr>
+        <p:txBody>
+          <a:bodyPr vert="horz" wrap="square" lIns="91440" tIns="45720" rIns="91440" bIns="45720" numCol="1" anchor="ctr" anchorCtr="0" compatLnSpc="1">
+            <a:prstTxWarp prst="textNoShape">
+              <a:avLst/>
+            </a:prstTxWarp>
+          </a:bodyPr>
+          <a:lstStyle/>
+          <a:p>
+            <a:pPr algn="ctr"/>
+            <a:r>
+              <a:rPr lang="en-US" altLang="zh-CN" sz="900" dirty="0">
+                <a:latin typeface="微软雅黑" panose="020B0503020204020204" pitchFamily="34" charset="-122"/>
+                <a:ea typeface="微软雅黑" panose="020B0503020204020204" pitchFamily="34" charset="-122"/>
+              </a:rPr>
+              <a:t>15s</a:t>
+            </a:r>
+            <a:endParaRPr lang="zh-CN" altLang="en-US" sz="900" dirty="0">
+              <a:latin typeface="微软雅黑" panose="020B0503020204020204" pitchFamily="34" charset="-122"/>
+              <a:ea typeface="微软雅黑" panose="020B0503020204020204" pitchFamily="34" charset="-122"/>
+            </a:endParaRPr>
+          </a:p>
+        </p:txBody>
+      </p:sp>
+      <p:sp>
+        <p:nvSpPr>
+          <p:cNvPr id="55" name="Rectangle 234">
+            <a:extLst>
+              <a:ext uri="{FF2B5EF4-FFF2-40B4-BE49-F238E27FC236}">
+                <a16:creationId xmlns:a16="http://schemas.microsoft.com/office/drawing/2014/main" id="{EB6C8AE6-1AA9-4588-A028-8A790B305AE0}"/>
+              </a:ext>
+            </a:extLst>
+          </p:cNvPr>
+          <p:cNvSpPr>
+            <a:spLocks noChangeArrowheads="1"/>
+          </p:cNvSpPr>
+          <p:nvPr/>
+        </p:nvSpPr>
+        <p:spPr bwMode="auto">
+          <a:xfrm>
+            <a:off x="7222590" y="4448432"/>
+            <a:ext cx="1633931" cy="270128"/>
+          </a:xfrm>
+          <a:prstGeom prst="rect">
+            <a:avLst/>
+          </a:prstGeom>
+          <a:solidFill>
+            <a:srgbClr val="ABCD7D"/>
+          </a:solidFill>
+          <a:ln w="12700">
+            <a:solidFill>
+              <a:srgbClr val="000000"/>
+            </a:solidFill>
+            <a:miter lim="800000"/>
+            <a:headEnd/>
+            <a:tailEnd/>
+          </a:ln>
+        </p:spPr>
+        <p:txBody>
+          <a:bodyPr vert="horz" wrap="square" lIns="91440" tIns="45720" rIns="91440" bIns="45720" numCol="1" anchor="ctr" anchorCtr="0" compatLnSpc="1">
+            <a:prstTxWarp prst="textNoShape">
+              <a:avLst/>
+            </a:prstTxWarp>
+          </a:bodyPr>
+          <a:lstStyle/>
+          <a:p>
+            <a:pPr algn="ctr"/>
+            <a:r>
+              <a:rPr lang="en-US" altLang="zh-CN" sz="900" dirty="0">
+                <a:latin typeface="微软雅黑" panose="020B0503020204020204" pitchFamily="34" charset="-122"/>
+                <a:ea typeface="微软雅黑" panose="020B0503020204020204" pitchFamily="34" charset="-122"/>
+              </a:rPr>
+              <a:t>0s preceding</a:t>
+            </a:r>
+            <a:endParaRPr lang="zh-CN" altLang="en-US" sz="900" dirty="0">
+              <a:latin typeface="微软雅黑" panose="020B0503020204020204" pitchFamily="34" charset="-122"/>
+              <a:ea typeface="微软雅黑" panose="020B0503020204020204" pitchFamily="34" charset="-122"/>
+            </a:endParaRPr>
+          </a:p>
+        </p:txBody>
+      </p:sp>
+      <p:sp>
+        <p:nvSpPr>
+          <p:cNvPr id="56" name="Rectangle 235">
+            <a:extLst>
+              <a:ext uri="{FF2B5EF4-FFF2-40B4-BE49-F238E27FC236}">
+                <a16:creationId xmlns:a16="http://schemas.microsoft.com/office/drawing/2014/main" id="{AC21BC79-829B-458C-8B6D-1EBFFC58F8A2}"/>
+              </a:ext>
+            </a:extLst>
+          </p:cNvPr>
+          <p:cNvSpPr>
+            <a:spLocks noChangeArrowheads="1"/>
+          </p:cNvSpPr>
+          <p:nvPr/>
+        </p:nvSpPr>
+        <p:spPr bwMode="auto">
+          <a:xfrm>
+            <a:off x="6820693" y="4718559"/>
+            <a:ext cx="401896" cy="276715"/>
+          </a:xfrm>
+          <a:prstGeom prst="rect">
+            <a:avLst/>
+          </a:prstGeom>
+          <a:solidFill>
+            <a:srgbClr val="F0CDCC"/>
+          </a:solidFill>
+          <a:ln w="12700">
+            <a:solidFill>
+              <a:srgbClr val="000000"/>
+            </a:solidFill>
+            <a:miter lim="800000"/>
+            <a:headEnd/>
+            <a:tailEnd/>
+          </a:ln>
+        </p:spPr>
+        <p:txBody>
+          <a:bodyPr vert="horz" wrap="square" lIns="91440" tIns="45720" rIns="91440" bIns="45720" numCol="1" anchor="ctr" anchorCtr="0" compatLnSpc="1">
+            <a:prstTxWarp prst="textNoShape">
+              <a:avLst/>
+            </a:prstTxWarp>
+          </a:bodyPr>
+          <a:lstStyle/>
+          <a:p>
+            <a:pPr algn="ctr"/>
+            <a:r>
+              <a:rPr lang="en-US" altLang="zh-CN" sz="900" dirty="0">
+                <a:latin typeface="微软雅黑" panose="020B0503020204020204" pitchFamily="34" charset="-122"/>
+                <a:ea typeface="微软雅黑" panose="020B0503020204020204" pitchFamily="34" charset="-122"/>
+              </a:rPr>
+              <a:t>15s</a:t>
+            </a:r>
+            <a:endParaRPr lang="zh-CN" altLang="en-US" sz="900" dirty="0">
+              <a:latin typeface="微软雅黑" panose="020B0503020204020204" pitchFamily="34" charset="-122"/>
+              <a:ea typeface="微软雅黑" panose="020B0503020204020204" pitchFamily="34" charset="-122"/>
+            </a:endParaRPr>
+          </a:p>
+        </p:txBody>
+      </p:sp>
+      <p:sp>
+        <p:nvSpPr>
+          <p:cNvPr id="57" name="Rectangle 236">
+            <a:extLst>
+              <a:ext uri="{FF2B5EF4-FFF2-40B4-BE49-F238E27FC236}">
+                <a16:creationId xmlns:a16="http://schemas.microsoft.com/office/drawing/2014/main" id="{EF183E22-6950-47EA-8C6E-FB51167C2D8A}"/>
+              </a:ext>
+            </a:extLst>
+          </p:cNvPr>
+          <p:cNvSpPr>
+            <a:spLocks noChangeArrowheads="1"/>
+          </p:cNvSpPr>
+          <p:nvPr/>
+        </p:nvSpPr>
+        <p:spPr bwMode="auto">
+          <a:xfrm>
+            <a:off x="7222590" y="4718559"/>
+            <a:ext cx="1633931" cy="276715"/>
+          </a:xfrm>
+          <a:prstGeom prst="rect">
+            <a:avLst/>
+          </a:prstGeom>
+          <a:solidFill>
+            <a:srgbClr val="F0CDCC"/>
+          </a:solidFill>
+          <a:ln w="12700">
+            <a:solidFill>
+              <a:srgbClr val="000000"/>
+            </a:solidFill>
+            <a:miter lim="800000"/>
+            <a:headEnd/>
+            <a:tailEnd/>
+          </a:ln>
+        </p:spPr>
+        <p:txBody>
+          <a:bodyPr vert="horz" wrap="square" lIns="91440" tIns="45720" rIns="91440" bIns="45720" numCol="1" anchor="ctr" anchorCtr="0" compatLnSpc="1">
+            <a:prstTxWarp prst="textNoShape">
+              <a:avLst/>
+            </a:prstTxWarp>
+          </a:bodyPr>
+          <a:lstStyle/>
+          <a:p>
+            <a:pPr algn="ctr"/>
+            <a:r>
+              <a:rPr lang="en-US" altLang="zh-CN" sz="900">
+                <a:latin typeface="微软雅黑" panose="020B0503020204020204" pitchFamily="34" charset="-122"/>
+                <a:ea typeface="微软雅黑" panose="020B0503020204020204" pitchFamily="34" charset="-122"/>
+              </a:rPr>
+              <a:t>curernt row</a:t>
+            </a:r>
+            <a:endParaRPr lang="zh-CN" altLang="en-US" sz="900">
+              <a:latin typeface="微软雅黑" panose="020B0503020204020204" pitchFamily="34" charset="-122"/>
+              <a:ea typeface="微软雅黑" panose="020B0503020204020204" pitchFamily="34" charset="-122"/>
+            </a:endParaRPr>
+          </a:p>
+        </p:txBody>
+      </p:sp>
+      <p:sp>
+        <p:nvSpPr>
+          <p:cNvPr id="59" name="文本框 58">
+            <a:extLst>
+              <a:ext uri="{FF2B5EF4-FFF2-40B4-BE49-F238E27FC236}">
+                <a16:creationId xmlns:a16="http://schemas.microsoft.com/office/drawing/2014/main" id="{581F1110-D22A-45F7-9D36-6B8D3D00B022}"/>
+              </a:ext>
+            </a:extLst>
+          </p:cNvPr>
+          <p:cNvSpPr txBox="1"/>
+          <p:nvPr/>
+        </p:nvSpPr>
+        <p:spPr>
+          <a:xfrm>
+            <a:off x="3907873" y="1704029"/>
+            <a:ext cx="1839653" cy="356421"/>
+          </a:xfrm>
+          <a:prstGeom prst="rect">
+            <a:avLst/>
+          </a:prstGeom>
+          <a:noFill/>
+        </p:spPr>
+        <p:txBody>
+          <a:bodyPr wrap="none" rtlCol="0" anchor="ctr">
+            <a:spAutoFit/>
+          </a:bodyPr>
+          <a:lstStyle/>
+          <a:p>
+            <a:pPr algn="ctr"/>
+            <a:r>
+              <a:rPr lang="en-US" altLang="zh-CN" sz="900" dirty="0">
+                <a:latin typeface="微软雅黑" panose="020B0503020204020204" pitchFamily="34" charset="-122"/>
+                <a:ea typeface="微软雅黑" panose="020B0503020204020204" pitchFamily="34" charset="-122"/>
+                <a:sym typeface="微软雅黑" panose="020B0503020204020204" pitchFamily="34" charset="-122"/>
+              </a:rPr>
+              <a:t>ROWS_RANGE between</a:t>
+            </a:r>
+          </a:p>
+          <a:p>
+            <a:pPr algn="ctr"/>
+            <a:r>
+              <a:rPr lang="en-US" altLang="zh-CN" sz="900" dirty="0">
+                <a:latin typeface="微软雅黑" panose="020B0503020204020204" pitchFamily="34" charset="-122"/>
+                <a:ea typeface="微软雅黑" panose="020B0503020204020204" pitchFamily="34" charset="-122"/>
+                <a:sym typeface="微软雅黑" panose="020B0503020204020204" pitchFamily="34" charset="-122"/>
+              </a:rPr>
+              <a:t>10s preceding and current row </a:t>
+            </a:r>
+            <a:endParaRPr lang="zh-CN" altLang="en-US" sz="900" dirty="0">
+              <a:latin typeface="微软雅黑" panose="020B0503020204020204" pitchFamily="34" charset="-122"/>
+              <a:ea typeface="微软雅黑" panose="020B0503020204020204" pitchFamily="34" charset="-122"/>
+              <a:sym typeface="微软雅黑" panose="020B0503020204020204" pitchFamily="34" charset="-122"/>
+            </a:endParaRPr>
+          </a:p>
+        </p:txBody>
+      </p:sp>
+      <p:sp>
+        <p:nvSpPr>
+          <p:cNvPr id="60" name="文本框 59">
+            <a:extLst>
+              <a:ext uri="{FF2B5EF4-FFF2-40B4-BE49-F238E27FC236}">
+                <a16:creationId xmlns:a16="http://schemas.microsoft.com/office/drawing/2014/main" id="{44008B91-7622-4098-80C1-71BFF103F37B}"/>
+              </a:ext>
+            </a:extLst>
+          </p:cNvPr>
+          <p:cNvSpPr txBox="1"/>
+          <p:nvPr/>
+        </p:nvSpPr>
+        <p:spPr>
+          <a:xfrm>
+            <a:off x="6885463" y="1628325"/>
+            <a:ext cx="1906292" cy="507831"/>
+          </a:xfrm>
+          <a:prstGeom prst="rect">
+            <a:avLst/>
+          </a:prstGeom>
+          <a:noFill/>
+        </p:spPr>
+        <p:txBody>
+          <a:bodyPr wrap="none" rtlCol="0" anchor="ctr">
+            <a:spAutoFit/>
+          </a:bodyPr>
+          <a:lstStyle/>
+          <a:p>
+            <a:pPr algn="ctr"/>
+            <a:r>
+              <a:rPr lang="en-US" altLang="zh-CN" sz="900" dirty="0">
+                <a:latin typeface="微软雅黑" panose="020B0503020204020204" pitchFamily="34" charset="-122"/>
+                <a:ea typeface="微软雅黑" panose="020B0503020204020204" pitchFamily="34" charset="-122"/>
+                <a:sym typeface="微软雅黑" panose="020B0503020204020204" pitchFamily="34" charset="-122"/>
+              </a:rPr>
+              <a:t>ROWS_RANGE between</a:t>
+            </a:r>
+          </a:p>
+          <a:p>
+            <a:pPr algn="ctr"/>
+            <a:r>
+              <a:rPr lang="en-US" altLang="zh-CN" sz="900" dirty="0">
+                <a:latin typeface="微软雅黑" panose="020B0503020204020204" pitchFamily="34" charset="-122"/>
+                <a:ea typeface="微软雅黑" panose="020B0503020204020204" pitchFamily="34" charset="-122"/>
+                <a:sym typeface="微软雅黑" panose="020B0503020204020204" pitchFamily="34" charset="-122"/>
+              </a:rPr>
+              <a:t>10s preceding and current row </a:t>
+            </a:r>
+          </a:p>
+          <a:p>
+            <a:pPr algn="ctr"/>
+            <a:r>
+              <a:rPr lang="en-US" altLang="zh-CN" sz="900" dirty="0">
+                <a:latin typeface="微软雅黑" panose="020B0503020204020204" pitchFamily="34" charset="-122"/>
+                <a:ea typeface="微软雅黑" panose="020B0503020204020204" pitchFamily="34" charset="-122"/>
+                <a:sym typeface="微软雅黑" panose="020B0503020204020204" pitchFamily="34" charset="-122"/>
+              </a:rPr>
+              <a:t>EXCLUDE CURRENT_ROW</a:t>
+            </a:r>
+            <a:endParaRPr lang="zh-CN" altLang="en-US" sz="900" dirty="0">
+              <a:latin typeface="微软雅黑" panose="020B0503020204020204" pitchFamily="34" charset="-122"/>
+              <a:ea typeface="微软雅黑" panose="020B0503020204020204" pitchFamily="34" charset="-122"/>
+              <a:sym typeface="微软雅黑" panose="020B0503020204020204" pitchFamily="34" charset="-122"/>
+            </a:endParaRPr>
+          </a:p>
+        </p:txBody>
+      </p:sp>
+      <p:sp>
+        <p:nvSpPr>
+          <p:cNvPr id="58" name="Line 112">
+            <a:extLst>
+              <a:ext uri="{FF2B5EF4-FFF2-40B4-BE49-F238E27FC236}">
+                <a16:creationId xmlns:a16="http://schemas.microsoft.com/office/drawing/2014/main" id="{C8FA68F4-3C18-4849-7B0D-48120EDD0748}"/>
+              </a:ext>
+            </a:extLst>
+          </p:cNvPr>
+          <p:cNvSpPr>
+            <a:spLocks noChangeShapeType="1"/>
+          </p:cNvSpPr>
+          <p:nvPr/>
+        </p:nvSpPr>
+        <p:spPr bwMode="auto">
+          <a:xfrm flipH="1" flipV="1">
+            <a:off x="8922058" y="3071452"/>
+            <a:ext cx="6681" cy="1632204"/>
+          </a:xfrm>
+          <a:prstGeom prst="line">
+            <a:avLst/>
+          </a:prstGeom>
+          <a:ln>
+            <a:headEnd type="arrow" w="med" len="med"/>
+            <a:tailEnd type="arrow" w="med" len="med"/>
+          </a:ln>
+          <a:extLst>
+            <a:ext uri="{909E8E84-426E-40DD-AFC4-6F175D3DCCD1}">
+              <a14:hiddenFill xmlns:a14="http://schemas.microsoft.com/office/drawing/2010/main">
+                <a:noFill/>
+              </a14:hiddenFill>
+            </a:ext>
+          </a:extLst>
+        </p:spPr>
+        <p:style>
+          <a:lnRef idx="2">
+            <a:schemeClr val="dk1"/>
+          </a:lnRef>
+          <a:fillRef idx="0">
+            <a:schemeClr val="dk1"/>
+          </a:fillRef>
+          <a:effectRef idx="1">
+            <a:schemeClr val="dk1"/>
+          </a:effectRef>
+          <a:fontRef idx="minor">
+            <a:schemeClr val="tx1"/>
+          </a:fontRef>
+        </p:style>
+        <p:txBody>
+          <a:bodyPr vert="horz" wrap="square" lIns="91440" tIns="45720" rIns="91440" bIns="45720" numCol="1" anchor="ctr" anchorCtr="0" compatLnSpc="1">
+            <a:prstTxWarp prst="textNoShape">
+              <a:avLst/>
+            </a:prstTxWarp>
+          </a:bodyPr>
+          <a:lstStyle/>
+          <a:p>
+            <a:pPr algn="ctr"/>
+            <a:endParaRPr lang="zh-CN" altLang="en-US" sz="900">
+              <a:latin typeface="微软雅黑" panose="020B0503020204020204" pitchFamily="34" charset="-122"/>
+              <a:ea typeface="微软雅黑" panose="020B0503020204020204" pitchFamily="34" charset="-122"/>
+            </a:endParaRPr>
+          </a:p>
+        </p:txBody>
+      </p:sp>
+      <p:sp>
+        <p:nvSpPr>
+          <p:cNvPr id="61" name="文本框 60">
+            <a:extLst>
+              <a:ext uri="{FF2B5EF4-FFF2-40B4-BE49-F238E27FC236}">
+                <a16:creationId xmlns:a16="http://schemas.microsoft.com/office/drawing/2014/main" id="{5F7DDD5A-EA96-16E1-3C8B-4B5D6D498379}"/>
+              </a:ext>
+            </a:extLst>
+          </p:cNvPr>
+          <p:cNvSpPr txBox="1"/>
+          <p:nvPr/>
+        </p:nvSpPr>
+        <p:spPr>
+          <a:xfrm>
+            <a:off x="8994276" y="3779587"/>
+            <a:ext cx="1015996" cy="230832"/>
+          </a:xfrm>
+          <a:prstGeom prst="rect">
+            <a:avLst/>
+          </a:prstGeom>
+          <a:solidFill>
+            <a:schemeClr val="bg1"/>
+          </a:solidFill>
+        </p:spPr>
+        <p:txBody>
+          <a:bodyPr wrap="none" rtlCol="0" anchor="ctr">
+            <a:spAutoFit/>
+          </a:bodyPr>
+          <a:lstStyle/>
+          <a:p>
+            <a:pPr algn="ctr"/>
+            <a:r>
+              <a:rPr lang="en-US" altLang="zh-CN" sz="900" dirty="0">
+                <a:latin typeface="微软雅黑" panose="020B0503020204020204" pitchFamily="34" charset="-122"/>
+                <a:ea typeface="微软雅黑" panose="020B0503020204020204" pitchFamily="34" charset="-122"/>
+                <a:sym typeface="微软雅黑" panose="020B0503020204020204" pitchFamily="34" charset="-122"/>
+              </a:rPr>
+              <a:t>Effective Data</a:t>
+            </a:r>
+            <a:endParaRPr lang="zh-CN" altLang="en-US" sz="900" dirty="0">
+              <a:latin typeface="微软雅黑" panose="020B0503020204020204" pitchFamily="34" charset="-122"/>
+              <a:ea typeface="微软雅黑" panose="020B0503020204020204" pitchFamily="34" charset="-122"/>
+              <a:sym typeface="微软雅黑" panose="020B0503020204020204" pitchFamily="34" charset="-122"/>
+            </a:endParaRPr>
+          </a:p>
+        </p:txBody>
+      </p:sp>
+    </p:spTree>
+    <p:extLst>
+      <p:ext uri="{BB962C8B-B14F-4D97-AF65-F5344CB8AC3E}">
+        <p14:creationId xmlns:p14="http://schemas.microsoft.com/office/powerpoint/2010/main" val="2938959512"/>
+      </p:ext>
+    </p:extLst>
+  </p:cSld>
+  <p:clrMapOvr>
+    <a:masterClrMapping/>
+  </p:clrMapOvr>
+</p:sld>
+</file>
+
+<file path=ppt/slides/slide6.xml><?xml version="1.0" encoding="utf-8"?>
 <p:sld xmlns:a="http://schemas.openxmlformats.org/drawingml/2006/main" xmlns:r="http://schemas.openxmlformats.org/officeDocument/2006/relationships" xmlns:p="http://schemas.openxmlformats.org/presentationml/2006/main">
   <p:cSld>
     <p:spTree>

</xml_diff>